<commit_message>
Changes in the figures
</commit_message>
<xml_diff>
--- a/manuscript/Figures/Methods_FlowChart.pptx
+++ b/manuscript/Figures/Methods_FlowChart.pptx
@@ -2,7 +2,7 @@
 <file path=ppt/presentation.xml><?xml version="1.0" encoding="utf-8"?>
 <p:presentation xmlns:a="http://schemas.openxmlformats.org/drawingml/2006/main" xmlns:r="http://schemas.openxmlformats.org/officeDocument/2006/relationships" xmlns:p="http://schemas.openxmlformats.org/presentationml/2006/main" saveSubsetFonts="1">
   <p:sldMasterIdLst>
-    <p:sldMasterId id="2147483840" r:id="rId1"/>
+    <p:sldMasterId id="2147483852" r:id="rId1"/>
   </p:sldMasterIdLst>
   <p:notesMasterIdLst>
     <p:notesMasterId r:id="rId3"/>
@@ -10,7 +10,7 @@
   <p:sldIdLst>
     <p:sldId id="256" r:id="rId2"/>
   </p:sldIdLst>
-  <p:sldSz cx="3851275" cy="6911975"/>
+  <p:sldSz cx="3419475" cy="5075238"/>
   <p:notesSz cx="6858000" cy="9144000"/>
   <p:defaultTextStyle>
     <a:defPPr>
@@ -118,7 +118,7 @@
 <file path=ppt/revisionInfo.xml><?xml version="1.0" encoding="utf-8"?>
 <p1510:revInfo xmlns:a="http://schemas.openxmlformats.org/drawingml/2006/main" xmlns:r="http://schemas.openxmlformats.org/officeDocument/2006/relationships" xmlns:p1510="http://schemas.microsoft.com/office/powerpoint/2015/10/main">
   <p1510:revLst>
-    <p1510:client id="{B303C878-8799-4007-876A-6617B70F571A}" v="277" dt="2020-12-03T09:59:00.798"/>
+    <p1510:client id="{9EEC3235-DB20-4327-8C38-7C09ED2FC0E9}" v="12" dt="2021-02-15T10:17:23.583"/>
   </p1510:revLst>
 </p1510:revInfo>
 </file>
@@ -9079,6 +9079,902 @@
             <pc:docMk/>
             <pc:sldMk cId="2969362105" sldId="256"/>
             <ac:cxnSpMk id="623" creationId="{27CE6032-B8C9-465B-8CC6-42FEF75965C0}"/>
+          </ac:cxnSpMkLst>
+        </pc:cxnChg>
+      </pc:sldChg>
+    </pc:docChg>
+  </pc:docChgLst>
+  <pc:docChgLst>
+    <pc:chgData name="Fatima Pillosu" userId="a6295d4dc9e22643" providerId="LiveId" clId="{9EEC3235-DB20-4327-8C38-7C09ED2FC0E9}"/>
+    <pc:docChg chg="undo custSel modSld">
+      <pc:chgData name="Fatima Pillosu" userId="a6295d4dc9e22643" providerId="LiveId" clId="{9EEC3235-DB20-4327-8C38-7C09ED2FC0E9}" dt="2021-02-15T10:17:36.947" v="1449" actId="1035"/>
+      <pc:docMkLst>
+        <pc:docMk/>
+      </pc:docMkLst>
+      <pc:sldChg chg="addSp delSp modSp mod">
+        <pc:chgData name="Fatima Pillosu" userId="a6295d4dc9e22643" providerId="LiveId" clId="{9EEC3235-DB20-4327-8C38-7C09ED2FC0E9}" dt="2021-02-15T10:17:36.947" v="1449" actId="1035"/>
+        <pc:sldMkLst>
+          <pc:docMk/>
+          <pc:sldMk cId="2969362105" sldId="256"/>
+        </pc:sldMkLst>
+        <pc:spChg chg="add del mod ord">
+          <ac:chgData name="Fatima Pillosu" userId="a6295d4dc9e22643" providerId="LiveId" clId="{9EEC3235-DB20-4327-8C38-7C09ED2FC0E9}" dt="2021-02-15T09:51:44.772" v="767" actId="478"/>
+          <ac:spMkLst>
+            <pc:docMk/>
+            <pc:sldMk cId="2969362105" sldId="256"/>
+            <ac:spMk id="6" creationId="{BC7D324D-AF24-4538-A24E-87B836BD996B}"/>
+          </ac:spMkLst>
+        </pc:spChg>
+        <pc:spChg chg="add del mod">
+          <ac:chgData name="Fatima Pillosu" userId="a6295d4dc9e22643" providerId="LiveId" clId="{9EEC3235-DB20-4327-8C38-7C09ED2FC0E9}" dt="2021-02-15T10:17:08.310" v="1444" actId="21"/>
+          <ac:spMkLst>
+            <pc:docMk/>
+            <pc:sldMk cId="2969362105" sldId="256"/>
+            <ac:spMk id="61" creationId="{2F6487DD-1C3F-4F39-AB19-05CD62CCAF7D}"/>
+          </ac:spMkLst>
+        </pc:spChg>
+        <pc:spChg chg="add del mod">
+          <ac:chgData name="Fatima Pillosu" userId="a6295d4dc9e22643" providerId="LiveId" clId="{9EEC3235-DB20-4327-8C38-7C09ED2FC0E9}" dt="2021-02-15T10:17:08.310" v="1444" actId="21"/>
+          <ac:spMkLst>
+            <pc:docMk/>
+            <pc:sldMk cId="2969362105" sldId="256"/>
+            <ac:spMk id="101" creationId="{E80F2ADD-9362-4F90-BDBD-8AE96A9F0701}"/>
+          </ac:spMkLst>
+        </pc:spChg>
+        <pc:spChg chg="add mod">
+          <ac:chgData name="Fatima Pillosu" userId="a6295d4dc9e22643" providerId="LiveId" clId="{9EEC3235-DB20-4327-8C38-7C09ED2FC0E9}" dt="2021-02-15T10:17:36.947" v="1449" actId="1035"/>
+          <ac:spMkLst>
+            <pc:docMk/>
+            <pc:sldMk cId="2969362105" sldId="256"/>
+            <ac:spMk id="123" creationId="{84DC0089-261C-4ECF-988B-D71A4EA98784}"/>
+          </ac:spMkLst>
+        </pc:spChg>
+        <pc:spChg chg="add mod">
+          <ac:chgData name="Fatima Pillosu" userId="a6295d4dc9e22643" providerId="LiveId" clId="{9EEC3235-DB20-4327-8C38-7C09ED2FC0E9}" dt="2021-02-15T10:17:36.947" v="1449" actId="1035"/>
+          <ac:spMkLst>
+            <pc:docMk/>
+            <pc:sldMk cId="2969362105" sldId="256"/>
+            <ac:spMk id="125" creationId="{23F4192C-3C5C-4058-ABA6-8D0D8ABD186A}"/>
+          </ac:spMkLst>
+        </pc:spChg>
+        <pc:spChg chg="add mod">
+          <ac:chgData name="Fatima Pillosu" userId="a6295d4dc9e22643" providerId="LiveId" clId="{9EEC3235-DB20-4327-8C38-7C09ED2FC0E9}" dt="2021-02-15T10:17:36.947" v="1449" actId="1035"/>
+          <ac:spMkLst>
+            <pc:docMk/>
+            <pc:sldMk cId="2969362105" sldId="256"/>
+            <ac:spMk id="126" creationId="{5B54B95C-2773-40A2-B228-8900DEBA412C}"/>
+          </ac:spMkLst>
+        </pc:spChg>
+        <pc:spChg chg="add mod">
+          <ac:chgData name="Fatima Pillosu" userId="a6295d4dc9e22643" providerId="LiveId" clId="{9EEC3235-DB20-4327-8C38-7C09ED2FC0E9}" dt="2021-02-15T10:17:36.947" v="1449" actId="1035"/>
+          <ac:spMkLst>
+            <pc:docMk/>
+            <pc:sldMk cId="2969362105" sldId="256"/>
+            <ac:spMk id="128" creationId="{0E29CBF7-C8DD-4BC2-BB7F-51E2D06DB315}"/>
+          </ac:spMkLst>
+        </pc:spChg>
+        <pc:spChg chg="add mod">
+          <ac:chgData name="Fatima Pillosu" userId="a6295d4dc9e22643" providerId="LiveId" clId="{9EEC3235-DB20-4327-8C38-7C09ED2FC0E9}" dt="2021-02-15T10:17:36.947" v="1449" actId="1035"/>
+          <ac:spMkLst>
+            <pc:docMk/>
+            <pc:sldMk cId="2969362105" sldId="256"/>
+            <ac:spMk id="129" creationId="{641C321A-289F-4254-8AB0-381EE0E91068}"/>
+          </ac:spMkLst>
+        </pc:spChg>
+        <pc:spChg chg="add mod">
+          <ac:chgData name="Fatima Pillosu" userId="a6295d4dc9e22643" providerId="LiveId" clId="{9EEC3235-DB20-4327-8C38-7C09ED2FC0E9}" dt="2021-02-15T10:17:36.947" v="1449" actId="1035"/>
+          <ac:spMkLst>
+            <pc:docMk/>
+            <pc:sldMk cId="2969362105" sldId="256"/>
+            <ac:spMk id="132" creationId="{6817A596-B104-4B0F-9058-DF24083B0509}"/>
+          </ac:spMkLst>
+        </pc:spChg>
+        <pc:spChg chg="add mod">
+          <ac:chgData name="Fatima Pillosu" userId="a6295d4dc9e22643" providerId="LiveId" clId="{9EEC3235-DB20-4327-8C38-7C09ED2FC0E9}" dt="2021-02-15T10:17:36.947" v="1449" actId="1035"/>
+          <ac:spMkLst>
+            <pc:docMk/>
+            <pc:sldMk cId="2969362105" sldId="256"/>
+            <ac:spMk id="136" creationId="{65BDA3E8-CD6A-4FD2-85E7-470CB2949112}"/>
+          </ac:spMkLst>
+        </pc:spChg>
+        <pc:spChg chg="add mod">
+          <ac:chgData name="Fatima Pillosu" userId="a6295d4dc9e22643" providerId="LiveId" clId="{9EEC3235-DB20-4327-8C38-7C09ED2FC0E9}" dt="2021-02-15T10:17:36.947" v="1449" actId="1035"/>
+          <ac:spMkLst>
+            <pc:docMk/>
+            <pc:sldMk cId="2969362105" sldId="256"/>
+            <ac:spMk id="138" creationId="{C304CC4C-4F2F-4821-A035-78B87CC1C778}"/>
+          </ac:spMkLst>
+        </pc:spChg>
+        <pc:spChg chg="add mod">
+          <ac:chgData name="Fatima Pillosu" userId="a6295d4dc9e22643" providerId="LiveId" clId="{9EEC3235-DB20-4327-8C38-7C09ED2FC0E9}" dt="2021-02-15T10:17:36.947" v="1449" actId="1035"/>
+          <ac:spMkLst>
+            <pc:docMk/>
+            <pc:sldMk cId="2969362105" sldId="256"/>
+            <ac:spMk id="139" creationId="{E76AD702-9494-459F-814C-C0F84321D4FE}"/>
+          </ac:spMkLst>
+        </pc:spChg>
+        <pc:spChg chg="add mod">
+          <ac:chgData name="Fatima Pillosu" userId="a6295d4dc9e22643" providerId="LiveId" clId="{9EEC3235-DB20-4327-8C38-7C09ED2FC0E9}" dt="2021-02-15T10:17:36.947" v="1449" actId="1035"/>
+          <ac:spMkLst>
+            <pc:docMk/>
+            <pc:sldMk cId="2969362105" sldId="256"/>
+            <ac:spMk id="141" creationId="{6EFF9339-92AE-4BCC-B827-F8C4CBEB346C}"/>
+          </ac:spMkLst>
+        </pc:spChg>
+        <pc:spChg chg="add mod">
+          <ac:chgData name="Fatima Pillosu" userId="a6295d4dc9e22643" providerId="LiveId" clId="{9EEC3235-DB20-4327-8C38-7C09ED2FC0E9}" dt="2021-02-15T10:17:36.947" v="1449" actId="1035"/>
+          <ac:spMkLst>
+            <pc:docMk/>
+            <pc:sldMk cId="2969362105" sldId="256"/>
+            <ac:spMk id="144" creationId="{BFFBFD37-E911-46AB-AA5F-CACE9492D57E}"/>
+          </ac:spMkLst>
+        </pc:spChg>
+        <pc:spChg chg="add mod">
+          <ac:chgData name="Fatima Pillosu" userId="a6295d4dc9e22643" providerId="LiveId" clId="{9EEC3235-DB20-4327-8C38-7C09ED2FC0E9}" dt="2021-02-15T10:17:36.947" v="1449" actId="1035"/>
+          <ac:spMkLst>
+            <pc:docMk/>
+            <pc:sldMk cId="2969362105" sldId="256"/>
+            <ac:spMk id="147" creationId="{3E850B6E-86F3-4C57-8400-4E073EF0D7BA}"/>
+          </ac:spMkLst>
+        </pc:spChg>
+        <pc:spChg chg="add mod">
+          <ac:chgData name="Fatima Pillosu" userId="a6295d4dc9e22643" providerId="LiveId" clId="{9EEC3235-DB20-4327-8C38-7C09ED2FC0E9}" dt="2021-02-15T10:17:36.947" v="1449" actId="1035"/>
+          <ac:spMkLst>
+            <pc:docMk/>
+            <pc:sldMk cId="2969362105" sldId="256"/>
+            <ac:spMk id="148" creationId="{758B1423-5973-42B6-84F3-A86AB3FE346D}"/>
+          </ac:spMkLst>
+        </pc:spChg>
+        <pc:spChg chg="add mod">
+          <ac:chgData name="Fatima Pillosu" userId="a6295d4dc9e22643" providerId="LiveId" clId="{9EEC3235-DB20-4327-8C38-7C09ED2FC0E9}" dt="2021-02-15T10:17:36.947" v="1449" actId="1035"/>
+          <ac:spMkLst>
+            <pc:docMk/>
+            <pc:sldMk cId="2969362105" sldId="256"/>
+            <ac:spMk id="149" creationId="{3C09C7FB-47EB-4AD5-BB35-62F8309C4C5D}"/>
+          </ac:spMkLst>
+        </pc:spChg>
+        <pc:spChg chg="add mod">
+          <ac:chgData name="Fatima Pillosu" userId="a6295d4dc9e22643" providerId="LiveId" clId="{9EEC3235-DB20-4327-8C38-7C09ED2FC0E9}" dt="2021-02-15T10:17:36.947" v="1449" actId="1035"/>
+          <ac:spMkLst>
+            <pc:docMk/>
+            <pc:sldMk cId="2969362105" sldId="256"/>
+            <ac:spMk id="150" creationId="{60DE4DCA-D392-4BD2-8683-B7538A0ABD6D}"/>
+          </ac:spMkLst>
+        </pc:spChg>
+        <pc:spChg chg="add mod">
+          <ac:chgData name="Fatima Pillosu" userId="a6295d4dc9e22643" providerId="LiveId" clId="{9EEC3235-DB20-4327-8C38-7C09ED2FC0E9}" dt="2021-02-15T10:17:36.947" v="1449" actId="1035"/>
+          <ac:spMkLst>
+            <pc:docMk/>
+            <pc:sldMk cId="2969362105" sldId="256"/>
+            <ac:spMk id="151" creationId="{9411C48E-0E32-4FCA-BC87-D95E1CA1A4B6}"/>
+          </ac:spMkLst>
+        </pc:spChg>
+        <pc:spChg chg="add mod">
+          <ac:chgData name="Fatima Pillosu" userId="a6295d4dc9e22643" providerId="LiveId" clId="{9EEC3235-DB20-4327-8C38-7C09ED2FC0E9}" dt="2021-02-15T10:17:36.947" v="1449" actId="1035"/>
+          <ac:spMkLst>
+            <pc:docMk/>
+            <pc:sldMk cId="2969362105" sldId="256"/>
+            <ac:spMk id="152" creationId="{B309B982-440E-48D8-8195-CD17D6778287}"/>
+          </ac:spMkLst>
+        </pc:spChg>
+        <pc:spChg chg="add mod">
+          <ac:chgData name="Fatima Pillosu" userId="a6295d4dc9e22643" providerId="LiveId" clId="{9EEC3235-DB20-4327-8C38-7C09ED2FC0E9}" dt="2021-02-15T10:17:36.947" v="1449" actId="1035"/>
+          <ac:spMkLst>
+            <pc:docMk/>
+            <pc:sldMk cId="2969362105" sldId="256"/>
+            <ac:spMk id="156" creationId="{8539F026-8842-4405-838B-6E8532626571}"/>
+          </ac:spMkLst>
+        </pc:spChg>
+        <pc:spChg chg="add mod">
+          <ac:chgData name="Fatima Pillosu" userId="a6295d4dc9e22643" providerId="LiveId" clId="{9EEC3235-DB20-4327-8C38-7C09ED2FC0E9}" dt="2021-02-15T10:17:36.947" v="1449" actId="1035"/>
+          <ac:spMkLst>
+            <pc:docMk/>
+            <pc:sldMk cId="2969362105" sldId="256"/>
+            <ac:spMk id="157" creationId="{FDAC7E92-12B1-4AD1-9DBA-FD7B5A51FC4B}"/>
+          </ac:spMkLst>
+        </pc:spChg>
+        <pc:spChg chg="add mod">
+          <ac:chgData name="Fatima Pillosu" userId="a6295d4dc9e22643" providerId="LiveId" clId="{9EEC3235-DB20-4327-8C38-7C09ED2FC0E9}" dt="2021-02-15T10:17:36.947" v="1449" actId="1035"/>
+          <ac:spMkLst>
+            <pc:docMk/>
+            <pc:sldMk cId="2969362105" sldId="256"/>
+            <ac:spMk id="158" creationId="{652D85F5-8394-421A-9C4D-17F64979BA3A}"/>
+          </ac:spMkLst>
+        </pc:spChg>
+        <pc:spChg chg="add mod">
+          <ac:chgData name="Fatima Pillosu" userId="a6295d4dc9e22643" providerId="LiveId" clId="{9EEC3235-DB20-4327-8C38-7C09ED2FC0E9}" dt="2021-02-15T10:17:36.947" v="1449" actId="1035"/>
+          <ac:spMkLst>
+            <pc:docMk/>
+            <pc:sldMk cId="2969362105" sldId="256"/>
+            <ac:spMk id="159" creationId="{6253FD2B-555C-4B51-B8B8-156CA0CC3A51}"/>
+          </ac:spMkLst>
+        </pc:spChg>
+        <pc:spChg chg="add mod">
+          <ac:chgData name="Fatima Pillosu" userId="a6295d4dc9e22643" providerId="LiveId" clId="{9EEC3235-DB20-4327-8C38-7C09ED2FC0E9}" dt="2021-02-15T10:17:36.947" v="1449" actId="1035"/>
+          <ac:spMkLst>
+            <pc:docMk/>
+            <pc:sldMk cId="2969362105" sldId="256"/>
+            <ac:spMk id="160" creationId="{D4737B74-D717-4B73-B0BD-DF820697AA8E}"/>
+          </ac:spMkLst>
+        </pc:spChg>
+        <pc:spChg chg="add mod">
+          <ac:chgData name="Fatima Pillosu" userId="a6295d4dc9e22643" providerId="LiveId" clId="{9EEC3235-DB20-4327-8C38-7C09ED2FC0E9}" dt="2021-02-15T10:17:36.947" v="1449" actId="1035"/>
+          <ac:spMkLst>
+            <pc:docMk/>
+            <pc:sldMk cId="2969362105" sldId="256"/>
+            <ac:spMk id="161" creationId="{E5B78F21-099B-4DEE-A05B-C767241E3252}"/>
+          </ac:spMkLst>
+        </pc:spChg>
+        <pc:spChg chg="add mod">
+          <ac:chgData name="Fatima Pillosu" userId="a6295d4dc9e22643" providerId="LiveId" clId="{9EEC3235-DB20-4327-8C38-7C09ED2FC0E9}" dt="2021-02-15T10:17:36.947" v="1449" actId="1035"/>
+          <ac:spMkLst>
+            <pc:docMk/>
+            <pc:sldMk cId="2969362105" sldId="256"/>
+            <ac:spMk id="162" creationId="{3E40FA3A-333A-4178-BBBC-F339A5FC5269}"/>
+          </ac:spMkLst>
+        </pc:spChg>
+        <pc:spChg chg="add mod">
+          <ac:chgData name="Fatima Pillosu" userId="a6295d4dc9e22643" providerId="LiveId" clId="{9EEC3235-DB20-4327-8C38-7C09ED2FC0E9}" dt="2021-02-15T10:17:36.947" v="1449" actId="1035"/>
+          <ac:spMkLst>
+            <pc:docMk/>
+            <pc:sldMk cId="2969362105" sldId="256"/>
+            <ac:spMk id="163" creationId="{BD4B059B-E653-49D1-AAF8-E27F0D8BF3DF}"/>
+          </ac:spMkLst>
+        </pc:spChg>
+        <pc:spChg chg="add mod">
+          <ac:chgData name="Fatima Pillosu" userId="a6295d4dc9e22643" providerId="LiveId" clId="{9EEC3235-DB20-4327-8C38-7C09ED2FC0E9}" dt="2021-02-15T10:17:36.947" v="1449" actId="1035"/>
+          <ac:spMkLst>
+            <pc:docMk/>
+            <pc:sldMk cId="2969362105" sldId="256"/>
+            <ac:spMk id="164" creationId="{8F4317FD-2147-49D9-9D5B-FA03498D78AA}"/>
+          </ac:spMkLst>
+        </pc:spChg>
+        <pc:spChg chg="add mod">
+          <ac:chgData name="Fatima Pillosu" userId="a6295d4dc9e22643" providerId="LiveId" clId="{9EEC3235-DB20-4327-8C38-7C09ED2FC0E9}" dt="2021-02-15T10:17:36.947" v="1449" actId="1035"/>
+          <ac:spMkLst>
+            <pc:docMk/>
+            <pc:sldMk cId="2969362105" sldId="256"/>
+            <ac:spMk id="166" creationId="{B0B31249-3965-4EAE-9779-86EF7BA30922}"/>
+          </ac:spMkLst>
+        </pc:spChg>
+        <pc:spChg chg="add mod">
+          <ac:chgData name="Fatima Pillosu" userId="a6295d4dc9e22643" providerId="LiveId" clId="{9EEC3235-DB20-4327-8C38-7C09ED2FC0E9}" dt="2021-02-15T10:17:36.947" v="1449" actId="1035"/>
+          <ac:spMkLst>
+            <pc:docMk/>
+            <pc:sldMk cId="2969362105" sldId="256"/>
+            <ac:spMk id="168" creationId="{AD6D1F93-1604-42F6-9D96-7EC2C2F69828}"/>
+          </ac:spMkLst>
+        </pc:spChg>
+        <pc:spChg chg="del">
+          <ac:chgData name="Fatima Pillosu" userId="a6295d4dc9e22643" providerId="LiveId" clId="{9EEC3235-DB20-4327-8C38-7C09ED2FC0E9}" dt="2021-02-15T09:32:42.652" v="0" actId="478"/>
+          <ac:spMkLst>
+            <pc:docMk/>
+            <pc:sldMk cId="2969362105" sldId="256"/>
+            <ac:spMk id="465" creationId="{7E4A8C36-ACEA-4934-9A43-FFFDB4668CD9}"/>
+          </ac:spMkLst>
+        </pc:spChg>
+        <pc:spChg chg="del">
+          <ac:chgData name="Fatima Pillosu" userId="a6295d4dc9e22643" providerId="LiveId" clId="{9EEC3235-DB20-4327-8C38-7C09ED2FC0E9}" dt="2021-02-15T09:32:42.652" v="0" actId="478"/>
+          <ac:spMkLst>
+            <pc:docMk/>
+            <pc:sldMk cId="2969362105" sldId="256"/>
+            <ac:spMk id="467" creationId="{86943C14-87EC-410A-BC98-573650AC41F1}"/>
+          </ac:spMkLst>
+        </pc:spChg>
+        <pc:spChg chg="del mod">
+          <ac:chgData name="Fatima Pillosu" userId="a6295d4dc9e22643" providerId="LiveId" clId="{9EEC3235-DB20-4327-8C38-7C09ED2FC0E9}" dt="2021-02-15T10:17:08.310" v="1444" actId="21"/>
+          <ac:spMkLst>
+            <pc:docMk/>
+            <pc:sldMk cId="2969362105" sldId="256"/>
+            <ac:spMk id="469" creationId="{940EA5CF-51CB-4A73-9091-059198B034AB}"/>
+          </ac:spMkLst>
+        </pc:spChg>
+        <pc:spChg chg="del mod">
+          <ac:chgData name="Fatima Pillosu" userId="a6295d4dc9e22643" providerId="LiveId" clId="{9EEC3235-DB20-4327-8C38-7C09ED2FC0E9}" dt="2021-02-15T10:17:08.310" v="1444" actId="21"/>
+          <ac:spMkLst>
+            <pc:docMk/>
+            <pc:sldMk cId="2969362105" sldId="256"/>
+            <ac:spMk id="471" creationId="{C4E711C0-194D-40B8-930F-D98FB7AA7C5B}"/>
+          </ac:spMkLst>
+        </pc:spChg>
+        <pc:spChg chg="del mod">
+          <ac:chgData name="Fatima Pillosu" userId="a6295d4dc9e22643" providerId="LiveId" clId="{9EEC3235-DB20-4327-8C38-7C09ED2FC0E9}" dt="2021-02-15T10:17:08.310" v="1444" actId="21"/>
+          <ac:spMkLst>
+            <pc:docMk/>
+            <pc:sldMk cId="2969362105" sldId="256"/>
+            <ac:spMk id="472" creationId="{1119BC35-51E7-4626-B6ED-4897A9F600B0}"/>
+          </ac:spMkLst>
+        </pc:spChg>
+        <pc:spChg chg="del mod">
+          <ac:chgData name="Fatima Pillosu" userId="a6295d4dc9e22643" providerId="LiveId" clId="{9EEC3235-DB20-4327-8C38-7C09ED2FC0E9}" dt="2021-02-15T10:17:08.310" v="1444" actId="21"/>
+          <ac:spMkLst>
+            <pc:docMk/>
+            <pc:sldMk cId="2969362105" sldId="256"/>
+            <ac:spMk id="474" creationId="{A19F4E61-1A10-4150-8AD7-ED10EF1781B4}"/>
+          </ac:spMkLst>
+        </pc:spChg>
+        <pc:spChg chg="del mod">
+          <ac:chgData name="Fatima Pillosu" userId="a6295d4dc9e22643" providerId="LiveId" clId="{9EEC3235-DB20-4327-8C38-7C09ED2FC0E9}" dt="2021-02-15T10:17:08.310" v="1444" actId="21"/>
+          <ac:spMkLst>
+            <pc:docMk/>
+            <pc:sldMk cId="2969362105" sldId="256"/>
+            <ac:spMk id="475" creationId="{4D8F7A0B-EC7F-4F99-9928-2825185793A5}"/>
+          </ac:spMkLst>
+        </pc:spChg>
+        <pc:spChg chg="del mod">
+          <ac:chgData name="Fatima Pillosu" userId="a6295d4dc9e22643" providerId="LiveId" clId="{9EEC3235-DB20-4327-8C38-7C09ED2FC0E9}" dt="2021-02-15T10:17:08.310" v="1444" actId="21"/>
+          <ac:spMkLst>
+            <pc:docMk/>
+            <pc:sldMk cId="2969362105" sldId="256"/>
+            <ac:spMk id="478" creationId="{9093A179-0643-4200-BC81-1F92BAEC0D6D}"/>
+          </ac:spMkLst>
+        </pc:spChg>
+        <pc:spChg chg="del mod">
+          <ac:chgData name="Fatima Pillosu" userId="a6295d4dc9e22643" providerId="LiveId" clId="{9EEC3235-DB20-4327-8C38-7C09ED2FC0E9}" dt="2021-02-15T10:17:08.310" v="1444" actId="21"/>
+          <ac:spMkLst>
+            <pc:docMk/>
+            <pc:sldMk cId="2969362105" sldId="256"/>
+            <ac:spMk id="482" creationId="{1BA5B42F-57FF-4AF9-95DA-7475D36127FA}"/>
+          </ac:spMkLst>
+        </pc:spChg>
+        <pc:spChg chg="del mod">
+          <ac:chgData name="Fatima Pillosu" userId="a6295d4dc9e22643" providerId="LiveId" clId="{9EEC3235-DB20-4327-8C38-7C09ED2FC0E9}" dt="2021-02-15T10:17:08.310" v="1444" actId="21"/>
+          <ac:spMkLst>
+            <pc:docMk/>
+            <pc:sldMk cId="2969362105" sldId="256"/>
+            <ac:spMk id="484" creationId="{B28BE4E2-67A1-4538-9540-7C2B4B84B733}"/>
+          </ac:spMkLst>
+        </pc:spChg>
+        <pc:spChg chg="del">
+          <ac:chgData name="Fatima Pillosu" userId="a6295d4dc9e22643" providerId="LiveId" clId="{9EEC3235-DB20-4327-8C38-7C09ED2FC0E9}" dt="2021-02-15T09:32:42.652" v="0" actId="478"/>
+          <ac:spMkLst>
+            <pc:docMk/>
+            <pc:sldMk cId="2969362105" sldId="256"/>
+            <ac:spMk id="485" creationId="{B4A68F6B-316B-4B6F-B4B8-F1475E887874}"/>
+          </ac:spMkLst>
+        </pc:spChg>
+        <pc:spChg chg="del">
+          <ac:chgData name="Fatima Pillosu" userId="a6295d4dc9e22643" providerId="LiveId" clId="{9EEC3235-DB20-4327-8C38-7C09ED2FC0E9}" dt="2021-02-15T09:32:45.320" v="1" actId="478"/>
+          <ac:spMkLst>
+            <pc:docMk/>
+            <pc:sldMk cId="2969362105" sldId="256"/>
+            <ac:spMk id="486" creationId="{C5EA621A-1ABE-4A5E-A0AA-81CE869A521E}"/>
+          </ac:spMkLst>
+        </pc:spChg>
+        <pc:spChg chg="del mod">
+          <ac:chgData name="Fatima Pillosu" userId="a6295d4dc9e22643" providerId="LiveId" clId="{9EEC3235-DB20-4327-8C38-7C09ED2FC0E9}" dt="2021-02-15T10:17:08.310" v="1444" actId="21"/>
+          <ac:spMkLst>
+            <pc:docMk/>
+            <pc:sldMk cId="2969362105" sldId="256"/>
+            <ac:spMk id="487" creationId="{B76A406E-8FD9-481E-A564-E98C5B9F7752}"/>
+          </ac:spMkLst>
+        </pc:spChg>
+        <pc:spChg chg="del mod">
+          <ac:chgData name="Fatima Pillosu" userId="a6295d4dc9e22643" providerId="LiveId" clId="{9EEC3235-DB20-4327-8C38-7C09ED2FC0E9}" dt="2021-02-15T10:17:08.310" v="1444" actId="21"/>
+          <ac:spMkLst>
+            <pc:docMk/>
+            <pc:sldMk cId="2969362105" sldId="256"/>
+            <ac:spMk id="489" creationId="{B52029EA-D598-4E53-B992-ABA34CDA8998}"/>
+          </ac:spMkLst>
+        </pc:spChg>
+        <pc:spChg chg="del mod">
+          <ac:chgData name="Fatima Pillosu" userId="a6295d4dc9e22643" providerId="LiveId" clId="{9EEC3235-DB20-4327-8C38-7C09ED2FC0E9}" dt="2021-02-15T10:17:08.310" v="1444" actId="21"/>
+          <ac:spMkLst>
+            <pc:docMk/>
+            <pc:sldMk cId="2969362105" sldId="256"/>
+            <ac:spMk id="492" creationId="{771B083D-A159-49F5-949C-2E754AEFC286}"/>
+          </ac:spMkLst>
+        </pc:spChg>
+        <pc:spChg chg="del mod ord">
+          <ac:chgData name="Fatima Pillosu" userId="a6295d4dc9e22643" providerId="LiveId" clId="{9EEC3235-DB20-4327-8C38-7C09ED2FC0E9}" dt="2021-02-15T10:17:08.310" v="1444" actId="21"/>
+          <ac:spMkLst>
+            <pc:docMk/>
+            <pc:sldMk cId="2969362105" sldId="256"/>
+            <ac:spMk id="493" creationId="{F7362386-B987-4456-915F-1623B14D210E}"/>
+          </ac:spMkLst>
+        </pc:spChg>
+        <pc:spChg chg="del mod">
+          <ac:chgData name="Fatima Pillosu" userId="a6295d4dc9e22643" providerId="LiveId" clId="{9EEC3235-DB20-4327-8C38-7C09ED2FC0E9}" dt="2021-02-15T10:00:01.083" v="1034" actId="478"/>
+          <ac:spMkLst>
+            <pc:docMk/>
+            <pc:sldMk cId="2969362105" sldId="256"/>
+            <ac:spMk id="495" creationId="{5A0C0298-8DAC-4D51-B7D0-CFAAEA98CC6C}"/>
+          </ac:spMkLst>
+        </pc:spChg>
+        <pc:spChg chg="del mod">
+          <ac:chgData name="Fatima Pillosu" userId="a6295d4dc9e22643" providerId="LiveId" clId="{9EEC3235-DB20-4327-8C38-7C09ED2FC0E9}" dt="2021-02-15T10:17:08.310" v="1444" actId="21"/>
+          <ac:spMkLst>
+            <pc:docMk/>
+            <pc:sldMk cId="2969362105" sldId="256"/>
+            <ac:spMk id="497" creationId="{17275D91-855A-44CA-B216-D400EFB231F3}"/>
+          </ac:spMkLst>
+        </pc:spChg>
+        <pc:spChg chg="del mod">
+          <ac:chgData name="Fatima Pillosu" userId="a6295d4dc9e22643" providerId="LiveId" clId="{9EEC3235-DB20-4327-8C38-7C09ED2FC0E9}" dt="2021-02-15T10:17:08.310" v="1444" actId="21"/>
+          <ac:spMkLst>
+            <pc:docMk/>
+            <pc:sldMk cId="2969362105" sldId="256"/>
+            <ac:spMk id="498" creationId="{ED8A156E-BA61-4013-B500-A30E690539CA}"/>
+          </ac:spMkLst>
+        </pc:spChg>
+        <pc:spChg chg="del mod">
+          <ac:chgData name="Fatima Pillosu" userId="a6295d4dc9e22643" providerId="LiveId" clId="{9EEC3235-DB20-4327-8C38-7C09ED2FC0E9}" dt="2021-02-15T10:17:08.310" v="1444" actId="21"/>
+          <ac:spMkLst>
+            <pc:docMk/>
+            <pc:sldMk cId="2969362105" sldId="256"/>
+            <ac:spMk id="499" creationId="{33BA6D74-B854-4FAC-9490-294744848051}"/>
+          </ac:spMkLst>
+        </pc:spChg>
+        <pc:spChg chg="del mod">
+          <ac:chgData name="Fatima Pillosu" userId="a6295d4dc9e22643" providerId="LiveId" clId="{9EEC3235-DB20-4327-8C38-7C09ED2FC0E9}" dt="2021-02-15T10:17:08.310" v="1444" actId="21"/>
+          <ac:spMkLst>
+            <pc:docMk/>
+            <pc:sldMk cId="2969362105" sldId="256"/>
+            <ac:spMk id="500" creationId="{2AD6411D-2E8F-4679-B775-AB36E7CC34CF}"/>
+          </ac:spMkLst>
+        </pc:spChg>
+        <pc:spChg chg="del mod">
+          <ac:chgData name="Fatima Pillosu" userId="a6295d4dc9e22643" providerId="LiveId" clId="{9EEC3235-DB20-4327-8C38-7C09ED2FC0E9}" dt="2021-02-15T10:17:08.310" v="1444" actId="21"/>
+          <ac:spMkLst>
+            <pc:docMk/>
+            <pc:sldMk cId="2969362105" sldId="256"/>
+            <ac:spMk id="501" creationId="{C1A1EB64-361E-405B-B0C2-B191926B6DB4}"/>
+          </ac:spMkLst>
+        </pc:spChg>
+        <pc:spChg chg="del mod">
+          <ac:chgData name="Fatima Pillosu" userId="a6295d4dc9e22643" providerId="LiveId" clId="{9EEC3235-DB20-4327-8C38-7C09ED2FC0E9}" dt="2021-02-15T10:17:08.310" v="1444" actId="21"/>
+          <ac:spMkLst>
+            <pc:docMk/>
+            <pc:sldMk cId="2969362105" sldId="256"/>
+            <ac:spMk id="502" creationId="{73D9DAE7-09B1-4B43-A644-EEACF9A45090}"/>
+          </ac:spMkLst>
+        </pc:spChg>
+        <pc:spChg chg="del">
+          <ac:chgData name="Fatima Pillosu" userId="a6295d4dc9e22643" providerId="LiveId" clId="{9EEC3235-DB20-4327-8C38-7C09ED2FC0E9}" dt="2021-02-15T09:32:42.652" v="0" actId="478"/>
+          <ac:spMkLst>
+            <pc:docMk/>
+            <pc:sldMk cId="2969362105" sldId="256"/>
+            <ac:spMk id="506" creationId="{4F4C3D15-1D32-42F1-BB42-269A2A8C309A}"/>
+          </ac:spMkLst>
+        </pc:spChg>
+        <pc:spChg chg="del mod">
+          <ac:chgData name="Fatima Pillosu" userId="a6295d4dc9e22643" providerId="LiveId" clId="{9EEC3235-DB20-4327-8C38-7C09ED2FC0E9}" dt="2021-02-15T10:17:08.310" v="1444" actId="21"/>
+          <ac:spMkLst>
+            <pc:docMk/>
+            <pc:sldMk cId="2969362105" sldId="256"/>
+            <ac:spMk id="507" creationId="{109B0D16-3A89-4EAE-AD28-62971053DFB3}"/>
+          </ac:spMkLst>
+        </pc:spChg>
+        <pc:spChg chg="del mod">
+          <ac:chgData name="Fatima Pillosu" userId="a6295d4dc9e22643" providerId="LiveId" clId="{9EEC3235-DB20-4327-8C38-7C09ED2FC0E9}" dt="2021-02-15T09:58:32.210" v="1022" actId="478"/>
+          <ac:spMkLst>
+            <pc:docMk/>
+            <pc:sldMk cId="2969362105" sldId="256"/>
+            <ac:spMk id="508" creationId="{4E6C7F05-8A95-4CFE-9C21-69F6F17D8894}"/>
+          </ac:spMkLst>
+        </pc:spChg>
+        <pc:spChg chg="del mod">
+          <ac:chgData name="Fatima Pillosu" userId="a6295d4dc9e22643" providerId="LiveId" clId="{9EEC3235-DB20-4327-8C38-7C09ED2FC0E9}" dt="2021-02-15T10:05:32.523" v="1197" actId="478"/>
+          <ac:spMkLst>
+            <pc:docMk/>
+            <pc:sldMk cId="2969362105" sldId="256"/>
+            <ac:spMk id="509" creationId="{2E254674-B4A1-45B3-9ADE-F4EB5E3E751D}"/>
+          </ac:spMkLst>
+        </pc:spChg>
+        <pc:spChg chg="del mod">
+          <ac:chgData name="Fatima Pillosu" userId="a6295d4dc9e22643" providerId="LiveId" clId="{9EEC3235-DB20-4327-8C38-7C09ED2FC0E9}" dt="2021-02-15T10:06:55.578" v="1227" actId="478"/>
+          <ac:spMkLst>
+            <pc:docMk/>
+            <pc:sldMk cId="2969362105" sldId="256"/>
+            <ac:spMk id="510" creationId="{4616446E-1252-4FB9-B48E-F1D60884A883}"/>
+          </ac:spMkLst>
+        </pc:spChg>
+        <pc:spChg chg="del mod">
+          <ac:chgData name="Fatima Pillosu" userId="a6295d4dc9e22643" providerId="LiveId" clId="{9EEC3235-DB20-4327-8C38-7C09ED2FC0E9}" dt="2021-02-15T10:08:11.754" v="1280" actId="478"/>
+          <ac:spMkLst>
+            <pc:docMk/>
+            <pc:sldMk cId="2969362105" sldId="256"/>
+            <ac:spMk id="512" creationId="{4AB6B2D2-54F4-4460-89DD-70C988F84666}"/>
+          </ac:spMkLst>
+        </pc:spChg>
+        <pc:spChg chg="del mod">
+          <ac:chgData name="Fatima Pillosu" userId="a6295d4dc9e22643" providerId="LiveId" clId="{9EEC3235-DB20-4327-8C38-7C09ED2FC0E9}" dt="2021-02-15T10:17:08.310" v="1444" actId="21"/>
+          <ac:spMkLst>
+            <pc:docMk/>
+            <pc:sldMk cId="2969362105" sldId="256"/>
+            <ac:spMk id="513" creationId="{0821C3C3-DAFA-4D1C-BDA4-9E18E9B3E9F0}"/>
+          </ac:spMkLst>
+        </pc:spChg>
+        <pc:spChg chg="del">
+          <ac:chgData name="Fatima Pillosu" userId="a6295d4dc9e22643" providerId="LiveId" clId="{9EEC3235-DB20-4327-8C38-7C09ED2FC0E9}" dt="2021-02-15T09:32:42.652" v="0" actId="478"/>
+          <ac:spMkLst>
+            <pc:docMk/>
+            <pc:sldMk cId="2969362105" sldId="256"/>
+            <ac:spMk id="514" creationId="{D9E05BE6-D584-4905-A812-82A298D32D4C}"/>
+          </ac:spMkLst>
+        </pc:spChg>
+        <pc:spChg chg="del mod">
+          <ac:chgData name="Fatima Pillosu" userId="a6295d4dc9e22643" providerId="LiveId" clId="{9EEC3235-DB20-4327-8C38-7C09ED2FC0E9}" dt="2021-02-15T10:17:08.310" v="1444" actId="21"/>
+          <ac:spMkLst>
+            <pc:docMk/>
+            <pc:sldMk cId="2969362105" sldId="256"/>
+            <ac:spMk id="515" creationId="{215634C7-49E3-4904-8006-4A113FE8E177}"/>
+          </ac:spMkLst>
+        </pc:spChg>
+        <pc:spChg chg="del mod">
+          <ac:chgData name="Fatima Pillosu" userId="a6295d4dc9e22643" providerId="LiveId" clId="{9EEC3235-DB20-4327-8C38-7C09ED2FC0E9}" dt="2021-02-15T10:17:08.310" v="1444" actId="21"/>
+          <ac:spMkLst>
+            <pc:docMk/>
+            <pc:sldMk cId="2969362105" sldId="256"/>
+            <ac:spMk id="516" creationId="{978FF368-6649-4BA9-B979-B1BB24985335}"/>
+          </ac:spMkLst>
+        </pc:spChg>
+        <pc:spChg chg="del">
+          <ac:chgData name="Fatima Pillosu" userId="a6295d4dc9e22643" providerId="LiveId" clId="{9EEC3235-DB20-4327-8C38-7C09ED2FC0E9}" dt="2021-02-15T09:32:42.652" v="0" actId="478"/>
+          <ac:spMkLst>
+            <pc:docMk/>
+            <pc:sldMk cId="2969362105" sldId="256"/>
+            <ac:spMk id="517" creationId="{194F20A8-7DDE-430F-8102-A24011A14F5E}"/>
+          </ac:spMkLst>
+        </pc:spChg>
+        <pc:spChg chg="del mod">
+          <ac:chgData name="Fatima Pillosu" userId="a6295d4dc9e22643" providerId="LiveId" clId="{9EEC3235-DB20-4327-8C38-7C09ED2FC0E9}" dt="2021-02-15T10:17:08.310" v="1444" actId="21"/>
+          <ac:spMkLst>
+            <pc:docMk/>
+            <pc:sldMk cId="2969362105" sldId="256"/>
+            <ac:spMk id="518" creationId="{FFF49690-6F58-48A3-84F8-99E0E2A5104D}"/>
+          </ac:spMkLst>
+        </pc:spChg>
+        <pc:spChg chg="del mod">
+          <ac:chgData name="Fatima Pillosu" userId="a6295d4dc9e22643" providerId="LiveId" clId="{9EEC3235-DB20-4327-8C38-7C09ED2FC0E9}" dt="2021-02-15T10:17:08.310" v="1444" actId="21"/>
+          <ac:spMkLst>
+            <pc:docMk/>
+            <pc:sldMk cId="2969362105" sldId="256"/>
+            <ac:spMk id="519" creationId="{3A70BCB8-E7FC-4473-B0A0-144B170FD542}"/>
+          </ac:spMkLst>
+        </pc:spChg>
+        <pc:spChg chg="del mod">
+          <ac:chgData name="Fatima Pillosu" userId="a6295d4dc9e22643" providerId="LiveId" clId="{9EEC3235-DB20-4327-8C38-7C09ED2FC0E9}" dt="2021-02-15T10:17:08.310" v="1444" actId="21"/>
+          <ac:spMkLst>
+            <pc:docMk/>
+            <pc:sldMk cId="2969362105" sldId="256"/>
+            <ac:spMk id="520" creationId="{8DC48824-566F-4170-831A-237A0FD72713}"/>
+          </ac:spMkLst>
+        </pc:spChg>
+        <pc:spChg chg="del mod">
+          <ac:chgData name="Fatima Pillosu" userId="a6295d4dc9e22643" providerId="LiveId" clId="{9EEC3235-DB20-4327-8C38-7C09ED2FC0E9}" dt="2021-02-15T10:17:08.310" v="1444" actId="21"/>
+          <ac:spMkLst>
+            <pc:docMk/>
+            <pc:sldMk cId="2969362105" sldId="256"/>
+            <ac:spMk id="521" creationId="{8F34D7DC-F292-46CA-A3EF-4D11C8740841}"/>
+          </ac:spMkLst>
+        </pc:spChg>
+        <pc:cxnChg chg="add del mod">
+          <ac:chgData name="Fatima Pillosu" userId="a6295d4dc9e22643" providerId="LiveId" clId="{9EEC3235-DB20-4327-8C38-7C09ED2FC0E9}" dt="2021-02-15T10:17:06.096" v="1443" actId="478"/>
+          <ac:cxnSpMkLst>
+            <pc:docMk/>
+            <pc:sldMk cId="2969362105" sldId="256"/>
+            <ac:cxnSpMk id="56" creationId="{210D666A-F4BE-4443-9995-68BAC1DC14EB}"/>
+          </ac:cxnSpMkLst>
+        </pc:cxnChg>
+        <pc:cxnChg chg="add del mod">
+          <ac:chgData name="Fatima Pillosu" userId="a6295d4dc9e22643" providerId="LiveId" clId="{9EEC3235-DB20-4327-8C38-7C09ED2FC0E9}" dt="2021-02-15T10:17:08.310" v="1444" actId="21"/>
+          <ac:cxnSpMkLst>
+            <pc:docMk/>
+            <pc:sldMk cId="2969362105" sldId="256"/>
+            <ac:cxnSpMk id="62" creationId="{E8F92C64-AB31-4C05-807F-A55BBC843674}"/>
+          </ac:cxnSpMkLst>
+        </pc:cxnChg>
+        <pc:cxnChg chg="add del mod">
+          <ac:chgData name="Fatima Pillosu" userId="a6295d4dc9e22643" providerId="LiveId" clId="{9EEC3235-DB20-4327-8C38-7C09ED2FC0E9}" dt="2021-02-15T10:17:08.310" v="1444" actId="21"/>
+          <ac:cxnSpMkLst>
+            <pc:docMk/>
+            <pc:sldMk cId="2969362105" sldId="256"/>
+            <ac:cxnSpMk id="70" creationId="{48BB5209-24DA-4B08-A1E9-53BE7401B2AA}"/>
+          </ac:cxnSpMkLst>
+        </pc:cxnChg>
+        <pc:cxnChg chg="add mod">
+          <ac:chgData name="Fatima Pillosu" userId="a6295d4dc9e22643" providerId="LiveId" clId="{9EEC3235-DB20-4327-8C38-7C09ED2FC0E9}" dt="2021-02-15T10:17:36.947" v="1449" actId="1035"/>
+          <ac:cxnSpMkLst>
+            <pc:docMk/>
+            <pc:sldMk cId="2969362105" sldId="256"/>
+            <ac:cxnSpMk id="124" creationId="{779677BE-F1CA-4B29-924A-C7DA79280957}"/>
+          </ac:cxnSpMkLst>
+        </pc:cxnChg>
+        <pc:cxnChg chg="add mod">
+          <ac:chgData name="Fatima Pillosu" userId="a6295d4dc9e22643" providerId="LiveId" clId="{9EEC3235-DB20-4327-8C38-7C09ED2FC0E9}" dt="2021-02-15T10:17:36.947" v="1449" actId="1035"/>
+          <ac:cxnSpMkLst>
+            <pc:docMk/>
+            <pc:sldMk cId="2969362105" sldId="256"/>
+            <ac:cxnSpMk id="127" creationId="{A0ACE071-FEF5-4EDD-B496-2708F7773D1F}"/>
+          </ac:cxnSpMkLst>
+        </pc:cxnChg>
+        <pc:cxnChg chg="add mod">
+          <ac:chgData name="Fatima Pillosu" userId="a6295d4dc9e22643" providerId="LiveId" clId="{9EEC3235-DB20-4327-8C38-7C09ED2FC0E9}" dt="2021-02-15T10:17:36.947" v="1449" actId="1035"/>
+          <ac:cxnSpMkLst>
+            <pc:docMk/>
+            <pc:sldMk cId="2969362105" sldId="256"/>
+            <ac:cxnSpMk id="130" creationId="{8D749B95-1A18-4FB9-9607-1B45BA525832}"/>
+          </ac:cxnSpMkLst>
+        </pc:cxnChg>
+        <pc:cxnChg chg="add mod">
+          <ac:chgData name="Fatima Pillosu" userId="a6295d4dc9e22643" providerId="LiveId" clId="{9EEC3235-DB20-4327-8C38-7C09ED2FC0E9}" dt="2021-02-15T10:17:36.947" v="1449" actId="1035"/>
+          <ac:cxnSpMkLst>
+            <pc:docMk/>
+            <pc:sldMk cId="2969362105" sldId="256"/>
+            <ac:cxnSpMk id="131" creationId="{BB28CEDE-5F36-4E77-B6B6-C592E749D0F0}"/>
+          </ac:cxnSpMkLst>
+        </pc:cxnChg>
+        <pc:cxnChg chg="add mod">
+          <ac:chgData name="Fatima Pillosu" userId="a6295d4dc9e22643" providerId="LiveId" clId="{9EEC3235-DB20-4327-8C38-7C09ED2FC0E9}" dt="2021-02-15T10:17:36.947" v="1449" actId="1035"/>
+          <ac:cxnSpMkLst>
+            <pc:docMk/>
+            <pc:sldMk cId="2969362105" sldId="256"/>
+            <ac:cxnSpMk id="133" creationId="{61A5576A-A84F-47D4-8F98-179D82A4EB18}"/>
+          </ac:cxnSpMkLst>
+        </pc:cxnChg>
+        <pc:cxnChg chg="add mod">
+          <ac:chgData name="Fatima Pillosu" userId="a6295d4dc9e22643" providerId="LiveId" clId="{9EEC3235-DB20-4327-8C38-7C09ED2FC0E9}" dt="2021-02-15T10:17:36.947" v="1449" actId="1035"/>
+          <ac:cxnSpMkLst>
+            <pc:docMk/>
+            <pc:sldMk cId="2969362105" sldId="256"/>
+            <ac:cxnSpMk id="134" creationId="{D70564B0-29DB-4AB5-BEC0-71F5045299D6}"/>
+          </ac:cxnSpMkLst>
+        </pc:cxnChg>
+        <pc:cxnChg chg="add mod">
+          <ac:chgData name="Fatima Pillosu" userId="a6295d4dc9e22643" providerId="LiveId" clId="{9EEC3235-DB20-4327-8C38-7C09ED2FC0E9}" dt="2021-02-15T10:17:36.947" v="1449" actId="1035"/>
+          <ac:cxnSpMkLst>
+            <pc:docMk/>
+            <pc:sldMk cId="2969362105" sldId="256"/>
+            <ac:cxnSpMk id="135" creationId="{D77F8E08-D9F1-43C5-A42E-AAA8F781242D}"/>
+          </ac:cxnSpMkLst>
+        </pc:cxnChg>
+        <pc:cxnChg chg="add mod">
+          <ac:chgData name="Fatima Pillosu" userId="a6295d4dc9e22643" providerId="LiveId" clId="{9EEC3235-DB20-4327-8C38-7C09ED2FC0E9}" dt="2021-02-15T10:17:36.947" v="1449" actId="1035"/>
+          <ac:cxnSpMkLst>
+            <pc:docMk/>
+            <pc:sldMk cId="2969362105" sldId="256"/>
+            <ac:cxnSpMk id="137" creationId="{CADFB0E7-6D8C-4035-9DD4-6196FBF02B45}"/>
+          </ac:cxnSpMkLst>
+        </pc:cxnChg>
+        <pc:cxnChg chg="add mod">
+          <ac:chgData name="Fatima Pillosu" userId="a6295d4dc9e22643" providerId="LiveId" clId="{9EEC3235-DB20-4327-8C38-7C09ED2FC0E9}" dt="2021-02-15T10:17:36.947" v="1449" actId="1035"/>
+          <ac:cxnSpMkLst>
+            <pc:docMk/>
+            <pc:sldMk cId="2969362105" sldId="256"/>
+            <ac:cxnSpMk id="140" creationId="{77025495-4DB6-4AA0-AC52-619158943D75}"/>
+          </ac:cxnSpMkLst>
+        </pc:cxnChg>
+        <pc:cxnChg chg="add mod">
+          <ac:chgData name="Fatima Pillosu" userId="a6295d4dc9e22643" providerId="LiveId" clId="{9EEC3235-DB20-4327-8C38-7C09ED2FC0E9}" dt="2021-02-15T10:17:36.947" v="1449" actId="1035"/>
+          <ac:cxnSpMkLst>
+            <pc:docMk/>
+            <pc:sldMk cId="2969362105" sldId="256"/>
+            <ac:cxnSpMk id="142" creationId="{BA749652-883D-479B-B132-F405B264D034}"/>
+          </ac:cxnSpMkLst>
+        </pc:cxnChg>
+        <pc:cxnChg chg="add mod">
+          <ac:chgData name="Fatima Pillosu" userId="a6295d4dc9e22643" providerId="LiveId" clId="{9EEC3235-DB20-4327-8C38-7C09ED2FC0E9}" dt="2021-02-15T10:17:36.947" v="1449" actId="1035"/>
+          <ac:cxnSpMkLst>
+            <pc:docMk/>
+            <pc:sldMk cId="2969362105" sldId="256"/>
+            <ac:cxnSpMk id="143" creationId="{F4349C01-53B4-45C7-B08A-A6FB18E85FAC}"/>
+          </ac:cxnSpMkLst>
+        </pc:cxnChg>
+        <pc:cxnChg chg="add mod">
+          <ac:chgData name="Fatima Pillosu" userId="a6295d4dc9e22643" providerId="LiveId" clId="{9EEC3235-DB20-4327-8C38-7C09ED2FC0E9}" dt="2021-02-15T10:17:36.947" v="1449" actId="1035"/>
+          <ac:cxnSpMkLst>
+            <pc:docMk/>
+            <pc:sldMk cId="2969362105" sldId="256"/>
+            <ac:cxnSpMk id="145" creationId="{C7B89DC0-E435-4097-9C9D-A5B35836C670}"/>
+          </ac:cxnSpMkLst>
+        </pc:cxnChg>
+        <pc:cxnChg chg="add mod">
+          <ac:chgData name="Fatima Pillosu" userId="a6295d4dc9e22643" providerId="LiveId" clId="{9EEC3235-DB20-4327-8C38-7C09ED2FC0E9}" dt="2021-02-15T10:17:36.947" v="1449" actId="1035"/>
+          <ac:cxnSpMkLst>
+            <pc:docMk/>
+            <pc:sldMk cId="2969362105" sldId="256"/>
+            <ac:cxnSpMk id="146" creationId="{E187B116-65BB-4475-A104-04D408D24A34}"/>
+          </ac:cxnSpMkLst>
+        </pc:cxnChg>
+        <pc:cxnChg chg="add mod">
+          <ac:chgData name="Fatima Pillosu" userId="a6295d4dc9e22643" providerId="LiveId" clId="{9EEC3235-DB20-4327-8C38-7C09ED2FC0E9}" dt="2021-02-15T10:17:36.947" v="1449" actId="1035"/>
+          <ac:cxnSpMkLst>
+            <pc:docMk/>
+            <pc:sldMk cId="2969362105" sldId="256"/>
+            <ac:cxnSpMk id="153" creationId="{51E6B9BE-8FA3-46A4-B642-F4D7649A0C43}"/>
+          </ac:cxnSpMkLst>
+        </pc:cxnChg>
+        <pc:cxnChg chg="add mod">
+          <ac:chgData name="Fatima Pillosu" userId="a6295d4dc9e22643" providerId="LiveId" clId="{9EEC3235-DB20-4327-8C38-7C09ED2FC0E9}" dt="2021-02-15T10:17:36.947" v="1449" actId="1035"/>
+          <ac:cxnSpMkLst>
+            <pc:docMk/>
+            <pc:sldMk cId="2969362105" sldId="256"/>
+            <ac:cxnSpMk id="154" creationId="{A34FDA89-9AF1-44B9-873D-3C42AB161AD1}"/>
+          </ac:cxnSpMkLst>
+        </pc:cxnChg>
+        <pc:cxnChg chg="add mod">
+          <ac:chgData name="Fatima Pillosu" userId="a6295d4dc9e22643" providerId="LiveId" clId="{9EEC3235-DB20-4327-8C38-7C09ED2FC0E9}" dt="2021-02-15T10:17:36.947" v="1449" actId="1035"/>
+          <ac:cxnSpMkLst>
+            <pc:docMk/>
+            <pc:sldMk cId="2969362105" sldId="256"/>
+            <ac:cxnSpMk id="155" creationId="{C5A0C94A-0F1D-44A5-9AD6-FE947E84859A}"/>
+          </ac:cxnSpMkLst>
+        </pc:cxnChg>
+        <pc:cxnChg chg="add mod">
+          <ac:chgData name="Fatima Pillosu" userId="a6295d4dc9e22643" providerId="LiveId" clId="{9EEC3235-DB20-4327-8C38-7C09ED2FC0E9}" dt="2021-02-15T10:17:36.947" v="1449" actId="1035"/>
+          <ac:cxnSpMkLst>
+            <pc:docMk/>
+            <pc:sldMk cId="2969362105" sldId="256"/>
+            <ac:cxnSpMk id="165" creationId="{BACAAD4A-A471-4E41-B7D3-296E3F0FC88B}"/>
+          </ac:cxnSpMkLst>
+        </pc:cxnChg>
+        <pc:cxnChg chg="add mod">
+          <ac:chgData name="Fatima Pillosu" userId="a6295d4dc9e22643" providerId="LiveId" clId="{9EEC3235-DB20-4327-8C38-7C09ED2FC0E9}" dt="2021-02-15T10:17:36.947" v="1449" actId="1035"/>
+          <ac:cxnSpMkLst>
+            <pc:docMk/>
+            <pc:sldMk cId="2969362105" sldId="256"/>
+            <ac:cxnSpMk id="167" creationId="{3C5FF516-5F73-465A-8528-1C29A41FA446}"/>
+          </ac:cxnSpMkLst>
+        </pc:cxnChg>
+        <pc:cxnChg chg="del">
+          <ac:chgData name="Fatima Pillosu" userId="a6295d4dc9e22643" providerId="LiveId" clId="{9EEC3235-DB20-4327-8C38-7C09ED2FC0E9}" dt="2021-02-15T09:32:42.652" v="0" actId="478"/>
+          <ac:cxnSpMkLst>
+            <pc:docMk/>
+            <pc:sldMk cId="2969362105" sldId="256"/>
+            <ac:cxnSpMk id="464" creationId="{75691B4B-E77C-4796-BB8B-01D76FB6E5A2}"/>
+          </ac:cxnSpMkLst>
+        </pc:cxnChg>
+        <pc:cxnChg chg="del">
+          <ac:chgData name="Fatima Pillosu" userId="a6295d4dc9e22643" providerId="LiveId" clId="{9EEC3235-DB20-4327-8C38-7C09ED2FC0E9}" dt="2021-02-15T09:32:42.652" v="0" actId="478"/>
+          <ac:cxnSpMkLst>
+            <pc:docMk/>
+            <pc:sldMk cId="2969362105" sldId="256"/>
+            <ac:cxnSpMk id="466" creationId="{193E8651-F8C8-4303-8D98-83F9D0C48734}"/>
+          </ac:cxnSpMkLst>
+        </pc:cxnChg>
+        <pc:cxnChg chg="del">
+          <ac:chgData name="Fatima Pillosu" userId="a6295d4dc9e22643" providerId="LiveId" clId="{9EEC3235-DB20-4327-8C38-7C09ED2FC0E9}" dt="2021-02-15T09:32:42.652" v="0" actId="478"/>
+          <ac:cxnSpMkLst>
+            <pc:docMk/>
+            <pc:sldMk cId="2969362105" sldId="256"/>
+            <ac:cxnSpMk id="468" creationId="{9DD7E5C2-1609-468A-82D6-2A16EF983E36}"/>
+          </ac:cxnSpMkLst>
+        </pc:cxnChg>
+        <pc:cxnChg chg="del mod">
+          <ac:chgData name="Fatima Pillosu" userId="a6295d4dc9e22643" providerId="LiveId" clId="{9EEC3235-DB20-4327-8C38-7C09ED2FC0E9}" dt="2021-02-15T10:17:08.310" v="1444" actId="21"/>
+          <ac:cxnSpMkLst>
+            <pc:docMk/>
+            <pc:sldMk cId="2969362105" sldId="256"/>
+            <ac:cxnSpMk id="470" creationId="{1D912F61-18BF-45F1-8389-0ACC0EF66490}"/>
+          </ac:cxnSpMkLst>
+        </pc:cxnChg>
+        <pc:cxnChg chg="del mod">
+          <ac:chgData name="Fatima Pillosu" userId="a6295d4dc9e22643" providerId="LiveId" clId="{9EEC3235-DB20-4327-8C38-7C09ED2FC0E9}" dt="2021-02-15T10:17:08.310" v="1444" actId="21"/>
+          <ac:cxnSpMkLst>
+            <pc:docMk/>
+            <pc:sldMk cId="2969362105" sldId="256"/>
+            <ac:cxnSpMk id="473" creationId="{210E6C84-CEB0-4CEA-A919-26B184C4B491}"/>
+          </ac:cxnSpMkLst>
+        </pc:cxnChg>
+        <pc:cxnChg chg="del mod">
+          <ac:chgData name="Fatima Pillosu" userId="a6295d4dc9e22643" providerId="LiveId" clId="{9EEC3235-DB20-4327-8C38-7C09ED2FC0E9}" dt="2021-02-15T10:17:08.310" v="1444" actId="21"/>
+          <ac:cxnSpMkLst>
+            <pc:docMk/>
+            <pc:sldMk cId="2969362105" sldId="256"/>
+            <ac:cxnSpMk id="476" creationId="{38719470-206E-4A4E-BFE2-093C68FF3B57}"/>
+          </ac:cxnSpMkLst>
+        </pc:cxnChg>
+        <pc:cxnChg chg="del mod">
+          <ac:chgData name="Fatima Pillosu" userId="a6295d4dc9e22643" providerId="LiveId" clId="{9EEC3235-DB20-4327-8C38-7C09ED2FC0E9}" dt="2021-02-15T10:17:08.310" v="1444" actId="21"/>
+          <ac:cxnSpMkLst>
+            <pc:docMk/>
+            <pc:sldMk cId="2969362105" sldId="256"/>
+            <ac:cxnSpMk id="477" creationId="{A321CF49-6A0A-4932-85D5-5D87C6BE289E}"/>
+          </ac:cxnSpMkLst>
+        </pc:cxnChg>
+        <pc:cxnChg chg="del mod">
+          <ac:chgData name="Fatima Pillosu" userId="a6295d4dc9e22643" providerId="LiveId" clId="{9EEC3235-DB20-4327-8C38-7C09ED2FC0E9}" dt="2021-02-15T10:17:08.310" v="1444" actId="21"/>
+          <ac:cxnSpMkLst>
+            <pc:docMk/>
+            <pc:sldMk cId="2969362105" sldId="256"/>
+            <ac:cxnSpMk id="479" creationId="{12B7FDCF-F12E-41EF-8BB2-4C166479BE55}"/>
+          </ac:cxnSpMkLst>
+        </pc:cxnChg>
+        <pc:cxnChg chg="del mod">
+          <ac:chgData name="Fatima Pillosu" userId="a6295d4dc9e22643" providerId="LiveId" clId="{9EEC3235-DB20-4327-8C38-7C09ED2FC0E9}" dt="2021-02-15T10:17:08.310" v="1444" actId="21"/>
+          <ac:cxnSpMkLst>
+            <pc:docMk/>
+            <pc:sldMk cId="2969362105" sldId="256"/>
+            <ac:cxnSpMk id="480" creationId="{A16C58AA-44A1-4310-8E0C-8360307174A0}"/>
+          </ac:cxnSpMkLst>
+        </pc:cxnChg>
+        <pc:cxnChg chg="del mod">
+          <ac:chgData name="Fatima Pillosu" userId="a6295d4dc9e22643" providerId="LiveId" clId="{9EEC3235-DB20-4327-8C38-7C09ED2FC0E9}" dt="2021-02-15T10:17:08.310" v="1444" actId="21"/>
+          <ac:cxnSpMkLst>
+            <pc:docMk/>
+            <pc:sldMk cId="2969362105" sldId="256"/>
+            <ac:cxnSpMk id="481" creationId="{5F2AD006-A552-41E6-95B9-1636A153302D}"/>
+          </ac:cxnSpMkLst>
+        </pc:cxnChg>
+        <pc:cxnChg chg="del mod">
+          <ac:chgData name="Fatima Pillosu" userId="a6295d4dc9e22643" providerId="LiveId" clId="{9EEC3235-DB20-4327-8C38-7C09ED2FC0E9}" dt="2021-02-15T10:17:08.310" v="1444" actId="21"/>
+          <ac:cxnSpMkLst>
+            <pc:docMk/>
+            <pc:sldMk cId="2969362105" sldId="256"/>
+            <ac:cxnSpMk id="483" creationId="{5E81445C-631F-4E15-9AEE-5817B4B59DC0}"/>
+          </ac:cxnSpMkLst>
+        </pc:cxnChg>
+        <pc:cxnChg chg="del mod">
+          <ac:chgData name="Fatima Pillosu" userId="a6295d4dc9e22643" providerId="LiveId" clId="{9EEC3235-DB20-4327-8C38-7C09ED2FC0E9}" dt="2021-02-15T10:17:08.310" v="1444" actId="21"/>
+          <ac:cxnSpMkLst>
+            <pc:docMk/>
+            <pc:sldMk cId="2969362105" sldId="256"/>
+            <ac:cxnSpMk id="488" creationId="{25235E40-861D-42FD-9785-9DE68838D344}"/>
+          </ac:cxnSpMkLst>
+        </pc:cxnChg>
+        <pc:cxnChg chg="del mod">
+          <ac:chgData name="Fatima Pillosu" userId="a6295d4dc9e22643" providerId="LiveId" clId="{9EEC3235-DB20-4327-8C38-7C09ED2FC0E9}" dt="2021-02-15T10:17:08.310" v="1444" actId="21"/>
+          <ac:cxnSpMkLst>
+            <pc:docMk/>
+            <pc:sldMk cId="2969362105" sldId="256"/>
+            <ac:cxnSpMk id="490" creationId="{FD6CE3EE-599C-432B-BB56-85AB48FE0E2F}"/>
+          </ac:cxnSpMkLst>
+        </pc:cxnChg>
+        <pc:cxnChg chg="del mod">
+          <ac:chgData name="Fatima Pillosu" userId="a6295d4dc9e22643" providerId="LiveId" clId="{9EEC3235-DB20-4327-8C38-7C09ED2FC0E9}" dt="2021-02-15T10:17:08.310" v="1444" actId="21"/>
+          <ac:cxnSpMkLst>
+            <pc:docMk/>
+            <pc:sldMk cId="2969362105" sldId="256"/>
+            <ac:cxnSpMk id="491" creationId="{4BE0223C-F6BA-4CB4-9B36-41241FDC2F05}"/>
+          </ac:cxnSpMkLst>
+        </pc:cxnChg>
+        <pc:cxnChg chg="del mod">
+          <ac:chgData name="Fatima Pillosu" userId="a6295d4dc9e22643" providerId="LiveId" clId="{9EEC3235-DB20-4327-8C38-7C09ED2FC0E9}" dt="2021-02-15T10:17:08.310" v="1444" actId="21"/>
+          <ac:cxnSpMkLst>
+            <pc:docMk/>
+            <pc:sldMk cId="2969362105" sldId="256"/>
+            <ac:cxnSpMk id="494" creationId="{73BBB493-C094-48FA-B125-2AB5C2730907}"/>
+          </ac:cxnSpMkLst>
+        </pc:cxnChg>
+        <pc:cxnChg chg="del mod">
+          <ac:chgData name="Fatima Pillosu" userId="a6295d4dc9e22643" providerId="LiveId" clId="{9EEC3235-DB20-4327-8C38-7C09ED2FC0E9}" dt="2021-02-15T10:17:08.310" v="1444" actId="21"/>
+          <ac:cxnSpMkLst>
+            <pc:docMk/>
+            <pc:sldMk cId="2969362105" sldId="256"/>
+            <ac:cxnSpMk id="496" creationId="{4CC46B00-2108-45BE-9226-F9FE3AF77D13}"/>
+          </ac:cxnSpMkLst>
+        </pc:cxnChg>
+        <pc:cxnChg chg="del mod">
+          <ac:chgData name="Fatima Pillosu" userId="a6295d4dc9e22643" providerId="LiveId" clId="{9EEC3235-DB20-4327-8C38-7C09ED2FC0E9}" dt="2021-02-15T10:17:08.310" v="1444" actId="21"/>
+          <ac:cxnSpMkLst>
+            <pc:docMk/>
+            <pc:sldMk cId="2969362105" sldId="256"/>
+            <ac:cxnSpMk id="503" creationId="{447ADC49-DE8E-4391-AF95-6075F0AB9F1F}"/>
+          </ac:cxnSpMkLst>
+        </pc:cxnChg>
+        <pc:cxnChg chg="del mod">
+          <ac:chgData name="Fatima Pillosu" userId="a6295d4dc9e22643" providerId="LiveId" clId="{9EEC3235-DB20-4327-8C38-7C09ED2FC0E9}" dt="2021-02-15T10:17:08.310" v="1444" actId="21"/>
+          <ac:cxnSpMkLst>
+            <pc:docMk/>
+            <pc:sldMk cId="2969362105" sldId="256"/>
+            <ac:cxnSpMk id="504" creationId="{A483954F-3022-480B-9ED0-738FB42BFE1E}"/>
+          </ac:cxnSpMkLst>
+        </pc:cxnChg>
+        <pc:cxnChg chg="del mod">
+          <ac:chgData name="Fatima Pillosu" userId="a6295d4dc9e22643" providerId="LiveId" clId="{9EEC3235-DB20-4327-8C38-7C09ED2FC0E9}" dt="2021-02-15T10:17:08.310" v="1444" actId="21"/>
+          <ac:cxnSpMkLst>
+            <pc:docMk/>
+            <pc:sldMk cId="2969362105" sldId="256"/>
+            <ac:cxnSpMk id="505" creationId="{618F1C76-45AA-4CA8-8189-0B44E0940D55}"/>
+          </ac:cxnSpMkLst>
+        </pc:cxnChg>
+        <pc:cxnChg chg="del mod">
+          <ac:chgData name="Fatima Pillosu" userId="a6295d4dc9e22643" providerId="LiveId" clId="{9EEC3235-DB20-4327-8C38-7C09ED2FC0E9}" dt="2021-02-15T10:08:10.896" v="1279" actId="478"/>
+          <ac:cxnSpMkLst>
+            <pc:docMk/>
+            <pc:sldMk cId="2969362105" sldId="256"/>
+            <ac:cxnSpMk id="511" creationId="{D4395B70-F4DE-4B51-B3B6-5F2386026E0E}"/>
           </ac:cxnSpMkLst>
         </pc:cxnChg>
       </pc:sldChg>
@@ -9169,7 +10065,7 @@
           <a:p>
             <a:fld id="{316FE1D3-FB31-4194-964E-25DAFFD80F93}" type="datetimeFigureOut">
               <a:rPr lang="en-GB" smtClean="0"/>
-              <a:t>03/12/2020</a:t>
+              <a:t>15/02/2021</a:t>
             </a:fld>
             <a:endParaRPr lang="en-GB"/>
           </a:p>
@@ -9187,8 +10083,8 @@
         </p:nvSpPr>
         <p:spPr>
           <a:xfrm>
-            <a:off x="2568575" y="1143000"/>
-            <a:ext cx="1720850" cy="3086100"/>
+            <a:off x="2390775" y="1143000"/>
+            <a:ext cx="2076450" cy="3086100"/>
           </a:xfrm>
           <a:prstGeom prst="rect">
             <a:avLst/>
@@ -9343,8 +10239,8 @@
   </p:cSld>
   <p:clrMap bg1="lt1" tx1="dk1" bg2="lt2" tx2="dk2" accent1="accent1" accent2="accent2" accent3="accent3" accent4="accent4" accent5="accent5" accent6="accent6" hlink="hlink" folHlink="folHlink"/>
   <p:notesStyle>
-    <a:lvl1pPr marL="0" algn="l" defTabSz="887700" rtl="0" eaLnBrk="1" latinLnBrk="0" hangingPunct="1">
-      <a:defRPr sz="1165" kern="1200">
+    <a:lvl1pPr marL="0" algn="l" defTabSz="700573" rtl="0" eaLnBrk="1" latinLnBrk="0" hangingPunct="1">
+      <a:defRPr sz="919" kern="1200">
         <a:solidFill>
           <a:schemeClr val="tx1"/>
         </a:solidFill>
@@ -9353,8 +10249,8 @@
         <a:cs typeface="+mn-cs"/>
       </a:defRPr>
     </a:lvl1pPr>
-    <a:lvl2pPr marL="443850" algn="l" defTabSz="887700" rtl="0" eaLnBrk="1" latinLnBrk="0" hangingPunct="1">
-      <a:defRPr sz="1165" kern="1200">
+    <a:lvl2pPr marL="350286" algn="l" defTabSz="700573" rtl="0" eaLnBrk="1" latinLnBrk="0" hangingPunct="1">
+      <a:defRPr sz="919" kern="1200">
         <a:solidFill>
           <a:schemeClr val="tx1"/>
         </a:solidFill>
@@ -9363,8 +10259,8 @@
         <a:cs typeface="+mn-cs"/>
       </a:defRPr>
     </a:lvl2pPr>
-    <a:lvl3pPr marL="887700" algn="l" defTabSz="887700" rtl="0" eaLnBrk="1" latinLnBrk="0" hangingPunct="1">
-      <a:defRPr sz="1165" kern="1200">
+    <a:lvl3pPr marL="700573" algn="l" defTabSz="700573" rtl="0" eaLnBrk="1" latinLnBrk="0" hangingPunct="1">
+      <a:defRPr sz="919" kern="1200">
         <a:solidFill>
           <a:schemeClr val="tx1"/>
         </a:solidFill>
@@ -9373,8 +10269,8 @@
         <a:cs typeface="+mn-cs"/>
       </a:defRPr>
     </a:lvl3pPr>
-    <a:lvl4pPr marL="1331549" algn="l" defTabSz="887700" rtl="0" eaLnBrk="1" latinLnBrk="0" hangingPunct="1">
-      <a:defRPr sz="1165" kern="1200">
+    <a:lvl4pPr marL="1050858" algn="l" defTabSz="700573" rtl="0" eaLnBrk="1" latinLnBrk="0" hangingPunct="1">
+      <a:defRPr sz="919" kern="1200">
         <a:solidFill>
           <a:schemeClr val="tx1"/>
         </a:solidFill>
@@ -9383,8 +10279,8 @@
         <a:cs typeface="+mn-cs"/>
       </a:defRPr>
     </a:lvl4pPr>
-    <a:lvl5pPr marL="1775399" algn="l" defTabSz="887700" rtl="0" eaLnBrk="1" latinLnBrk="0" hangingPunct="1">
-      <a:defRPr sz="1165" kern="1200">
+    <a:lvl5pPr marL="1401145" algn="l" defTabSz="700573" rtl="0" eaLnBrk="1" latinLnBrk="0" hangingPunct="1">
+      <a:defRPr sz="919" kern="1200">
         <a:solidFill>
           <a:schemeClr val="tx1"/>
         </a:solidFill>
@@ -9393,8 +10289,8 @@
         <a:cs typeface="+mn-cs"/>
       </a:defRPr>
     </a:lvl5pPr>
-    <a:lvl6pPr marL="2219249" algn="l" defTabSz="887700" rtl="0" eaLnBrk="1" latinLnBrk="0" hangingPunct="1">
-      <a:defRPr sz="1165" kern="1200">
+    <a:lvl6pPr marL="1751431" algn="l" defTabSz="700573" rtl="0" eaLnBrk="1" latinLnBrk="0" hangingPunct="1">
+      <a:defRPr sz="919" kern="1200">
         <a:solidFill>
           <a:schemeClr val="tx1"/>
         </a:solidFill>
@@ -9403,8 +10299,8 @@
         <a:cs typeface="+mn-cs"/>
       </a:defRPr>
     </a:lvl6pPr>
-    <a:lvl7pPr marL="2663099" algn="l" defTabSz="887700" rtl="0" eaLnBrk="1" latinLnBrk="0" hangingPunct="1">
-      <a:defRPr sz="1165" kern="1200">
+    <a:lvl7pPr marL="2101718" algn="l" defTabSz="700573" rtl="0" eaLnBrk="1" latinLnBrk="0" hangingPunct="1">
+      <a:defRPr sz="919" kern="1200">
         <a:solidFill>
           <a:schemeClr val="tx1"/>
         </a:solidFill>
@@ -9413,8 +10309,8 @@
         <a:cs typeface="+mn-cs"/>
       </a:defRPr>
     </a:lvl7pPr>
-    <a:lvl8pPr marL="3106948" algn="l" defTabSz="887700" rtl="0" eaLnBrk="1" latinLnBrk="0" hangingPunct="1">
-      <a:defRPr sz="1165" kern="1200">
+    <a:lvl8pPr marL="2452003" algn="l" defTabSz="700573" rtl="0" eaLnBrk="1" latinLnBrk="0" hangingPunct="1">
+      <a:defRPr sz="919" kern="1200">
         <a:solidFill>
           <a:schemeClr val="tx1"/>
         </a:solidFill>
@@ -9423,8 +10319,8 @@
         <a:cs typeface="+mn-cs"/>
       </a:defRPr>
     </a:lvl8pPr>
-    <a:lvl9pPr marL="3550798" algn="l" defTabSz="887700" rtl="0" eaLnBrk="1" latinLnBrk="0" hangingPunct="1">
-      <a:defRPr sz="1165" kern="1200">
+    <a:lvl9pPr marL="2802290" algn="l" defTabSz="700573" rtl="0" eaLnBrk="1" latinLnBrk="0" hangingPunct="1">
+      <a:defRPr sz="919" kern="1200">
         <a:solidFill>
           <a:schemeClr val="tx1"/>
         </a:solidFill>
@@ -9466,8 +10362,8 @@
         </p:nvSpPr>
         <p:spPr>
           <a:xfrm>
-            <a:off x="2568575" y="1143000"/>
-            <a:ext cx="1720850" cy="3086100"/>
+            <a:off x="2390775" y="1143000"/>
+            <a:ext cx="2076450" cy="3086100"/>
           </a:xfrm>
         </p:spPr>
       </p:sp>
@@ -9555,15 +10451,15 @@
         </p:nvSpPr>
         <p:spPr>
           <a:xfrm>
-            <a:off x="288846" y="1131197"/>
-            <a:ext cx="3273584" cy="2406391"/>
+            <a:off x="256461" y="830601"/>
+            <a:ext cx="2906554" cy="1766935"/>
           </a:xfrm>
         </p:spPr>
         <p:txBody>
           <a:bodyPr anchor="b"/>
           <a:lstStyle>
             <a:lvl1pPr algn="ctr">
-              <a:defRPr sz="2527"/>
+              <a:defRPr sz="2244"/>
             </a:lvl1pPr>
           </a:lstStyle>
           <a:p>
@@ -9587,8 +10483,8 @@
         </p:nvSpPr>
         <p:spPr>
           <a:xfrm>
-            <a:off x="481410" y="3630388"/>
-            <a:ext cx="2888456" cy="1668793"/>
+            <a:off x="427435" y="2665675"/>
+            <a:ext cx="2564606" cy="1225341"/>
           </a:xfrm>
         </p:spPr>
         <p:txBody>
@@ -9596,39 +10492,39 @@
           <a:lstStyle>
             <a:lvl1pPr marL="0" indent="0" algn="ctr">
               <a:buNone/>
-              <a:defRPr sz="1011"/>
+              <a:defRPr sz="898"/>
             </a:lvl1pPr>
-            <a:lvl2pPr marL="192573" indent="0" algn="ctr">
+            <a:lvl2pPr marL="170993" indent="0" algn="ctr">
               <a:buNone/>
-              <a:defRPr sz="842"/>
+              <a:defRPr sz="748"/>
             </a:lvl2pPr>
-            <a:lvl3pPr marL="385145" indent="0" algn="ctr">
+            <a:lvl3pPr marL="341986" indent="0" algn="ctr">
               <a:buNone/>
-              <a:defRPr sz="758"/>
+              <a:defRPr sz="673"/>
             </a:lvl3pPr>
-            <a:lvl4pPr marL="577718" indent="0" algn="ctr">
+            <a:lvl4pPr marL="512978" indent="0" algn="ctr">
               <a:buNone/>
-              <a:defRPr sz="674"/>
+              <a:defRPr sz="598"/>
             </a:lvl4pPr>
-            <a:lvl5pPr marL="770291" indent="0" algn="ctr">
+            <a:lvl5pPr marL="683971" indent="0" algn="ctr">
               <a:buNone/>
-              <a:defRPr sz="674"/>
+              <a:defRPr sz="598"/>
             </a:lvl5pPr>
-            <a:lvl6pPr marL="962863" indent="0" algn="ctr">
+            <a:lvl6pPr marL="854964" indent="0" algn="ctr">
               <a:buNone/>
-              <a:defRPr sz="674"/>
+              <a:defRPr sz="598"/>
             </a:lvl6pPr>
-            <a:lvl7pPr marL="1155436" indent="0" algn="ctr">
+            <a:lvl7pPr marL="1025957" indent="0" algn="ctr">
               <a:buNone/>
-              <a:defRPr sz="674"/>
+              <a:defRPr sz="598"/>
             </a:lvl7pPr>
-            <a:lvl8pPr marL="1348008" indent="0" algn="ctr">
+            <a:lvl8pPr marL="1196950" indent="0" algn="ctr">
               <a:buNone/>
-              <a:defRPr sz="674"/>
+              <a:defRPr sz="598"/>
             </a:lvl8pPr>
-            <a:lvl9pPr marL="1540581" indent="0" algn="ctr">
+            <a:lvl9pPr marL="1367942" indent="0" algn="ctr">
               <a:buNone/>
-              <a:defRPr sz="674"/>
+              <a:defRPr sz="598"/>
             </a:lvl9pPr>
           </a:lstStyle>
           <a:p>
@@ -9657,7 +10553,7 @@
           <a:p>
             <a:fld id="{79798564-FF97-402E-A2A0-52C33396791A}" type="datetimeFigureOut">
               <a:rPr lang="en-GB" smtClean="0"/>
-              <a:t>03/12/2020</a:t>
+              <a:t>15/02/2021</a:t>
             </a:fld>
             <a:endParaRPr lang="en-GB"/>
           </a:p>
@@ -9708,7 +10604,7 @@
     </p:spTree>
     <p:extLst>
       <p:ext uri="{BB962C8B-B14F-4D97-AF65-F5344CB8AC3E}">
-        <p14:creationId xmlns:p14="http://schemas.microsoft.com/office/powerpoint/2010/main" val="1524247766"/>
+        <p14:creationId xmlns:p14="http://schemas.microsoft.com/office/powerpoint/2010/main" val="1151461173"/>
       </p:ext>
     </p:extLst>
   </p:cSld>
@@ -9827,7 +10723,7 @@
           <a:p>
             <a:fld id="{79798564-FF97-402E-A2A0-52C33396791A}" type="datetimeFigureOut">
               <a:rPr lang="en-GB" smtClean="0"/>
-              <a:t>03/12/2020</a:t>
+              <a:t>15/02/2021</a:t>
             </a:fld>
             <a:endParaRPr lang="en-GB"/>
           </a:p>
@@ -9878,7 +10774,7 @@
     </p:spTree>
     <p:extLst>
       <p:ext uri="{BB962C8B-B14F-4D97-AF65-F5344CB8AC3E}">
-        <p14:creationId xmlns:p14="http://schemas.microsoft.com/office/powerpoint/2010/main" val="1296959480"/>
+        <p14:creationId xmlns:p14="http://schemas.microsoft.com/office/powerpoint/2010/main" val="3979490985"/>
       </p:ext>
     </p:extLst>
   </p:cSld>
@@ -9917,8 +10813,8 @@
         </p:nvSpPr>
         <p:spPr>
           <a:xfrm>
-            <a:off x="2756069" y="367999"/>
-            <a:ext cx="830431" cy="5857579"/>
+            <a:off x="2447062" y="270209"/>
+            <a:ext cx="737324" cy="4301030"/>
           </a:xfrm>
         </p:spPr>
         <p:txBody>
@@ -9945,8 +10841,8 @@
         </p:nvSpPr>
         <p:spPr>
           <a:xfrm>
-            <a:off x="264775" y="367999"/>
-            <a:ext cx="2443153" cy="5857579"/>
+            <a:off x="235089" y="270209"/>
+            <a:ext cx="2169229" cy="4301030"/>
           </a:xfrm>
         </p:spPr>
         <p:txBody>
@@ -10007,7 +10903,7 @@
           <a:p>
             <a:fld id="{79798564-FF97-402E-A2A0-52C33396791A}" type="datetimeFigureOut">
               <a:rPr lang="en-GB" smtClean="0"/>
-              <a:t>03/12/2020</a:t>
+              <a:t>15/02/2021</a:t>
             </a:fld>
             <a:endParaRPr lang="en-GB"/>
           </a:p>
@@ -10058,7 +10954,7 @@
     </p:spTree>
     <p:extLst>
       <p:ext uri="{BB962C8B-B14F-4D97-AF65-F5344CB8AC3E}">
-        <p14:creationId xmlns:p14="http://schemas.microsoft.com/office/powerpoint/2010/main" val="1567289715"/>
+        <p14:creationId xmlns:p14="http://schemas.microsoft.com/office/powerpoint/2010/main" val="3493310199"/>
       </p:ext>
     </p:extLst>
   </p:cSld>
@@ -10177,7 +11073,7 @@
           <a:p>
             <a:fld id="{79798564-FF97-402E-A2A0-52C33396791A}" type="datetimeFigureOut">
               <a:rPr lang="en-GB" smtClean="0"/>
-              <a:t>03/12/2020</a:t>
+              <a:t>15/02/2021</a:t>
             </a:fld>
             <a:endParaRPr lang="en-GB"/>
           </a:p>
@@ -10228,7 +11124,7 @@
     </p:spTree>
     <p:extLst>
       <p:ext uri="{BB962C8B-B14F-4D97-AF65-F5344CB8AC3E}">
-        <p14:creationId xmlns:p14="http://schemas.microsoft.com/office/powerpoint/2010/main" val="3753051535"/>
+        <p14:creationId xmlns:p14="http://schemas.microsoft.com/office/powerpoint/2010/main" val="3622368529"/>
       </p:ext>
     </p:extLst>
   </p:cSld>
@@ -10267,15 +11163,15 @@
         </p:nvSpPr>
         <p:spPr>
           <a:xfrm>
-            <a:off x="262769" y="1723196"/>
-            <a:ext cx="3321725" cy="2875189"/>
+            <a:off x="233308" y="1265286"/>
+            <a:ext cx="2949297" cy="2111158"/>
           </a:xfrm>
         </p:spPr>
         <p:txBody>
           <a:bodyPr anchor="b"/>
           <a:lstStyle>
             <a:lvl1pPr>
-              <a:defRPr sz="2527"/>
+              <a:defRPr sz="2244"/>
             </a:lvl1pPr>
           </a:lstStyle>
           <a:p>
@@ -10299,8 +11195,8 @@
         </p:nvSpPr>
         <p:spPr>
           <a:xfrm>
-            <a:off x="262769" y="4625585"/>
-            <a:ext cx="3321725" cy="1511994"/>
+            <a:off x="233308" y="3396417"/>
+            <a:ext cx="2949297" cy="1110208"/>
           </a:xfrm>
         </p:spPr>
         <p:txBody>
@@ -10308,15 +11204,15 @@
           <a:lstStyle>
             <a:lvl1pPr marL="0" indent="0">
               <a:buNone/>
-              <a:defRPr sz="1011">
+              <a:defRPr sz="898">
                 <a:solidFill>
                   <a:schemeClr val="tx1"/>
                 </a:solidFill>
               </a:defRPr>
             </a:lvl1pPr>
-            <a:lvl2pPr marL="192573" indent="0">
+            <a:lvl2pPr marL="170993" indent="0">
               <a:buNone/>
-              <a:defRPr sz="842">
+              <a:defRPr sz="748">
                 <a:solidFill>
                   <a:schemeClr val="tx1">
                     <a:tint val="75000"/>
@@ -10324,9 +11220,9 @@
                 </a:solidFill>
               </a:defRPr>
             </a:lvl2pPr>
-            <a:lvl3pPr marL="385145" indent="0">
+            <a:lvl3pPr marL="341986" indent="0">
               <a:buNone/>
-              <a:defRPr sz="758">
+              <a:defRPr sz="673">
                 <a:solidFill>
                   <a:schemeClr val="tx1">
                     <a:tint val="75000"/>
@@ -10334,9 +11230,9 @@
                 </a:solidFill>
               </a:defRPr>
             </a:lvl3pPr>
-            <a:lvl4pPr marL="577718" indent="0">
+            <a:lvl4pPr marL="512978" indent="0">
               <a:buNone/>
-              <a:defRPr sz="674">
+              <a:defRPr sz="598">
                 <a:solidFill>
                   <a:schemeClr val="tx1">
                     <a:tint val="75000"/>
@@ -10344,9 +11240,9 @@
                 </a:solidFill>
               </a:defRPr>
             </a:lvl4pPr>
-            <a:lvl5pPr marL="770291" indent="0">
+            <a:lvl5pPr marL="683971" indent="0">
               <a:buNone/>
-              <a:defRPr sz="674">
+              <a:defRPr sz="598">
                 <a:solidFill>
                   <a:schemeClr val="tx1">
                     <a:tint val="75000"/>
@@ -10354,9 +11250,9 @@
                 </a:solidFill>
               </a:defRPr>
             </a:lvl5pPr>
-            <a:lvl6pPr marL="962863" indent="0">
+            <a:lvl6pPr marL="854964" indent="0">
               <a:buNone/>
-              <a:defRPr sz="674">
+              <a:defRPr sz="598">
                 <a:solidFill>
                   <a:schemeClr val="tx1">
                     <a:tint val="75000"/>
@@ -10364,9 +11260,9 @@
                 </a:solidFill>
               </a:defRPr>
             </a:lvl6pPr>
-            <a:lvl7pPr marL="1155436" indent="0">
+            <a:lvl7pPr marL="1025957" indent="0">
               <a:buNone/>
-              <a:defRPr sz="674">
+              <a:defRPr sz="598">
                 <a:solidFill>
                   <a:schemeClr val="tx1">
                     <a:tint val="75000"/>
@@ -10374,9 +11270,9 @@
                 </a:solidFill>
               </a:defRPr>
             </a:lvl7pPr>
-            <a:lvl8pPr marL="1348008" indent="0">
+            <a:lvl8pPr marL="1196950" indent="0">
               <a:buNone/>
-              <a:defRPr sz="674">
+              <a:defRPr sz="598">
                 <a:solidFill>
                   <a:schemeClr val="tx1">
                     <a:tint val="75000"/>
@@ -10384,9 +11280,9 @@
                 </a:solidFill>
               </a:defRPr>
             </a:lvl8pPr>
-            <a:lvl9pPr marL="1540581" indent="0">
+            <a:lvl9pPr marL="1367942" indent="0">
               <a:buNone/>
-              <a:defRPr sz="674">
+              <a:defRPr sz="598">
                 <a:solidFill>
                   <a:schemeClr val="tx1">
                     <a:tint val="75000"/>
@@ -10421,7 +11317,7 @@
           <a:p>
             <a:fld id="{79798564-FF97-402E-A2A0-52C33396791A}" type="datetimeFigureOut">
               <a:rPr lang="en-GB" smtClean="0"/>
-              <a:t>03/12/2020</a:t>
+              <a:t>15/02/2021</a:t>
             </a:fld>
             <a:endParaRPr lang="en-GB"/>
           </a:p>
@@ -10472,7 +11368,7 @@
     </p:spTree>
     <p:extLst>
       <p:ext uri="{BB962C8B-B14F-4D97-AF65-F5344CB8AC3E}">
-        <p14:creationId xmlns:p14="http://schemas.microsoft.com/office/powerpoint/2010/main" val="3827156125"/>
+        <p14:creationId xmlns:p14="http://schemas.microsoft.com/office/powerpoint/2010/main" val="2152831590"/>
       </p:ext>
     </p:extLst>
   </p:cSld>
@@ -10534,8 +11430,8 @@
         </p:nvSpPr>
         <p:spPr>
           <a:xfrm>
-            <a:off x="264775" y="1839993"/>
-            <a:ext cx="1636792" cy="4385585"/>
+            <a:off x="235089" y="1351047"/>
+            <a:ext cx="1453277" cy="3220192"/>
           </a:xfrm>
         </p:spPr>
         <p:txBody>
@@ -10591,8 +11487,8 @@
         </p:nvSpPr>
         <p:spPr>
           <a:xfrm>
-            <a:off x="1949708" y="1839993"/>
-            <a:ext cx="1636792" cy="4385585"/>
+            <a:off x="1731109" y="1351047"/>
+            <a:ext cx="1453277" cy="3220192"/>
           </a:xfrm>
         </p:spPr>
         <p:txBody>
@@ -10653,7 +11549,7 @@
           <a:p>
             <a:fld id="{79798564-FF97-402E-A2A0-52C33396791A}" type="datetimeFigureOut">
               <a:rPr lang="en-GB" smtClean="0"/>
-              <a:t>03/12/2020</a:t>
+              <a:t>15/02/2021</a:t>
             </a:fld>
             <a:endParaRPr lang="en-GB"/>
           </a:p>
@@ -10704,7 +11600,7 @@
     </p:spTree>
     <p:extLst>
       <p:ext uri="{BB962C8B-B14F-4D97-AF65-F5344CB8AC3E}">
-        <p14:creationId xmlns:p14="http://schemas.microsoft.com/office/powerpoint/2010/main" val="1248866995"/>
+        <p14:creationId xmlns:p14="http://schemas.microsoft.com/office/powerpoint/2010/main" val="3525960006"/>
       </p:ext>
     </p:extLst>
   </p:cSld>
@@ -10743,8 +11639,8 @@
         </p:nvSpPr>
         <p:spPr>
           <a:xfrm>
-            <a:off x="265277" y="368000"/>
-            <a:ext cx="3321725" cy="1335996"/>
+            <a:off x="235534" y="270211"/>
+            <a:ext cx="2949297" cy="980978"/>
           </a:xfrm>
         </p:spPr>
         <p:txBody>
@@ -10771,8 +11667,8 @@
         </p:nvSpPr>
         <p:spPr>
           <a:xfrm>
-            <a:off x="265277" y="1694395"/>
-            <a:ext cx="1629270" cy="830396"/>
+            <a:off x="235535" y="1244139"/>
+            <a:ext cx="1446598" cy="609733"/>
           </a:xfrm>
         </p:spPr>
         <p:txBody>
@@ -10780,39 +11676,39 @@
           <a:lstStyle>
             <a:lvl1pPr marL="0" indent="0">
               <a:buNone/>
-              <a:defRPr sz="1011" b="1"/>
+              <a:defRPr sz="898" b="1"/>
             </a:lvl1pPr>
-            <a:lvl2pPr marL="192573" indent="0">
+            <a:lvl2pPr marL="170993" indent="0">
               <a:buNone/>
-              <a:defRPr sz="842" b="1"/>
+              <a:defRPr sz="748" b="1"/>
             </a:lvl2pPr>
-            <a:lvl3pPr marL="385145" indent="0">
+            <a:lvl3pPr marL="341986" indent="0">
               <a:buNone/>
-              <a:defRPr sz="758" b="1"/>
+              <a:defRPr sz="673" b="1"/>
             </a:lvl3pPr>
-            <a:lvl4pPr marL="577718" indent="0">
+            <a:lvl4pPr marL="512978" indent="0">
               <a:buNone/>
-              <a:defRPr sz="674" b="1"/>
+              <a:defRPr sz="598" b="1"/>
             </a:lvl4pPr>
-            <a:lvl5pPr marL="770291" indent="0">
+            <a:lvl5pPr marL="683971" indent="0">
               <a:buNone/>
-              <a:defRPr sz="674" b="1"/>
+              <a:defRPr sz="598" b="1"/>
             </a:lvl5pPr>
-            <a:lvl6pPr marL="962863" indent="0">
+            <a:lvl6pPr marL="854964" indent="0">
               <a:buNone/>
-              <a:defRPr sz="674" b="1"/>
+              <a:defRPr sz="598" b="1"/>
             </a:lvl6pPr>
-            <a:lvl7pPr marL="1155436" indent="0">
+            <a:lvl7pPr marL="1025957" indent="0">
               <a:buNone/>
-              <a:defRPr sz="674" b="1"/>
+              <a:defRPr sz="598" b="1"/>
             </a:lvl7pPr>
-            <a:lvl8pPr marL="1348008" indent="0">
+            <a:lvl8pPr marL="1196950" indent="0">
               <a:buNone/>
-              <a:defRPr sz="674" b="1"/>
+              <a:defRPr sz="598" b="1"/>
             </a:lvl8pPr>
-            <a:lvl9pPr marL="1540581" indent="0">
+            <a:lvl9pPr marL="1367942" indent="0">
               <a:buNone/>
-              <a:defRPr sz="674" b="1"/>
+              <a:defRPr sz="598" b="1"/>
             </a:lvl9pPr>
           </a:lstStyle>
           <a:p>
@@ -10836,8 +11732,8 @@
         </p:nvSpPr>
         <p:spPr>
           <a:xfrm>
-            <a:off x="265277" y="2524791"/>
-            <a:ext cx="1629270" cy="3713587"/>
+            <a:off x="235535" y="1853872"/>
+            <a:ext cx="1446598" cy="2726766"/>
           </a:xfrm>
         </p:spPr>
         <p:txBody>
@@ -10893,8 +11789,8 @@
         </p:nvSpPr>
         <p:spPr>
           <a:xfrm>
-            <a:off x="1949708" y="1694395"/>
-            <a:ext cx="1637294" cy="830396"/>
+            <a:off x="1731110" y="1244139"/>
+            <a:ext cx="1453722" cy="609733"/>
           </a:xfrm>
         </p:spPr>
         <p:txBody>
@@ -10902,39 +11798,39 @@
           <a:lstStyle>
             <a:lvl1pPr marL="0" indent="0">
               <a:buNone/>
-              <a:defRPr sz="1011" b="1"/>
+              <a:defRPr sz="898" b="1"/>
             </a:lvl1pPr>
-            <a:lvl2pPr marL="192573" indent="0">
+            <a:lvl2pPr marL="170993" indent="0">
               <a:buNone/>
-              <a:defRPr sz="842" b="1"/>
+              <a:defRPr sz="748" b="1"/>
             </a:lvl2pPr>
-            <a:lvl3pPr marL="385145" indent="0">
+            <a:lvl3pPr marL="341986" indent="0">
               <a:buNone/>
-              <a:defRPr sz="758" b="1"/>
+              <a:defRPr sz="673" b="1"/>
             </a:lvl3pPr>
-            <a:lvl4pPr marL="577718" indent="0">
+            <a:lvl4pPr marL="512978" indent="0">
               <a:buNone/>
-              <a:defRPr sz="674" b="1"/>
+              <a:defRPr sz="598" b="1"/>
             </a:lvl4pPr>
-            <a:lvl5pPr marL="770291" indent="0">
+            <a:lvl5pPr marL="683971" indent="0">
               <a:buNone/>
-              <a:defRPr sz="674" b="1"/>
+              <a:defRPr sz="598" b="1"/>
             </a:lvl5pPr>
-            <a:lvl6pPr marL="962863" indent="0">
+            <a:lvl6pPr marL="854964" indent="0">
               <a:buNone/>
-              <a:defRPr sz="674" b="1"/>
+              <a:defRPr sz="598" b="1"/>
             </a:lvl6pPr>
-            <a:lvl7pPr marL="1155436" indent="0">
+            <a:lvl7pPr marL="1025957" indent="0">
               <a:buNone/>
-              <a:defRPr sz="674" b="1"/>
+              <a:defRPr sz="598" b="1"/>
             </a:lvl7pPr>
-            <a:lvl8pPr marL="1348008" indent="0">
+            <a:lvl8pPr marL="1196950" indent="0">
               <a:buNone/>
-              <a:defRPr sz="674" b="1"/>
+              <a:defRPr sz="598" b="1"/>
             </a:lvl8pPr>
-            <a:lvl9pPr marL="1540581" indent="0">
+            <a:lvl9pPr marL="1367942" indent="0">
               <a:buNone/>
-              <a:defRPr sz="674" b="1"/>
+              <a:defRPr sz="598" b="1"/>
             </a:lvl9pPr>
           </a:lstStyle>
           <a:p>
@@ -10958,8 +11854,8 @@
         </p:nvSpPr>
         <p:spPr>
           <a:xfrm>
-            <a:off x="1949708" y="2524791"/>
-            <a:ext cx="1637294" cy="3713587"/>
+            <a:off x="1731110" y="1853872"/>
+            <a:ext cx="1453722" cy="2726766"/>
           </a:xfrm>
         </p:spPr>
         <p:txBody>
@@ -11020,7 +11916,7 @@
           <a:p>
             <a:fld id="{79798564-FF97-402E-A2A0-52C33396791A}" type="datetimeFigureOut">
               <a:rPr lang="en-GB" smtClean="0"/>
-              <a:t>03/12/2020</a:t>
+              <a:t>15/02/2021</a:t>
             </a:fld>
             <a:endParaRPr lang="en-GB"/>
           </a:p>
@@ -11071,7 +11967,7 @@
     </p:spTree>
     <p:extLst>
       <p:ext uri="{BB962C8B-B14F-4D97-AF65-F5344CB8AC3E}">
-        <p14:creationId xmlns:p14="http://schemas.microsoft.com/office/powerpoint/2010/main" val="2338942278"/>
+        <p14:creationId xmlns:p14="http://schemas.microsoft.com/office/powerpoint/2010/main" val="2469748247"/>
       </p:ext>
     </p:extLst>
   </p:cSld>
@@ -11138,7 +12034,7 @@
           <a:p>
             <a:fld id="{79798564-FF97-402E-A2A0-52C33396791A}" type="datetimeFigureOut">
               <a:rPr lang="en-GB" smtClean="0"/>
-              <a:t>03/12/2020</a:t>
+              <a:t>15/02/2021</a:t>
             </a:fld>
             <a:endParaRPr lang="en-GB"/>
           </a:p>
@@ -11189,7 +12085,7 @@
     </p:spTree>
     <p:extLst>
       <p:ext uri="{BB962C8B-B14F-4D97-AF65-F5344CB8AC3E}">
-        <p14:creationId xmlns:p14="http://schemas.microsoft.com/office/powerpoint/2010/main" val="3400187183"/>
+        <p14:creationId xmlns:p14="http://schemas.microsoft.com/office/powerpoint/2010/main" val="658197343"/>
       </p:ext>
     </p:extLst>
   </p:cSld>
@@ -11233,7 +12129,7 @@
           <a:p>
             <a:fld id="{79798564-FF97-402E-A2A0-52C33396791A}" type="datetimeFigureOut">
               <a:rPr lang="en-GB" smtClean="0"/>
-              <a:t>03/12/2020</a:t>
+              <a:t>15/02/2021</a:t>
             </a:fld>
             <a:endParaRPr lang="en-GB"/>
           </a:p>
@@ -11284,7 +12180,7 @@
     </p:spTree>
     <p:extLst>
       <p:ext uri="{BB962C8B-B14F-4D97-AF65-F5344CB8AC3E}">
-        <p14:creationId xmlns:p14="http://schemas.microsoft.com/office/powerpoint/2010/main" val="3596731842"/>
+        <p14:creationId xmlns:p14="http://schemas.microsoft.com/office/powerpoint/2010/main" val="1892683696"/>
       </p:ext>
     </p:extLst>
   </p:cSld>
@@ -11323,15 +12219,15 @@
         </p:nvSpPr>
         <p:spPr>
           <a:xfrm>
-            <a:off x="265277" y="460798"/>
-            <a:ext cx="1242136" cy="1612794"/>
+            <a:off x="235534" y="338349"/>
+            <a:ext cx="1102870" cy="1184222"/>
           </a:xfrm>
         </p:spPr>
         <p:txBody>
           <a:bodyPr anchor="b"/>
           <a:lstStyle>
             <a:lvl1pPr>
-              <a:defRPr sz="1348"/>
+              <a:defRPr sz="1197"/>
             </a:lvl1pPr>
           </a:lstStyle>
           <a:p>
@@ -11355,39 +12251,39 @@
         </p:nvSpPr>
         <p:spPr>
           <a:xfrm>
-            <a:off x="1637293" y="995198"/>
-            <a:ext cx="1949708" cy="4911982"/>
+            <a:off x="1453722" y="730742"/>
+            <a:ext cx="1731109" cy="3606708"/>
           </a:xfrm>
         </p:spPr>
         <p:txBody>
           <a:bodyPr/>
           <a:lstStyle>
             <a:lvl1pPr>
-              <a:defRPr sz="1348"/>
+              <a:defRPr sz="1197"/>
             </a:lvl1pPr>
             <a:lvl2pPr>
-              <a:defRPr sz="1179"/>
+              <a:defRPr sz="1047"/>
             </a:lvl2pPr>
             <a:lvl3pPr>
-              <a:defRPr sz="1011"/>
+              <a:defRPr sz="898"/>
             </a:lvl3pPr>
             <a:lvl4pPr>
-              <a:defRPr sz="842"/>
+              <a:defRPr sz="748"/>
             </a:lvl4pPr>
             <a:lvl5pPr>
-              <a:defRPr sz="842"/>
+              <a:defRPr sz="748"/>
             </a:lvl5pPr>
             <a:lvl6pPr>
-              <a:defRPr sz="842"/>
+              <a:defRPr sz="748"/>
             </a:lvl6pPr>
             <a:lvl7pPr>
-              <a:defRPr sz="842"/>
+              <a:defRPr sz="748"/>
             </a:lvl7pPr>
             <a:lvl8pPr>
-              <a:defRPr sz="842"/>
+              <a:defRPr sz="748"/>
             </a:lvl8pPr>
             <a:lvl9pPr>
-              <a:defRPr sz="842"/>
+              <a:defRPr sz="748"/>
             </a:lvl9pPr>
           </a:lstStyle>
           <a:p>
@@ -11440,8 +12336,8 @@
         </p:nvSpPr>
         <p:spPr>
           <a:xfrm>
-            <a:off x="265277" y="2073592"/>
-            <a:ext cx="1242136" cy="3841587"/>
+            <a:off x="235534" y="1522571"/>
+            <a:ext cx="1102870" cy="2820752"/>
           </a:xfrm>
         </p:spPr>
         <p:txBody>
@@ -11449,39 +12345,39 @@
           <a:lstStyle>
             <a:lvl1pPr marL="0" indent="0">
               <a:buNone/>
-              <a:defRPr sz="674"/>
+              <a:defRPr sz="598"/>
             </a:lvl1pPr>
-            <a:lvl2pPr marL="192573" indent="0">
+            <a:lvl2pPr marL="170993" indent="0">
               <a:buNone/>
-              <a:defRPr sz="590"/>
+              <a:defRPr sz="524"/>
             </a:lvl2pPr>
-            <a:lvl3pPr marL="385145" indent="0">
+            <a:lvl3pPr marL="341986" indent="0">
               <a:buNone/>
-              <a:defRPr sz="505"/>
+              <a:defRPr sz="449"/>
             </a:lvl3pPr>
-            <a:lvl4pPr marL="577718" indent="0">
+            <a:lvl4pPr marL="512978" indent="0">
               <a:buNone/>
-              <a:defRPr sz="421"/>
+              <a:defRPr sz="374"/>
             </a:lvl4pPr>
-            <a:lvl5pPr marL="770291" indent="0">
+            <a:lvl5pPr marL="683971" indent="0">
               <a:buNone/>
-              <a:defRPr sz="421"/>
+              <a:defRPr sz="374"/>
             </a:lvl5pPr>
-            <a:lvl6pPr marL="962863" indent="0">
+            <a:lvl6pPr marL="854964" indent="0">
               <a:buNone/>
-              <a:defRPr sz="421"/>
+              <a:defRPr sz="374"/>
             </a:lvl6pPr>
-            <a:lvl7pPr marL="1155436" indent="0">
+            <a:lvl7pPr marL="1025957" indent="0">
               <a:buNone/>
-              <a:defRPr sz="421"/>
+              <a:defRPr sz="374"/>
             </a:lvl7pPr>
-            <a:lvl8pPr marL="1348008" indent="0">
+            <a:lvl8pPr marL="1196950" indent="0">
               <a:buNone/>
-              <a:defRPr sz="421"/>
+              <a:defRPr sz="374"/>
             </a:lvl8pPr>
-            <a:lvl9pPr marL="1540581" indent="0">
+            <a:lvl9pPr marL="1367942" indent="0">
               <a:buNone/>
-              <a:defRPr sz="421"/>
+              <a:defRPr sz="374"/>
             </a:lvl9pPr>
           </a:lstStyle>
           <a:p>
@@ -11510,7 +12406,7 @@
           <a:p>
             <a:fld id="{79798564-FF97-402E-A2A0-52C33396791A}" type="datetimeFigureOut">
               <a:rPr lang="en-GB" smtClean="0"/>
-              <a:t>03/12/2020</a:t>
+              <a:t>15/02/2021</a:t>
             </a:fld>
             <a:endParaRPr lang="en-GB"/>
           </a:p>
@@ -11561,7 +12457,7 @@
     </p:spTree>
     <p:extLst>
       <p:ext uri="{BB962C8B-B14F-4D97-AF65-F5344CB8AC3E}">
-        <p14:creationId xmlns:p14="http://schemas.microsoft.com/office/powerpoint/2010/main" val="527659357"/>
+        <p14:creationId xmlns:p14="http://schemas.microsoft.com/office/powerpoint/2010/main" val="2057711168"/>
       </p:ext>
     </p:extLst>
   </p:cSld>
@@ -11600,15 +12496,15 @@
         </p:nvSpPr>
         <p:spPr>
           <a:xfrm>
-            <a:off x="265277" y="460798"/>
-            <a:ext cx="1242136" cy="1612794"/>
+            <a:off x="235534" y="338349"/>
+            <a:ext cx="1102870" cy="1184222"/>
           </a:xfrm>
         </p:spPr>
         <p:txBody>
           <a:bodyPr anchor="b"/>
           <a:lstStyle>
             <a:lvl1pPr>
-              <a:defRPr sz="1348"/>
+              <a:defRPr sz="1197"/>
             </a:lvl1pPr>
           </a:lstStyle>
           <a:p>
@@ -11632,8 +12528,8 @@
         </p:nvSpPr>
         <p:spPr>
           <a:xfrm>
-            <a:off x="1637293" y="995198"/>
-            <a:ext cx="1949708" cy="4911982"/>
+            <a:off x="1453722" y="730742"/>
+            <a:ext cx="1731109" cy="3606708"/>
           </a:xfrm>
         </p:spPr>
         <p:txBody>
@@ -11641,39 +12537,39 @@
           <a:lstStyle>
             <a:lvl1pPr marL="0" indent="0">
               <a:buNone/>
-              <a:defRPr sz="1348"/>
+              <a:defRPr sz="1197"/>
             </a:lvl1pPr>
-            <a:lvl2pPr marL="192573" indent="0">
+            <a:lvl2pPr marL="170993" indent="0">
               <a:buNone/>
-              <a:defRPr sz="1179"/>
+              <a:defRPr sz="1047"/>
             </a:lvl2pPr>
-            <a:lvl3pPr marL="385145" indent="0">
+            <a:lvl3pPr marL="341986" indent="0">
               <a:buNone/>
-              <a:defRPr sz="1011"/>
+              <a:defRPr sz="898"/>
             </a:lvl3pPr>
-            <a:lvl4pPr marL="577718" indent="0">
+            <a:lvl4pPr marL="512978" indent="0">
               <a:buNone/>
-              <a:defRPr sz="842"/>
+              <a:defRPr sz="748"/>
             </a:lvl4pPr>
-            <a:lvl5pPr marL="770291" indent="0">
+            <a:lvl5pPr marL="683971" indent="0">
               <a:buNone/>
-              <a:defRPr sz="842"/>
+              <a:defRPr sz="748"/>
             </a:lvl5pPr>
-            <a:lvl6pPr marL="962863" indent="0">
+            <a:lvl6pPr marL="854964" indent="0">
               <a:buNone/>
-              <a:defRPr sz="842"/>
+              <a:defRPr sz="748"/>
             </a:lvl6pPr>
-            <a:lvl7pPr marL="1155436" indent="0">
+            <a:lvl7pPr marL="1025957" indent="0">
               <a:buNone/>
-              <a:defRPr sz="842"/>
+              <a:defRPr sz="748"/>
             </a:lvl7pPr>
-            <a:lvl8pPr marL="1348008" indent="0">
+            <a:lvl8pPr marL="1196950" indent="0">
               <a:buNone/>
-              <a:defRPr sz="842"/>
+              <a:defRPr sz="748"/>
             </a:lvl8pPr>
-            <a:lvl9pPr marL="1540581" indent="0">
+            <a:lvl9pPr marL="1367942" indent="0">
               <a:buNone/>
-              <a:defRPr sz="842"/>
+              <a:defRPr sz="748"/>
             </a:lvl9pPr>
           </a:lstStyle>
           <a:p>
@@ -11697,8 +12593,8 @@
         </p:nvSpPr>
         <p:spPr>
           <a:xfrm>
-            <a:off x="265277" y="2073592"/>
-            <a:ext cx="1242136" cy="3841587"/>
+            <a:off x="235534" y="1522571"/>
+            <a:ext cx="1102870" cy="2820752"/>
           </a:xfrm>
         </p:spPr>
         <p:txBody>
@@ -11706,39 +12602,39 @@
           <a:lstStyle>
             <a:lvl1pPr marL="0" indent="0">
               <a:buNone/>
-              <a:defRPr sz="674"/>
+              <a:defRPr sz="598"/>
             </a:lvl1pPr>
-            <a:lvl2pPr marL="192573" indent="0">
+            <a:lvl2pPr marL="170993" indent="0">
               <a:buNone/>
-              <a:defRPr sz="590"/>
+              <a:defRPr sz="524"/>
             </a:lvl2pPr>
-            <a:lvl3pPr marL="385145" indent="0">
+            <a:lvl3pPr marL="341986" indent="0">
               <a:buNone/>
-              <a:defRPr sz="505"/>
+              <a:defRPr sz="449"/>
             </a:lvl3pPr>
-            <a:lvl4pPr marL="577718" indent="0">
+            <a:lvl4pPr marL="512978" indent="0">
               <a:buNone/>
-              <a:defRPr sz="421"/>
+              <a:defRPr sz="374"/>
             </a:lvl4pPr>
-            <a:lvl5pPr marL="770291" indent="0">
+            <a:lvl5pPr marL="683971" indent="0">
               <a:buNone/>
-              <a:defRPr sz="421"/>
+              <a:defRPr sz="374"/>
             </a:lvl5pPr>
-            <a:lvl6pPr marL="962863" indent="0">
+            <a:lvl6pPr marL="854964" indent="0">
               <a:buNone/>
-              <a:defRPr sz="421"/>
+              <a:defRPr sz="374"/>
             </a:lvl6pPr>
-            <a:lvl7pPr marL="1155436" indent="0">
+            <a:lvl7pPr marL="1025957" indent="0">
               <a:buNone/>
-              <a:defRPr sz="421"/>
+              <a:defRPr sz="374"/>
             </a:lvl7pPr>
-            <a:lvl8pPr marL="1348008" indent="0">
+            <a:lvl8pPr marL="1196950" indent="0">
               <a:buNone/>
-              <a:defRPr sz="421"/>
+              <a:defRPr sz="374"/>
             </a:lvl8pPr>
-            <a:lvl9pPr marL="1540581" indent="0">
+            <a:lvl9pPr marL="1367942" indent="0">
               <a:buNone/>
-              <a:defRPr sz="421"/>
+              <a:defRPr sz="374"/>
             </a:lvl9pPr>
           </a:lstStyle>
           <a:p>
@@ -11767,7 +12663,7 @@
           <a:p>
             <a:fld id="{79798564-FF97-402E-A2A0-52C33396791A}" type="datetimeFigureOut">
               <a:rPr lang="en-GB" smtClean="0"/>
-              <a:t>03/12/2020</a:t>
+              <a:t>15/02/2021</a:t>
             </a:fld>
             <a:endParaRPr lang="en-GB"/>
           </a:p>
@@ -11818,7 +12714,7 @@
     </p:spTree>
     <p:extLst>
       <p:ext uri="{BB962C8B-B14F-4D97-AF65-F5344CB8AC3E}">
-        <p14:creationId xmlns:p14="http://schemas.microsoft.com/office/powerpoint/2010/main" val="2562648774"/>
+        <p14:creationId xmlns:p14="http://schemas.microsoft.com/office/powerpoint/2010/main" val="2204744702"/>
       </p:ext>
     </p:extLst>
   </p:cSld>
@@ -11862,8 +12758,8 @@
         </p:nvSpPr>
         <p:spPr>
           <a:xfrm>
-            <a:off x="264775" y="368000"/>
-            <a:ext cx="3321725" cy="1335996"/>
+            <a:off x="235089" y="270211"/>
+            <a:ext cx="2949297" cy="980978"/>
           </a:xfrm>
           <a:prstGeom prst="rect">
             <a:avLst/>
@@ -11895,8 +12791,8 @@
         </p:nvSpPr>
         <p:spPr>
           <a:xfrm>
-            <a:off x="264775" y="1839993"/>
-            <a:ext cx="3321725" cy="4385585"/>
+            <a:off x="235089" y="1351047"/>
+            <a:ext cx="2949297" cy="3220192"/>
           </a:xfrm>
           <a:prstGeom prst="rect">
             <a:avLst/>
@@ -11957,8 +12853,8 @@
         </p:nvSpPr>
         <p:spPr>
           <a:xfrm>
-            <a:off x="264775" y="6406378"/>
-            <a:ext cx="866537" cy="367999"/>
+            <a:off x="235089" y="4703995"/>
+            <a:ext cx="769382" cy="270209"/>
           </a:xfrm>
           <a:prstGeom prst="rect">
             <a:avLst/>
@@ -11968,7 +12864,7 @@
           <a:bodyPr vert="horz" lIns="91440" tIns="45720" rIns="91440" bIns="45720" rtlCol="0" anchor="ctr"/>
           <a:lstStyle>
             <a:lvl1pPr algn="l">
-              <a:defRPr sz="505">
+              <a:defRPr sz="449">
                 <a:solidFill>
                   <a:schemeClr val="tx1">
                     <a:tint val="75000"/>
@@ -11980,7 +12876,7 @@
           <a:p>
             <a:fld id="{79798564-FF97-402E-A2A0-52C33396791A}" type="datetimeFigureOut">
               <a:rPr lang="en-GB" smtClean="0"/>
-              <a:t>03/12/2020</a:t>
+              <a:t>15/02/2021</a:t>
             </a:fld>
             <a:endParaRPr lang="en-GB"/>
           </a:p>
@@ -11998,8 +12894,8 @@
         </p:nvSpPr>
         <p:spPr>
           <a:xfrm>
-            <a:off x="1275735" y="6406378"/>
-            <a:ext cx="1299805" cy="367999"/>
+            <a:off x="1132701" y="4703995"/>
+            <a:ext cx="1154073" cy="270209"/>
           </a:xfrm>
           <a:prstGeom prst="rect">
             <a:avLst/>
@@ -12009,7 +12905,7 @@
           <a:bodyPr vert="horz" lIns="91440" tIns="45720" rIns="91440" bIns="45720" rtlCol="0" anchor="ctr"/>
           <a:lstStyle>
             <a:lvl1pPr algn="ctr">
-              <a:defRPr sz="505">
+              <a:defRPr sz="449">
                 <a:solidFill>
                   <a:schemeClr val="tx1">
                     <a:tint val="75000"/>
@@ -12035,8 +12931,8 @@
         </p:nvSpPr>
         <p:spPr>
           <a:xfrm>
-            <a:off x="2719963" y="6406378"/>
-            <a:ext cx="866537" cy="367999"/>
+            <a:off x="2415004" y="4703995"/>
+            <a:ext cx="769382" cy="270209"/>
           </a:xfrm>
           <a:prstGeom prst="rect">
             <a:avLst/>
@@ -12046,7 +12942,7 @@
           <a:bodyPr vert="horz" lIns="91440" tIns="45720" rIns="91440" bIns="45720" rtlCol="0" anchor="ctr"/>
           <a:lstStyle>
             <a:lvl1pPr algn="r">
-              <a:defRPr sz="505">
+              <a:defRPr sz="449">
                 <a:solidFill>
                   <a:schemeClr val="tx1">
                     <a:tint val="75000"/>
@@ -12067,27 +12963,27 @@
     </p:spTree>
     <p:extLst>
       <p:ext uri="{BB962C8B-B14F-4D97-AF65-F5344CB8AC3E}">
-        <p14:creationId xmlns:p14="http://schemas.microsoft.com/office/powerpoint/2010/main" val="3352061134"/>
+        <p14:creationId xmlns:p14="http://schemas.microsoft.com/office/powerpoint/2010/main" val="4261862901"/>
       </p:ext>
     </p:extLst>
   </p:cSld>
   <p:clrMap bg1="lt1" tx1="dk1" bg2="lt2" tx2="dk2" accent1="accent1" accent2="accent2" accent3="accent3" accent4="accent4" accent5="accent5" accent6="accent6" hlink="hlink" folHlink="folHlink"/>
   <p:sldLayoutIdLst>
-    <p:sldLayoutId id="2147483841" r:id="rId1"/>
-    <p:sldLayoutId id="2147483842" r:id="rId2"/>
-    <p:sldLayoutId id="2147483843" r:id="rId3"/>
-    <p:sldLayoutId id="2147483844" r:id="rId4"/>
-    <p:sldLayoutId id="2147483845" r:id="rId5"/>
-    <p:sldLayoutId id="2147483846" r:id="rId6"/>
-    <p:sldLayoutId id="2147483847" r:id="rId7"/>
-    <p:sldLayoutId id="2147483848" r:id="rId8"/>
-    <p:sldLayoutId id="2147483849" r:id="rId9"/>
-    <p:sldLayoutId id="2147483850" r:id="rId10"/>
-    <p:sldLayoutId id="2147483851" r:id="rId11"/>
+    <p:sldLayoutId id="2147483853" r:id="rId1"/>
+    <p:sldLayoutId id="2147483854" r:id="rId2"/>
+    <p:sldLayoutId id="2147483855" r:id="rId3"/>
+    <p:sldLayoutId id="2147483856" r:id="rId4"/>
+    <p:sldLayoutId id="2147483857" r:id="rId5"/>
+    <p:sldLayoutId id="2147483858" r:id="rId6"/>
+    <p:sldLayoutId id="2147483859" r:id="rId7"/>
+    <p:sldLayoutId id="2147483860" r:id="rId8"/>
+    <p:sldLayoutId id="2147483861" r:id="rId9"/>
+    <p:sldLayoutId id="2147483862" r:id="rId10"/>
+    <p:sldLayoutId id="2147483863" r:id="rId11"/>
   </p:sldLayoutIdLst>
   <p:txStyles>
     <p:titleStyle>
-      <a:lvl1pPr algn="l" defTabSz="385145" rtl="0" eaLnBrk="1" latinLnBrk="0" hangingPunct="1">
+      <a:lvl1pPr algn="l" defTabSz="341986" rtl="0" eaLnBrk="1" latinLnBrk="0" hangingPunct="1">
         <a:lnSpc>
           <a:spcPct val="90000"/>
         </a:lnSpc>
@@ -12095,7 +12991,7 @@
           <a:spcPct val="0"/>
         </a:spcBef>
         <a:buNone/>
-        <a:defRPr sz="1853" kern="1200">
+        <a:defRPr sz="1646" kern="1200">
           <a:solidFill>
             <a:schemeClr val="tx1"/>
           </a:solidFill>
@@ -12106,16 +13002,16 @@
       </a:lvl1pPr>
     </p:titleStyle>
     <p:bodyStyle>
-      <a:lvl1pPr marL="96286" indent="-96286" algn="l" defTabSz="385145" rtl="0" eaLnBrk="1" latinLnBrk="0" hangingPunct="1">
+      <a:lvl1pPr marL="85496" indent="-85496" algn="l" defTabSz="341986" rtl="0" eaLnBrk="1" latinLnBrk="0" hangingPunct="1">
         <a:lnSpc>
           <a:spcPct val="90000"/>
         </a:lnSpc>
         <a:spcBef>
-          <a:spcPts val="421"/>
+          <a:spcPts val="374"/>
         </a:spcBef>
         <a:buFont typeface="Arial" panose="020B0604020202020204" pitchFamily="34" charset="0"/>
         <a:buChar char="•"/>
-        <a:defRPr sz="1179" kern="1200">
+        <a:defRPr sz="1047" kern="1200">
           <a:solidFill>
             <a:schemeClr val="tx1"/>
           </a:solidFill>
@@ -12124,16 +13020,16 @@
           <a:cs typeface="+mn-cs"/>
         </a:defRPr>
       </a:lvl1pPr>
-      <a:lvl2pPr marL="288859" indent="-96286" algn="l" defTabSz="385145" rtl="0" eaLnBrk="1" latinLnBrk="0" hangingPunct="1">
+      <a:lvl2pPr marL="256489" indent="-85496" algn="l" defTabSz="341986" rtl="0" eaLnBrk="1" latinLnBrk="0" hangingPunct="1">
         <a:lnSpc>
           <a:spcPct val="90000"/>
         </a:lnSpc>
         <a:spcBef>
-          <a:spcPts val="211"/>
+          <a:spcPts val="187"/>
         </a:spcBef>
         <a:buFont typeface="Arial" panose="020B0604020202020204" pitchFamily="34" charset="0"/>
         <a:buChar char="•"/>
-        <a:defRPr sz="1011" kern="1200">
+        <a:defRPr sz="898" kern="1200">
           <a:solidFill>
             <a:schemeClr val="tx1"/>
           </a:solidFill>
@@ -12142,16 +13038,16 @@
           <a:cs typeface="+mn-cs"/>
         </a:defRPr>
       </a:lvl2pPr>
-      <a:lvl3pPr marL="481432" indent="-96286" algn="l" defTabSz="385145" rtl="0" eaLnBrk="1" latinLnBrk="0" hangingPunct="1">
+      <a:lvl3pPr marL="427482" indent="-85496" algn="l" defTabSz="341986" rtl="0" eaLnBrk="1" latinLnBrk="0" hangingPunct="1">
         <a:lnSpc>
           <a:spcPct val="90000"/>
         </a:lnSpc>
         <a:spcBef>
-          <a:spcPts val="211"/>
+          <a:spcPts val="187"/>
         </a:spcBef>
         <a:buFont typeface="Arial" panose="020B0604020202020204" pitchFamily="34" charset="0"/>
         <a:buChar char="•"/>
-        <a:defRPr sz="842" kern="1200">
+        <a:defRPr sz="748" kern="1200">
           <a:solidFill>
             <a:schemeClr val="tx1"/>
           </a:solidFill>
@@ -12160,16 +13056,16 @@
           <a:cs typeface="+mn-cs"/>
         </a:defRPr>
       </a:lvl3pPr>
-      <a:lvl4pPr marL="674004" indent="-96286" algn="l" defTabSz="385145" rtl="0" eaLnBrk="1" latinLnBrk="0" hangingPunct="1">
+      <a:lvl4pPr marL="598475" indent="-85496" algn="l" defTabSz="341986" rtl="0" eaLnBrk="1" latinLnBrk="0" hangingPunct="1">
         <a:lnSpc>
           <a:spcPct val="90000"/>
         </a:lnSpc>
         <a:spcBef>
-          <a:spcPts val="211"/>
+          <a:spcPts val="187"/>
         </a:spcBef>
         <a:buFont typeface="Arial" panose="020B0604020202020204" pitchFamily="34" charset="0"/>
         <a:buChar char="•"/>
-        <a:defRPr sz="758" kern="1200">
+        <a:defRPr sz="673" kern="1200">
           <a:solidFill>
             <a:schemeClr val="tx1"/>
           </a:solidFill>
@@ -12178,16 +13074,16 @@
           <a:cs typeface="+mn-cs"/>
         </a:defRPr>
       </a:lvl4pPr>
-      <a:lvl5pPr marL="866577" indent="-96286" algn="l" defTabSz="385145" rtl="0" eaLnBrk="1" latinLnBrk="0" hangingPunct="1">
+      <a:lvl5pPr marL="769468" indent="-85496" algn="l" defTabSz="341986" rtl="0" eaLnBrk="1" latinLnBrk="0" hangingPunct="1">
         <a:lnSpc>
           <a:spcPct val="90000"/>
         </a:lnSpc>
         <a:spcBef>
-          <a:spcPts val="211"/>
+          <a:spcPts val="187"/>
         </a:spcBef>
         <a:buFont typeface="Arial" panose="020B0604020202020204" pitchFamily="34" charset="0"/>
         <a:buChar char="•"/>
-        <a:defRPr sz="758" kern="1200">
+        <a:defRPr sz="673" kern="1200">
           <a:solidFill>
             <a:schemeClr val="tx1"/>
           </a:solidFill>
@@ -12196,16 +13092,16 @@
           <a:cs typeface="+mn-cs"/>
         </a:defRPr>
       </a:lvl5pPr>
-      <a:lvl6pPr marL="1059150" indent="-96286" algn="l" defTabSz="385145" rtl="0" eaLnBrk="1" latinLnBrk="0" hangingPunct="1">
+      <a:lvl6pPr marL="940460" indent="-85496" algn="l" defTabSz="341986" rtl="0" eaLnBrk="1" latinLnBrk="0" hangingPunct="1">
         <a:lnSpc>
           <a:spcPct val="90000"/>
         </a:lnSpc>
         <a:spcBef>
-          <a:spcPts val="211"/>
+          <a:spcPts val="187"/>
         </a:spcBef>
         <a:buFont typeface="Arial" panose="020B0604020202020204" pitchFamily="34" charset="0"/>
         <a:buChar char="•"/>
-        <a:defRPr sz="758" kern="1200">
+        <a:defRPr sz="673" kern="1200">
           <a:solidFill>
             <a:schemeClr val="tx1"/>
           </a:solidFill>
@@ -12214,16 +13110,16 @@
           <a:cs typeface="+mn-cs"/>
         </a:defRPr>
       </a:lvl6pPr>
-      <a:lvl7pPr marL="1251722" indent="-96286" algn="l" defTabSz="385145" rtl="0" eaLnBrk="1" latinLnBrk="0" hangingPunct="1">
+      <a:lvl7pPr marL="1111453" indent="-85496" algn="l" defTabSz="341986" rtl="0" eaLnBrk="1" latinLnBrk="0" hangingPunct="1">
         <a:lnSpc>
           <a:spcPct val="90000"/>
         </a:lnSpc>
         <a:spcBef>
-          <a:spcPts val="211"/>
+          <a:spcPts val="187"/>
         </a:spcBef>
         <a:buFont typeface="Arial" panose="020B0604020202020204" pitchFamily="34" charset="0"/>
         <a:buChar char="•"/>
-        <a:defRPr sz="758" kern="1200">
+        <a:defRPr sz="673" kern="1200">
           <a:solidFill>
             <a:schemeClr val="tx1"/>
           </a:solidFill>
@@ -12232,16 +13128,16 @@
           <a:cs typeface="+mn-cs"/>
         </a:defRPr>
       </a:lvl7pPr>
-      <a:lvl8pPr marL="1444295" indent="-96286" algn="l" defTabSz="385145" rtl="0" eaLnBrk="1" latinLnBrk="0" hangingPunct="1">
+      <a:lvl8pPr marL="1282446" indent="-85496" algn="l" defTabSz="341986" rtl="0" eaLnBrk="1" latinLnBrk="0" hangingPunct="1">
         <a:lnSpc>
           <a:spcPct val="90000"/>
         </a:lnSpc>
         <a:spcBef>
-          <a:spcPts val="211"/>
+          <a:spcPts val="187"/>
         </a:spcBef>
         <a:buFont typeface="Arial" panose="020B0604020202020204" pitchFamily="34" charset="0"/>
         <a:buChar char="•"/>
-        <a:defRPr sz="758" kern="1200">
+        <a:defRPr sz="673" kern="1200">
           <a:solidFill>
             <a:schemeClr val="tx1"/>
           </a:solidFill>
@@ -12250,16 +13146,16 @@
           <a:cs typeface="+mn-cs"/>
         </a:defRPr>
       </a:lvl8pPr>
-      <a:lvl9pPr marL="1636867" indent="-96286" algn="l" defTabSz="385145" rtl="0" eaLnBrk="1" latinLnBrk="0" hangingPunct="1">
+      <a:lvl9pPr marL="1453439" indent="-85496" algn="l" defTabSz="341986" rtl="0" eaLnBrk="1" latinLnBrk="0" hangingPunct="1">
         <a:lnSpc>
           <a:spcPct val="90000"/>
         </a:lnSpc>
         <a:spcBef>
-          <a:spcPts val="211"/>
+          <a:spcPts val="187"/>
         </a:spcBef>
         <a:buFont typeface="Arial" panose="020B0604020202020204" pitchFamily="34" charset="0"/>
         <a:buChar char="•"/>
-        <a:defRPr sz="758" kern="1200">
+        <a:defRPr sz="673" kern="1200">
           <a:solidFill>
             <a:schemeClr val="tx1"/>
           </a:solidFill>
@@ -12273,8 +13169,8 @@
       <a:defPPr>
         <a:defRPr lang="en-US"/>
       </a:defPPr>
-      <a:lvl1pPr marL="0" algn="l" defTabSz="385145" rtl="0" eaLnBrk="1" latinLnBrk="0" hangingPunct="1">
-        <a:defRPr sz="758" kern="1200">
+      <a:lvl1pPr marL="0" algn="l" defTabSz="341986" rtl="0" eaLnBrk="1" latinLnBrk="0" hangingPunct="1">
+        <a:defRPr sz="673" kern="1200">
           <a:solidFill>
             <a:schemeClr val="tx1"/>
           </a:solidFill>
@@ -12283,8 +13179,8 @@
           <a:cs typeface="+mn-cs"/>
         </a:defRPr>
       </a:lvl1pPr>
-      <a:lvl2pPr marL="192573" algn="l" defTabSz="385145" rtl="0" eaLnBrk="1" latinLnBrk="0" hangingPunct="1">
-        <a:defRPr sz="758" kern="1200">
+      <a:lvl2pPr marL="170993" algn="l" defTabSz="341986" rtl="0" eaLnBrk="1" latinLnBrk="0" hangingPunct="1">
+        <a:defRPr sz="673" kern="1200">
           <a:solidFill>
             <a:schemeClr val="tx1"/>
           </a:solidFill>
@@ -12293,8 +13189,8 @@
           <a:cs typeface="+mn-cs"/>
         </a:defRPr>
       </a:lvl2pPr>
-      <a:lvl3pPr marL="385145" algn="l" defTabSz="385145" rtl="0" eaLnBrk="1" latinLnBrk="0" hangingPunct="1">
-        <a:defRPr sz="758" kern="1200">
+      <a:lvl3pPr marL="341986" algn="l" defTabSz="341986" rtl="0" eaLnBrk="1" latinLnBrk="0" hangingPunct="1">
+        <a:defRPr sz="673" kern="1200">
           <a:solidFill>
             <a:schemeClr val="tx1"/>
           </a:solidFill>
@@ -12303,8 +13199,8 @@
           <a:cs typeface="+mn-cs"/>
         </a:defRPr>
       </a:lvl3pPr>
-      <a:lvl4pPr marL="577718" algn="l" defTabSz="385145" rtl="0" eaLnBrk="1" latinLnBrk="0" hangingPunct="1">
-        <a:defRPr sz="758" kern="1200">
+      <a:lvl4pPr marL="512978" algn="l" defTabSz="341986" rtl="0" eaLnBrk="1" latinLnBrk="0" hangingPunct="1">
+        <a:defRPr sz="673" kern="1200">
           <a:solidFill>
             <a:schemeClr val="tx1"/>
           </a:solidFill>
@@ -12313,8 +13209,8 @@
           <a:cs typeface="+mn-cs"/>
         </a:defRPr>
       </a:lvl4pPr>
-      <a:lvl5pPr marL="770291" algn="l" defTabSz="385145" rtl="0" eaLnBrk="1" latinLnBrk="0" hangingPunct="1">
-        <a:defRPr sz="758" kern="1200">
+      <a:lvl5pPr marL="683971" algn="l" defTabSz="341986" rtl="0" eaLnBrk="1" latinLnBrk="0" hangingPunct="1">
+        <a:defRPr sz="673" kern="1200">
           <a:solidFill>
             <a:schemeClr val="tx1"/>
           </a:solidFill>
@@ -12323,8 +13219,8 @@
           <a:cs typeface="+mn-cs"/>
         </a:defRPr>
       </a:lvl5pPr>
-      <a:lvl6pPr marL="962863" algn="l" defTabSz="385145" rtl="0" eaLnBrk="1" latinLnBrk="0" hangingPunct="1">
-        <a:defRPr sz="758" kern="1200">
+      <a:lvl6pPr marL="854964" algn="l" defTabSz="341986" rtl="0" eaLnBrk="1" latinLnBrk="0" hangingPunct="1">
+        <a:defRPr sz="673" kern="1200">
           <a:solidFill>
             <a:schemeClr val="tx1"/>
           </a:solidFill>
@@ -12333,8 +13229,8 @@
           <a:cs typeface="+mn-cs"/>
         </a:defRPr>
       </a:lvl6pPr>
-      <a:lvl7pPr marL="1155436" algn="l" defTabSz="385145" rtl="0" eaLnBrk="1" latinLnBrk="0" hangingPunct="1">
-        <a:defRPr sz="758" kern="1200">
+      <a:lvl7pPr marL="1025957" algn="l" defTabSz="341986" rtl="0" eaLnBrk="1" latinLnBrk="0" hangingPunct="1">
+        <a:defRPr sz="673" kern="1200">
           <a:solidFill>
             <a:schemeClr val="tx1"/>
           </a:solidFill>
@@ -12343,8 +13239,8 @@
           <a:cs typeface="+mn-cs"/>
         </a:defRPr>
       </a:lvl7pPr>
-      <a:lvl8pPr marL="1348008" algn="l" defTabSz="385145" rtl="0" eaLnBrk="1" latinLnBrk="0" hangingPunct="1">
-        <a:defRPr sz="758" kern="1200">
+      <a:lvl8pPr marL="1196950" algn="l" defTabSz="341986" rtl="0" eaLnBrk="1" latinLnBrk="0" hangingPunct="1">
+        <a:defRPr sz="673" kern="1200">
           <a:solidFill>
             <a:schemeClr val="tx1"/>
           </a:solidFill>
@@ -12353,8 +13249,8 @@
           <a:cs typeface="+mn-cs"/>
         </a:defRPr>
       </a:lvl8pPr>
-      <a:lvl9pPr marL="1540581" algn="l" defTabSz="385145" rtl="0" eaLnBrk="1" latinLnBrk="0" hangingPunct="1">
-        <a:defRPr sz="758" kern="1200">
+      <a:lvl9pPr marL="1367942" algn="l" defTabSz="341986" rtl="0" eaLnBrk="1" latinLnBrk="0" hangingPunct="1">
+        <a:defRPr sz="673" kern="1200">
           <a:solidFill>
             <a:schemeClr val="tx1"/>
           </a:solidFill>
@@ -12385,167 +13281,12 @@
           <a:chExt cx="0" cy="0"/>
         </a:xfrm>
       </p:grpSpPr>
-      <p:cxnSp>
-        <p:nvCxnSpPr>
-          <p:cNvPr id="464" name="Straight Arrow Connector 463">
+      <p:sp>
+        <p:nvSpPr>
+          <p:cNvPr id="123" name="Rectangle: Rounded Corners 122">
             <a:extLst>
               <a:ext uri="{FF2B5EF4-FFF2-40B4-BE49-F238E27FC236}">
-                <a16:creationId xmlns:a16="http://schemas.microsoft.com/office/drawing/2014/main" id="{75691B4B-E77C-4796-BB8B-01D76FB6E5A2}"/>
-              </a:ext>
-            </a:extLst>
-          </p:cNvPr>
-          <p:cNvCxnSpPr>
-            <a:cxnSpLocks/>
-          </p:cNvCxnSpPr>
-          <p:nvPr/>
-        </p:nvCxnSpPr>
-        <p:spPr>
-          <a:xfrm flipH="1" flipV="1">
-            <a:off x="762769" y="388727"/>
-            <a:ext cx="391553" cy="178"/>
-          </a:xfrm>
-          <a:prstGeom prst="straightConnector1">
-            <a:avLst/>
-          </a:prstGeom>
-          <a:ln>
-            <a:solidFill>
-              <a:srgbClr val="787878"/>
-            </a:solidFill>
-            <a:tailEnd type="triangle"/>
-          </a:ln>
-        </p:spPr>
-        <p:style>
-          <a:lnRef idx="1">
-            <a:schemeClr val="accent1"/>
-          </a:lnRef>
-          <a:fillRef idx="0">
-            <a:schemeClr val="accent1"/>
-          </a:fillRef>
-          <a:effectRef idx="0">
-            <a:schemeClr val="accent1"/>
-          </a:effectRef>
-          <a:fontRef idx="minor">
-            <a:schemeClr val="tx1"/>
-          </a:fontRef>
-        </p:style>
-      </p:cxnSp>
-      <p:sp>
-        <p:nvSpPr>
-          <p:cNvPr id="465" name="Rectangle 464">
-            <a:extLst>
-              <a:ext uri="{FF2B5EF4-FFF2-40B4-BE49-F238E27FC236}">
-                <a16:creationId xmlns:a16="http://schemas.microsoft.com/office/drawing/2014/main" id="{7E4A8C36-ACEA-4934-9A43-FFFDB4668CD9}"/>
-              </a:ext>
-            </a:extLst>
-          </p:cNvPr>
-          <p:cNvSpPr/>
-          <p:nvPr/>
-        </p:nvSpPr>
-        <p:spPr>
-          <a:xfrm rot="16200000">
-            <a:off x="765249" y="280727"/>
-            <a:ext cx="453919" cy="216000"/>
-          </a:xfrm>
-          <a:prstGeom prst="rect">
-            <a:avLst/>
-          </a:prstGeom>
-          <a:solidFill>
-            <a:schemeClr val="bg1"/>
-          </a:solidFill>
-          <a:ln w="3175">
-            <a:solidFill>
-              <a:schemeClr val="bg2">
-                <a:lumMod val="50000"/>
-              </a:schemeClr>
-            </a:solidFill>
-          </a:ln>
-        </p:spPr>
-        <p:style>
-          <a:lnRef idx="2">
-            <a:schemeClr val="accent1">
-              <a:shade val="50000"/>
-            </a:schemeClr>
-          </a:lnRef>
-          <a:fillRef idx="1">
-            <a:schemeClr val="accent1"/>
-          </a:fillRef>
-          <a:effectRef idx="0">
-            <a:schemeClr val="accent1"/>
-          </a:effectRef>
-          <a:fontRef idx="minor">
-            <a:schemeClr val="lt1"/>
-          </a:fontRef>
-        </p:style>
-        <p:txBody>
-          <a:bodyPr rtlCol="0" anchor="ctr"/>
-          <a:lstStyle/>
-          <a:p>
-            <a:pPr algn="ctr"/>
-            <a:r>
-              <a:rPr lang="en-GB" sz="600" dirty="0">
-                <a:solidFill>
-                  <a:schemeClr val="tx1">
-                    <a:lumMod val="65000"/>
-                    <a:lumOff val="35000"/>
-                  </a:schemeClr>
-                </a:solidFill>
-                <a:cs typeface="Arial" panose="020B0604020202020204" pitchFamily="34" charset="0"/>
-              </a:rPr>
-              <a:t>MAYBE YES</a:t>
-            </a:r>
-          </a:p>
-        </p:txBody>
-      </p:sp>
-      <p:cxnSp>
-        <p:nvCxnSpPr>
-          <p:cNvPr id="466" name="Straight Arrow Connector 465">
-            <a:extLst>
-              <a:ext uri="{FF2B5EF4-FFF2-40B4-BE49-F238E27FC236}">
-                <a16:creationId xmlns:a16="http://schemas.microsoft.com/office/drawing/2014/main" id="{193E8651-F8C8-4303-8D98-83F9D0C48734}"/>
-              </a:ext>
-            </a:extLst>
-          </p:cNvPr>
-          <p:cNvCxnSpPr>
-            <a:cxnSpLocks/>
-          </p:cNvCxnSpPr>
-          <p:nvPr/>
-        </p:nvCxnSpPr>
-        <p:spPr>
-          <a:xfrm>
-            <a:off x="2328557" y="741424"/>
-            <a:ext cx="0" cy="344459"/>
-          </a:xfrm>
-          <a:prstGeom prst="straightConnector1">
-            <a:avLst/>
-          </a:prstGeom>
-          <a:ln>
-            <a:solidFill>
-              <a:srgbClr val="787878"/>
-            </a:solidFill>
-            <a:tailEnd type="triangle"/>
-          </a:ln>
-        </p:spPr>
-        <p:style>
-          <a:lnRef idx="1">
-            <a:schemeClr val="accent1"/>
-          </a:lnRef>
-          <a:fillRef idx="0">
-            <a:schemeClr val="accent1"/>
-          </a:fillRef>
-          <a:effectRef idx="0">
-            <a:schemeClr val="accent1"/>
-          </a:effectRef>
-          <a:fontRef idx="minor">
-            <a:schemeClr val="tx1"/>
-          </a:fontRef>
-        </p:style>
-      </p:cxnSp>
-      <p:sp>
-        <p:nvSpPr>
-          <p:cNvPr id="467" name="Rectangle: Rounded Corners 466">
-            <a:extLst>
-              <a:ext uri="{FF2B5EF4-FFF2-40B4-BE49-F238E27FC236}">
-                <a16:creationId xmlns:a16="http://schemas.microsoft.com/office/drawing/2014/main" id="{86943C14-87EC-410A-BC98-573650AC41F1}"/>
+                <a16:creationId xmlns:a16="http://schemas.microsoft.com/office/drawing/2014/main" id="{84DC0089-261C-4ECF-988B-D71A4EA98784}"/>
               </a:ext>
             </a:extLst>
           </p:cNvPr>
@@ -12554,123 +13295,7 @@
         </p:nvSpPr>
         <p:spPr>
           <a:xfrm>
-            <a:off x="1743084" y="1085883"/>
-            <a:ext cx="1170946" cy="232229"/>
-          </a:xfrm>
-          <a:prstGeom prst="roundRect">
-            <a:avLst>
-              <a:gd name="adj" fmla="val 50000"/>
-            </a:avLst>
-          </a:prstGeom>
-          <a:solidFill>
-            <a:schemeClr val="accent2">
-              <a:lumMod val="60000"/>
-              <a:lumOff val="40000"/>
-            </a:schemeClr>
-          </a:solidFill>
-          <a:ln w="3175">
-            <a:solidFill>
-              <a:schemeClr val="bg2">
-                <a:lumMod val="50000"/>
-              </a:schemeClr>
-            </a:solidFill>
-          </a:ln>
-        </p:spPr>
-        <p:style>
-          <a:lnRef idx="2">
-            <a:schemeClr val="accent1">
-              <a:shade val="50000"/>
-            </a:schemeClr>
-          </a:lnRef>
-          <a:fillRef idx="1">
-            <a:schemeClr val="accent1"/>
-          </a:fillRef>
-          <a:effectRef idx="0">
-            <a:schemeClr val="accent1"/>
-          </a:effectRef>
-          <a:fontRef idx="minor">
-            <a:schemeClr val="lt1"/>
-          </a:fontRef>
-        </p:style>
-        <p:txBody>
-          <a:bodyPr rtlCol="0" anchor="ctr"/>
-          <a:lstStyle/>
-          <a:p>
-            <a:pPr algn="ctr"/>
-            <a:r>
-              <a:rPr lang="en-GB" sz="600" dirty="0">
-                <a:solidFill>
-                  <a:schemeClr val="tx1">
-                    <a:lumMod val="65000"/>
-                    <a:lumOff val="35000"/>
-                  </a:schemeClr>
-                </a:solidFill>
-                <a:cs typeface="Arial" panose="020B0604020202020204" pitchFamily="34" charset="0"/>
-              </a:rPr>
-              <a:t>Experiment Starts</a:t>
-            </a:r>
-          </a:p>
-        </p:txBody>
-      </p:sp>
-      <p:cxnSp>
-        <p:nvCxnSpPr>
-          <p:cNvPr id="468" name="Straight Arrow Connector 467">
-            <a:extLst>
-              <a:ext uri="{FF2B5EF4-FFF2-40B4-BE49-F238E27FC236}">
-                <a16:creationId xmlns:a16="http://schemas.microsoft.com/office/drawing/2014/main" id="{9DD7E5C2-1609-468A-82D6-2A16EF983E36}"/>
-              </a:ext>
-            </a:extLst>
-          </p:cNvPr>
-          <p:cNvCxnSpPr>
-            <a:cxnSpLocks/>
-          </p:cNvCxnSpPr>
-          <p:nvPr/>
-        </p:nvCxnSpPr>
-        <p:spPr>
-          <a:xfrm flipH="1">
-            <a:off x="2327963" y="1318112"/>
-            <a:ext cx="1188" cy="178707"/>
-          </a:xfrm>
-          <a:prstGeom prst="straightConnector1">
-            <a:avLst/>
-          </a:prstGeom>
-          <a:ln>
-            <a:solidFill>
-              <a:srgbClr val="787878"/>
-            </a:solidFill>
-            <a:tailEnd type="triangle"/>
-          </a:ln>
-        </p:spPr>
-        <p:style>
-          <a:lnRef idx="1">
-            <a:schemeClr val="accent1"/>
-          </a:lnRef>
-          <a:fillRef idx="0">
-            <a:schemeClr val="accent1"/>
-          </a:fillRef>
-          <a:effectRef idx="0">
-            <a:schemeClr val="accent1"/>
-          </a:effectRef>
-          <a:fontRef idx="minor">
-            <a:schemeClr val="tx1"/>
-          </a:fontRef>
-        </p:style>
-      </p:cxnSp>
-      <p:sp>
-        <p:nvSpPr>
-          <p:cNvPr id="469" name="Rectangle: Rounded Corners 468">
-            <a:extLst>
-              <a:ext uri="{FF2B5EF4-FFF2-40B4-BE49-F238E27FC236}">
-                <a16:creationId xmlns:a16="http://schemas.microsoft.com/office/drawing/2014/main" id="{940EA5CF-51CB-4A73-9091-059198B034AB}"/>
-              </a:ext>
-            </a:extLst>
-          </p:cNvPr>
-          <p:cNvSpPr/>
-          <p:nvPr/>
-        </p:nvSpPr>
-        <p:spPr>
-          <a:xfrm>
-            <a:off x="1270911" y="1500739"/>
+            <a:off x="956362" y="78680"/>
             <a:ext cx="2115292" cy="252000"/>
           </a:xfrm>
           <a:prstGeom prst="roundRect">
@@ -12727,10 +13352,10 @@
       </p:sp>
       <p:cxnSp>
         <p:nvCxnSpPr>
-          <p:cNvPr id="470" name="Straight Arrow Connector 469">
+          <p:cNvPr id="124" name="Straight Arrow Connector 123">
             <a:extLst>
               <a:ext uri="{FF2B5EF4-FFF2-40B4-BE49-F238E27FC236}">
-                <a16:creationId xmlns:a16="http://schemas.microsoft.com/office/drawing/2014/main" id="{1D912F61-18BF-45F1-8389-0ACC0EF66490}"/>
+                <a16:creationId xmlns:a16="http://schemas.microsoft.com/office/drawing/2014/main" id="{779677BE-F1CA-4B29-924A-C7DA79280957}"/>
               </a:ext>
             </a:extLst>
           </p:cNvPr>
@@ -12741,7 +13366,7 @@
         </p:nvCxnSpPr>
         <p:spPr>
           <a:xfrm flipH="1">
-            <a:off x="2328557" y="2178524"/>
+            <a:off x="2014008" y="756465"/>
             <a:ext cx="1" cy="173350"/>
           </a:xfrm>
           <a:prstGeom prst="straightConnector1">
@@ -12771,10 +13396,10 @@
       </p:cxnSp>
       <p:sp>
         <p:nvSpPr>
-          <p:cNvPr id="471" name="Rectangle: Rounded Corners 470">
+          <p:cNvPr id="125" name="Rectangle: Rounded Corners 124">
             <a:extLst>
               <a:ext uri="{FF2B5EF4-FFF2-40B4-BE49-F238E27FC236}">
-                <a16:creationId xmlns:a16="http://schemas.microsoft.com/office/drawing/2014/main" id="{C4E711C0-194D-40B8-930F-D98FB7AA7C5B}"/>
+                <a16:creationId xmlns:a16="http://schemas.microsoft.com/office/drawing/2014/main" id="{23F4192C-3C5C-4058-ABA6-8D0D8ABD186A}"/>
               </a:ext>
             </a:extLst>
           </p:cNvPr>
@@ -12783,8 +13408,8 @@
         </p:nvSpPr>
         <p:spPr>
           <a:xfrm>
-            <a:off x="1270911" y="2351874"/>
-            <a:ext cx="2115292" cy="252000"/>
+            <a:off x="953163" y="927035"/>
+            <a:ext cx="2115292" cy="360000"/>
           </a:xfrm>
           <a:prstGeom prst="roundRect">
             <a:avLst>
@@ -12833,17 +13458,17 @@
                 </a:solidFill>
                 <a:cs typeface="Arial" panose="020B0604020202020204" pitchFamily="34" charset="0"/>
               </a:rPr>
-              <a:t>Submission of a written summary on ecPoint performance predicting extreme localized rainfall events.</a:t>
+              <a:t>Evaluation of ecPoint performance in the prediction of extreme localized rainfall events. Submission of a written summary report.</a:t>
             </a:r>
           </a:p>
         </p:txBody>
       </p:sp>
       <p:sp>
         <p:nvSpPr>
-          <p:cNvPr id="472" name="Rectangle: Rounded Corners 471">
+          <p:cNvPr id="126" name="Rectangle: Rounded Corners 125">
             <a:extLst>
               <a:ext uri="{FF2B5EF4-FFF2-40B4-BE49-F238E27FC236}">
-                <a16:creationId xmlns:a16="http://schemas.microsoft.com/office/drawing/2014/main" id="{1119BC35-51E7-4626-B6ED-4897A9F600B0}"/>
+                <a16:creationId xmlns:a16="http://schemas.microsoft.com/office/drawing/2014/main" id="{5B54B95C-2773-40A2-B228-8900DEBA412C}"/>
               </a:ext>
             </a:extLst>
           </p:cNvPr>
@@ -12852,8 +13477,8 @@
         </p:nvSpPr>
         <p:spPr>
           <a:xfrm>
-            <a:off x="1270911" y="2783922"/>
-            <a:ext cx="2115292" cy="126000"/>
+            <a:off x="953163" y="1504133"/>
+            <a:ext cx="1040226" cy="360000"/>
           </a:xfrm>
           <a:prstGeom prst="roundRect">
             <a:avLst>
@@ -12902,29 +13527,31 @@
                 </a:solidFill>
                 <a:cs typeface="Arial" panose="020B0604020202020204" pitchFamily="34" charset="0"/>
               </a:rPr>
-              <a:t>Analysis of independent evaluation for ecPoint forecasts.</a:t>
+              <a:t>Review of the independent results presented in the summary reports.</a:t>
             </a:r>
           </a:p>
         </p:txBody>
       </p:sp>
       <p:cxnSp>
         <p:nvCxnSpPr>
-          <p:cNvPr id="473" name="Straight Arrow Connector 472">
+          <p:cNvPr id="127" name="Straight Arrow Connector 126">
             <a:extLst>
               <a:ext uri="{FF2B5EF4-FFF2-40B4-BE49-F238E27FC236}">
-                <a16:creationId xmlns:a16="http://schemas.microsoft.com/office/drawing/2014/main" id="{210E6C84-CEB0-4CEA-A919-26B184C4B491}"/>
+                <a16:creationId xmlns:a16="http://schemas.microsoft.com/office/drawing/2014/main" id="{A0ACE071-FEF5-4EDD-B496-2708F7773D1F}"/>
               </a:ext>
             </a:extLst>
           </p:cNvPr>
           <p:cNvCxnSpPr>
             <a:cxnSpLocks/>
+            <a:stCxn id="164" idx="2"/>
+            <a:endCxn id="156" idx="0"/>
           </p:cNvCxnSpPr>
           <p:nvPr/>
         </p:nvCxnSpPr>
         <p:spPr>
           <a:xfrm flipH="1">
-            <a:off x="2327352" y="2909922"/>
-            <a:ext cx="2411" cy="180000"/>
+            <a:off x="2010809" y="1864988"/>
+            <a:ext cx="542114" cy="155741"/>
           </a:xfrm>
           <a:prstGeom prst="straightConnector1">
             <a:avLst/>
@@ -12953,10 +13580,10 @@
       </p:cxnSp>
       <p:sp>
         <p:nvSpPr>
-          <p:cNvPr id="474" name="Rectangle: Rounded Corners 473">
+          <p:cNvPr id="128" name="Rectangle: Rounded Corners 127">
             <a:extLst>
               <a:ext uri="{FF2B5EF4-FFF2-40B4-BE49-F238E27FC236}">
-                <a16:creationId xmlns:a16="http://schemas.microsoft.com/office/drawing/2014/main" id="{A19F4E61-1A10-4150-8AD7-ED10EF1781B4}"/>
+                <a16:creationId xmlns:a16="http://schemas.microsoft.com/office/drawing/2014/main" id="{0E29CBF7-C8DD-4BC2-BB7F-51E2D06DB315}"/>
               </a:ext>
             </a:extLst>
           </p:cNvPr>
@@ -12965,7 +13592,7 @@
         </p:nvSpPr>
         <p:spPr>
           <a:xfrm>
-            <a:off x="1269729" y="3984001"/>
+            <a:off x="959780" y="2745172"/>
             <a:ext cx="2117657" cy="360000"/>
           </a:xfrm>
           <a:prstGeom prst="roundRect">
@@ -13015,17 +13642,17 @@
                 </a:solidFill>
                 <a:cs typeface="Arial" panose="020B0604020202020204" pitchFamily="34" charset="0"/>
               </a:rPr>
-              <a:t>Remote joint evaluation about why the training provided on ecPoint did not allow forecasters to use the forecasts more effectively.</a:t>
+              <a:t>Joint evaluation about why the ecPoint training/guidance did not allow forecasters to use the forecasts more effectively.</a:t>
             </a:r>
           </a:p>
         </p:txBody>
       </p:sp>
       <p:sp>
         <p:nvSpPr>
-          <p:cNvPr id="475" name="Rectangle: Rounded Corners 474">
+          <p:cNvPr id="129" name="Rectangle: Rounded Corners 128">
             <a:extLst>
               <a:ext uri="{FF2B5EF4-FFF2-40B4-BE49-F238E27FC236}">
-                <a16:creationId xmlns:a16="http://schemas.microsoft.com/office/drawing/2014/main" id="{4D8F7A0B-EC7F-4F99-9928-2825185793A5}"/>
+                <a16:creationId xmlns:a16="http://schemas.microsoft.com/office/drawing/2014/main" id="{641C321A-289F-4254-8AB0-381EE0E91068}"/>
               </a:ext>
             </a:extLst>
           </p:cNvPr>
@@ -13034,7 +13661,7 @@
         </p:nvSpPr>
         <p:spPr>
           <a:xfrm>
-            <a:off x="1268500" y="4518193"/>
+            <a:off x="958551" y="3279364"/>
             <a:ext cx="2120114" cy="126000"/>
           </a:xfrm>
           <a:prstGeom prst="roundRect">
@@ -13084,17 +13711,17 @@
                 </a:solidFill>
                 <a:cs typeface="Arial" panose="020B0604020202020204" pitchFamily="34" charset="0"/>
               </a:rPr>
-              <a:t>Formulation of new ecPoint-tailored guidelines.</a:t>
+              <a:t>Joint formulation of new ecPoint-tailored training/guidance.</a:t>
             </a:r>
           </a:p>
         </p:txBody>
       </p:sp>
       <p:cxnSp>
         <p:nvCxnSpPr>
-          <p:cNvPr id="476" name="Straight Arrow Connector 475">
+          <p:cNvPr id="130" name="Straight Arrow Connector 129">
             <a:extLst>
               <a:ext uri="{FF2B5EF4-FFF2-40B4-BE49-F238E27FC236}">
-                <a16:creationId xmlns:a16="http://schemas.microsoft.com/office/drawing/2014/main" id="{38719470-206E-4A4E-BFE2-093C68FF3B57}"/>
+                <a16:creationId xmlns:a16="http://schemas.microsoft.com/office/drawing/2014/main" id="{8D749B95-1A18-4FB9-9607-1B45BA525832}"/>
               </a:ext>
             </a:extLst>
           </p:cNvPr>
@@ -13105,7 +13732,7 @@
         </p:nvCxnSpPr>
         <p:spPr>
           <a:xfrm flipH="1">
-            <a:off x="2328557" y="4344001"/>
+            <a:off x="2018608" y="3105172"/>
             <a:ext cx="1" cy="180000"/>
           </a:xfrm>
           <a:prstGeom prst="straightConnector1">
@@ -13135,23 +13762,23 @@
       </p:cxnSp>
       <p:cxnSp>
         <p:nvCxnSpPr>
-          <p:cNvPr id="477" name="Straight Arrow Connector 476">
+          <p:cNvPr id="131" name="Straight Arrow Connector 130">
             <a:extLst>
               <a:ext uri="{FF2B5EF4-FFF2-40B4-BE49-F238E27FC236}">
-                <a16:creationId xmlns:a16="http://schemas.microsoft.com/office/drawing/2014/main" id="{A321CF49-6A0A-4932-85D5-5D87C6BE289E}"/>
+                <a16:creationId xmlns:a16="http://schemas.microsoft.com/office/drawing/2014/main" id="{BB28CEDE-5F36-4E77-B6B6-C592E749D0F0}"/>
               </a:ext>
             </a:extLst>
           </p:cNvPr>
           <p:cNvCxnSpPr>
             <a:cxnSpLocks/>
-            <a:stCxn id="475" idx="2"/>
-            <a:endCxn id="478" idx="0"/>
+            <a:stCxn id="129" idx="2"/>
+            <a:endCxn id="132" idx="0"/>
           </p:cNvCxnSpPr>
           <p:nvPr/>
         </p:nvCxnSpPr>
         <p:spPr>
           <a:xfrm>
-            <a:off x="2328557" y="4644193"/>
+            <a:off x="2018608" y="3405364"/>
             <a:ext cx="3317" cy="180000"/>
           </a:xfrm>
           <a:prstGeom prst="straightConnector1">
@@ -13181,10 +13808,10 @@
       </p:cxnSp>
       <p:sp>
         <p:nvSpPr>
-          <p:cNvPr id="478" name="Rectangle: Rounded Corners 477">
+          <p:cNvPr id="132" name="Rectangle: Rounded Corners 131">
             <a:extLst>
               <a:ext uri="{FF2B5EF4-FFF2-40B4-BE49-F238E27FC236}">
-                <a16:creationId xmlns:a16="http://schemas.microsoft.com/office/drawing/2014/main" id="{9093A179-0643-4200-BC81-1F92BAEC0D6D}"/>
+                <a16:creationId xmlns:a16="http://schemas.microsoft.com/office/drawing/2014/main" id="{6817A596-B104-4B0F-9058-DF24083B0509}"/>
               </a:ext>
             </a:extLst>
           </p:cNvPr>
@@ -13193,7 +13820,7 @@
         </p:nvSpPr>
         <p:spPr>
           <a:xfrm>
-            <a:off x="1276361" y="4824193"/>
+            <a:off x="966412" y="3585364"/>
             <a:ext cx="2111025" cy="336914"/>
           </a:xfrm>
           <a:prstGeom prst="roundRect">
@@ -13243,17 +13870,17 @@
                 </a:solidFill>
                 <a:cs typeface="Arial" panose="020B0604020202020204" pitchFamily="34" charset="0"/>
               </a:rPr>
-              <a:t>Joint revision of the case studies proposed by the volunteer testers under the revised guidelines for interpreting ecPoint.</a:t>
+              <a:t>Joint revision of the case studies under the revised ecPoint-tailored training/guidance.</a:t>
             </a:r>
           </a:p>
         </p:txBody>
       </p:sp>
       <p:cxnSp>
         <p:nvCxnSpPr>
-          <p:cNvPr id="479" name="Straight Arrow Connector 478">
+          <p:cNvPr id="133" name="Straight Arrow Connector 132">
             <a:extLst>
               <a:ext uri="{FF2B5EF4-FFF2-40B4-BE49-F238E27FC236}">
-                <a16:creationId xmlns:a16="http://schemas.microsoft.com/office/drawing/2014/main" id="{12B7FDCF-F12E-41EF-8BB2-4C166479BE55}"/>
+                <a16:creationId xmlns:a16="http://schemas.microsoft.com/office/drawing/2014/main" id="{61A5576A-A84F-47D4-8F98-179D82A4EB18}"/>
               </a:ext>
             </a:extLst>
           </p:cNvPr>
@@ -13264,7 +13891,7 @@
         </p:nvCxnSpPr>
         <p:spPr>
           <a:xfrm>
-            <a:off x="839033" y="4162679"/>
+            <a:off x="529084" y="2923850"/>
             <a:ext cx="429248" cy="0"/>
           </a:xfrm>
           <a:prstGeom prst="straightConnector1">
@@ -13294,10 +13921,10 @@
       </p:cxnSp>
       <p:cxnSp>
         <p:nvCxnSpPr>
-          <p:cNvPr id="480" name="Straight Connector 479">
+          <p:cNvPr id="134" name="Straight Connector 133">
             <a:extLst>
               <a:ext uri="{FF2B5EF4-FFF2-40B4-BE49-F238E27FC236}">
-                <a16:creationId xmlns:a16="http://schemas.microsoft.com/office/drawing/2014/main" id="{A16C58AA-44A1-4310-8E0C-8360307174A0}"/>
+                <a16:creationId xmlns:a16="http://schemas.microsoft.com/office/drawing/2014/main" id="{D70564B0-29DB-4AB5-BEC0-71F5045299D6}"/>
               </a:ext>
             </a:extLst>
           </p:cNvPr>
@@ -13308,8 +13935,8 @@
         </p:nvCxnSpPr>
         <p:spPr>
           <a:xfrm>
-            <a:off x="839033" y="5620553"/>
-            <a:ext cx="435687" cy="0"/>
+            <a:off x="529084" y="4289019"/>
+            <a:ext cx="813541" cy="0"/>
           </a:xfrm>
           <a:prstGeom prst="line">
             <a:avLst/>
@@ -13337,10 +13964,10 @@
       </p:cxnSp>
       <p:cxnSp>
         <p:nvCxnSpPr>
-          <p:cNvPr id="481" name="Straight Connector 480">
+          <p:cNvPr id="135" name="Straight Connector 134">
             <a:extLst>
               <a:ext uri="{FF2B5EF4-FFF2-40B4-BE49-F238E27FC236}">
-                <a16:creationId xmlns:a16="http://schemas.microsoft.com/office/drawing/2014/main" id="{5F2AD006-A552-41E6-95B9-1636A153302D}"/>
+                <a16:creationId xmlns:a16="http://schemas.microsoft.com/office/drawing/2014/main" id="{D77F8E08-D9F1-43C5-A42E-AAA8F781242D}"/>
               </a:ext>
             </a:extLst>
           </p:cNvPr>
@@ -13351,8 +13978,8 @@
         </p:nvCxnSpPr>
         <p:spPr>
           <a:xfrm flipH="1">
-            <a:off x="842070" y="4162679"/>
-            <a:ext cx="1" cy="1457874"/>
+            <a:off x="532122" y="2923850"/>
+            <a:ext cx="1" cy="1365169"/>
           </a:xfrm>
           <a:prstGeom prst="line">
             <a:avLst/>
@@ -13380,10 +14007,10 @@
       </p:cxnSp>
       <p:sp>
         <p:nvSpPr>
-          <p:cNvPr id="482" name="Parallelogram 481">
+          <p:cNvPr id="136" name="Parallelogram 135">
             <a:extLst>
               <a:ext uri="{FF2B5EF4-FFF2-40B4-BE49-F238E27FC236}">
-                <a16:creationId xmlns:a16="http://schemas.microsoft.com/office/drawing/2014/main" id="{1BA5B42F-57FF-4AF9-95DA-7475D36127FA}"/>
+                <a16:creationId xmlns:a16="http://schemas.microsoft.com/office/drawing/2014/main" id="{65BDA3E8-CD6A-4FD2-85E7-470CB2949112}"/>
               </a:ext>
             </a:extLst>
           </p:cNvPr>
@@ -13392,8 +14019,8 @@
         </p:nvSpPr>
         <p:spPr>
           <a:xfrm>
-            <a:off x="1754448" y="6198043"/>
-            <a:ext cx="1166232" cy="275682"/>
+            <a:off x="1337704" y="4780239"/>
+            <a:ext cx="1368516" cy="275682"/>
           </a:xfrm>
           <a:prstGeom prst="parallelogram">
             <a:avLst/>
@@ -13443,17 +14070,17 @@
                 </a:solidFill>
                 <a:cs typeface="Arial" panose="020B0604020202020204" pitchFamily="34" charset="0"/>
               </a:rPr>
-              <a:t>Publication of revised ecPoint guidelines</a:t>
+              <a:t>Publication of ecPoint-tailored training/guidelines.</a:t>
             </a:r>
           </a:p>
         </p:txBody>
       </p:sp>
       <p:cxnSp>
         <p:nvCxnSpPr>
-          <p:cNvPr id="483" name="Straight Arrow Connector 482">
+          <p:cNvPr id="137" name="Straight Arrow Connector 136">
             <a:extLst>
               <a:ext uri="{FF2B5EF4-FFF2-40B4-BE49-F238E27FC236}">
-                <a16:creationId xmlns:a16="http://schemas.microsoft.com/office/drawing/2014/main" id="{5E81445C-631F-4E15-9AEE-5817B4B59DC0}"/>
+                <a16:creationId xmlns:a16="http://schemas.microsoft.com/office/drawing/2014/main" id="{CADFB0E7-6D8C-4035-9DD4-6196FBF02B45}"/>
               </a:ext>
             </a:extLst>
           </p:cNvPr>
@@ -13464,7 +14091,7 @@
         </p:nvCxnSpPr>
         <p:spPr>
           <a:xfrm>
-            <a:off x="2335795" y="5908508"/>
+            <a:off x="2022382" y="4490704"/>
             <a:ext cx="3539" cy="289535"/>
           </a:xfrm>
           <a:prstGeom prst="straightConnector1">
@@ -13494,10 +14121,10 @@
       </p:cxnSp>
       <p:sp>
         <p:nvSpPr>
-          <p:cNvPr id="484" name="Rectangle 483">
+          <p:cNvPr id="138" name="Rectangle 137">
             <a:extLst>
               <a:ext uri="{FF2B5EF4-FFF2-40B4-BE49-F238E27FC236}">
-                <a16:creationId xmlns:a16="http://schemas.microsoft.com/office/drawing/2014/main" id="{B28BE4E2-67A1-4538-9540-7C2B4B84B733}"/>
+                <a16:creationId xmlns:a16="http://schemas.microsoft.com/office/drawing/2014/main" id="{C304CC4C-4F2F-4821-A035-78B87CC1C778}"/>
               </a:ext>
             </a:extLst>
           </p:cNvPr>
@@ -13506,7 +14133,7 @@
         </p:nvSpPr>
         <p:spPr>
           <a:xfrm>
-            <a:off x="2167984" y="5946714"/>
+            <a:off x="1854571" y="4528910"/>
             <a:ext cx="339160" cy="149676"/>
           </a:xfrm>
           <a:prstGeom prst="rect">
@@ -13561,10 +14188,10 @@
       </p:sp>
       <p:sp>
         <p:nvSpPr>
-          <p:cNvPr id="485" name="Diamond 484">
+          <p:cNvPr id="139" name="Rectangle: Rounded Corners 138">
             <a:extLst>
               <a:ext uri="{FF2B5EF4-FFF2-40B4-BE49-F238E27FC236}">
-                <a16:creationId xmlns:a16="http://schemas.microsoft.com/office/drawing/2014/main" id="{B4A68F6B-316B-4B6F-B4B8-F1475E887874}"/>
+                <a16:creationId xmlns:a16="http://schemas.microsoft.com/office/drawing/2014/main" id="{E76AD702-9494-459F-814C-C0F84321D4FE}"/>
               </a:ext>
             </a:extLst>
           </p:cNvPr>
@@ -13573,144 +14200,7 @@
         </p:nvSpPr>
         <p:spPr>
           <a:xfrm>
-            <a:off x="1157375" y="41308"/>
-            <a:ext cx="2342364" cy="700116"/>
-          </a:xfrm>
-          <a:prstGeom prst="diamond">
-            <a:avLst/>
-          </a:prstGeom>
-          <a:solidFill>
-            <a:srgbClr val="FFDF57"/>
-          </a:solidFill>
-          <a:ln w="3175">
-            <a:solidFill>
-              <a:schemeClr val="bg2">
-                <a:lumMod val="75000"/>
-              </a:schemeClr>
-            </a:solidFill>
-          </a:ln>
-        </p:spPr>
-        <p:style>
-          <a:lnRef idx="2">
-            <a:schemeClr val="accent1">
-              <a:shade val="50000"/>
-            </a:schemeClr>
-          </a:lnRef>
-          <a:fillRef idx="1">
-            <a:schemeClr val="accent1"/>
-          </a:fillRef>
-          <a:effectRef idx="0">
-            <a:schemeClr val="accent1"/>
-          </a:effectRef>
-          <a:fontRef idx="minor">
-            <a:schemeClr val="lt1"/>
-          </a:fontRef>
-        </p:style>
-        <p:txBody>
-          <a:bodyPr rtlCol="0" anchor="ctr"/>
-          <a:lstStyle/>
-          <a:p>
-            <a:pPr algn="ctr"/>
-            <a:endParaRPr lang="en-GB" sz="600" dirty="0">
-              <a:solidFill>
-                <a:schemeClr val="tx1">
-                  <a:lumMod val="65000"/>
-                  <a:lumOff val="35000"/>
-                </a:schemeClr>
-              </a:solidFill>
-              <a:cs typeface="Arial" panose="020B0604020202020204" pitchFamily="34" charset="0"/>
-            </a:endParaRPr>
-          </a:p>
-        </p:txBody>
-      </p:sp>
-      <p:sp>
-        <p:nvSpPr>
-          <p:cNvPr id="486" name="Rectangle 485">
-            <a:extLst>
-              <a:ext uri="{FF2B5EF4-FFF2-40B4-BE49-F238E27FC236}">
-                <a16:creationId xmlns:a16="http://schemas.microsoft.com/office/drawing/2014/main" id="{C5EA621A-1ABE-4A5E-A0AA-81CE869A521E}"/>
-              </a:ext>
-            </a:extLst>
-          </p:cNvPr>
-          <p:cNvSpPr/>
-          <p:nvPr/>
-        </p:nvSpPr>
-        <p:spPr>
-          <a:xfrm>
-            <a:off x="1572086" y="-224589"/>
-            <a:ext cx="1512943" cy="1166298"/>
-          </a:xfrm>
-          <a:prstGeom prst="rect">
-            <a:avLst/>
-          </a:prstGeom>
-          <a:noFill/>
-          <a:ln w="3175">
-            <a:noFill/>
-          </a:ln>
-        </p:spPr>
-        <p:style>
-          <a:lnRef idx="2">
-            <a:schemeClr val="accent1">
-              <a:shade val="50000"/>
-            </a:schemeClr>
-          </a:lnRef>
-          <a:fillRef idx="1">
-            <a:schemeClr val="accent1"/>
-          </a:fillRef>
-          <a:effectRef idx="0">
-            <a:schemeClr val="accent1"/>
-          </a:effectRef>
-          <a:fontRef idx="minor">
-            <a:schemeClr val="lt1"/>
-          </a:fontRef>
-        </p:style>
-        <p:txBody>
-          <a:bodyPr rtlCol="0" anchor="ctr"/>
-          <a:lstStyle/>
-          <a:p>
-            <a:pPr algn="ctr"/>
-            <a:endParaRPr lang="en-GB" sz="600" dirty="0">
-              <a:solidFill>
-                <a:schemeClr val="tx1">
-                  <a:lumMod val="65000"/>
-                  <a:lumOff val="35000"/>
-                </a:schemeClr>
-              </a:solidFill>
-              <a:cs typeface="Arial" panose="020B0604020202020204" pitchFamily="34" charset="0"/>
-            </a:endParaRPr>
-          </a:p>
-          <a:p>
-            <a:pPr algn="ctr"/>
-            <a:r>
-              <a:rPr lang="en-GB" sz="600" dirty="0">
-                <a:solidFill>
-                  <a:schemeClr val="tx1">
-                    <a:lumMod val="65000"/>
-                    <a:lumOff val="35000"/>
-                  </a:schemeClr>
-                </a:solidFill>
-                <a:cs typeface="Arial" panose="020B0604020202020204" pitchFamily="34" charset="0"/>
-              </a:rPr>
-              <a:t>Can traditional guidelines for interpreting PEFs be effectively used also to understand ecPoint forecasts?</a:t>
-            </a:r>
-          </a:p>
-        </p:txBody>
-      </p:sp>
-      <p:sp>
-        <p:nvSpPr>
-          <p:cNvPr id="487" name="Rectangle: Rounded Corners 486">
-            <a:extLst>
-              <a:ext uri="{FF2B5EF4-FFF2-40B4-BE49-F238E27FC236}">
-                <a16:creationId xmlns:a16="http://schemas.microsoft.com/office/drawing/2014/main" id="{B76A406E-8FD9-481E-A564-E98C5B9F7752}"/>
-              </a:ext>
-            </a:extLst>
-          </p:cNvPr>
-          <p:cNvSpPr/>
-          <p:nvPr/>
-        </p:nvSpPr>
-        <p:spPr>
-          <a:xfrm>
-            <a:off x="1270912" y="1928090"/>
+            <a:off x="956363" y="506031"/>
             <a:ext cx="2115291" cy="250434"/>
           </a:xfrm>
           <a:prstGeom prst="roundRect">
@@ -13760,31 +14250,31 @@
                 </a:solidFill>
                 <a:cs typeface="Arial" panose="020B0604020202020204" pitchFamily="34" charset="0"/>
               </a:rPr>
-              <a:t>Use of ecPoint-Rainfall in an operational environment to predict extreme localized rainfall events.</a:t>
+              <a:t>Use of ecPoint-Rainfall forecasts to predict extreme localized rainfall events over a one-year period.</a:t>
             </a:r>
           </a:p>
         </p:txBody>
       </p:sp>
       <p:cxnSp>
         <p:nvCxnSpPr>
-          <p:cNvPr id="488" name="Straight Arrow Connector 487">
+          <p:cNvPr id="140" name="Straight Arrow Connector 139">
             <a:extLst>
               <a:ext uri="{FF2B5EF4-FFF2-40B4-BE49-F238E27FC236}">
-                <a16:creationId xmlns:a16="http://schemas.microsoft.com/office/drawing/2014/main" id="{25235E40-861D-42FD-9785-9DE68838D344}"/>
+                <a16:creationId xmlns:a16="http://schemas.microsoft.com/office/drawing/2014/main" id="{77025495-4DB6-4AA0-AC52-619158943D75}"/>
               </a:ext>
             </a:extLst>
           </p:cNvPr>
           <p:cNvCxnSpPr>
             <a:cxnSpLocks/>
-            <a:stCxn id="478" idx="2"/>
-            <a:endCxn id="509" idx="0"/>
+            <a:stCxn id="132" idx="2"/>
+            <a:endCxn id="168" idx="0"/>
           </p:cNvCxnSpPr>
           <p:nvPr/>
         </p:nvCxnSpPr>
         <p:spPr>
           <a:xfrm>
-            <a:off x="2331874" y="5161107"/>
-            <a:ext cx="3921" cy="177877"/>
+            <a:off x="2021925" y="3922278"/>
+            <a:ext cx="37" cy="168919"/>
           </a:xfrm>
           <a:prstGeom prst="straightConnector1">
             <a:avLst/>
@@ -13813,10 +14303,10 @@
       </p:cxnSp>
       <p:sp>
         <p:nvSpPr>
-          <p:cNvPr id="489" name="Rectangle 488">
+          <p:cNvPr id="141" name="Rectangle 140">
             <a:extLst>
               <a:ext uri="{FF2B5EF4-FFF2-40B4-BE49-F238E27FC236}">
-                <a16:creationId xmlns:a16="http://schemas.microsoft.com/office/drawing/2014/main" id="{B52029EA-D598-4E53-B992-ABA34CDA8998}"/>
+                <a16:creationId xmlns:a16="http://schemas.microsoft.com/office/drawing/2014/main" id="{6EFF9339-92AE-4BCC-B827-F8C4CBEB346C}"/>
               </a:ext>
             </a:extLst>
           </p:cNvPr>
@@ -13825,8 +14315,8 @@
         </p:nvSpPr>
         <p:spPr>
           <a:xfrm>
-            <a:off x="1173370" y="1818828"/>
-            <a:ext cx="2268000" cy="830646"/>
+            <a:off x="892555" y="395020"/>
+            <a:ext cx="2234266" cy="941102"/>
           </a:xfrm>
           <a:prstGeom prst="rect">
             <a:avLst/>
@@ -13873,10 +14363,10 @@
       </p:sp>
       <p:cxnSp>
         <p:nvCxnSpPr>
-          <p:cNvPr id="490" name="Straight Arrow Connector 489">
+          <p:cNvPr id="142" name="Straight Arrow Connector 141">
             <a:extLst>
               <a:ext uri="{FF2B5EF4-FFF2-40B4-BE49-F238E27FC236}">
-                <a16:creationId xmlns:a16="http://schemas.microsoft.com/office/drawing/2014/main" id="{FD6CE3EE-599C-432B-BB56-85AB48FE0E2F}"/>
+                <a16:creationId xmlns:a16="http://schemas.microsoft.com/office/drawing/2014/main" id="{BA749652-883D-479B-B132-F405B264D034}"/>
               </a:ext>
             </a:extLst>
           </p:cNvPr>
@@ -13887,7 +14377,7 @@
         </p:nvCxnSpPr>
         <p:spPr>
           <a:xfrm flipH="1">
-            <a:off x="2327488" y="1752739"/>
+            <a:off x="2012939" y="330680"/>
             <a:ext cx="2139" cy="179999"/>
           </a:xfrm>
           <a:prstGeom prst="straightConnector1">
@@ -13917,22 +14407,24 @@
       </p:cxnSp>
       <p:cxnSp>
         <p:nvCxnSpPr>
-          <p:cNvPr id="491" name="Straight Arrow Connector 490">
+          <p:cNvPr id="143" name="Straight Arrow Connector 142">
             <a:extLst>
               <a:ext uri="{FF2B5EF4-FFF2-40B4-BE49-F238E27FC236}">
-                <a16:creationId xmlns:a16="http://schemas.microsoft.com/office/drawing/2014/main" id="{4BE0223C-F6BA-4CB4-9B36-41241FDC2F05}"/>
+                <a16:creationId xmlns:a16="http://schemas.microsoft.com/office/drawing/2014/main" id="{F4349C01-53B4-45C7-B08A-A6FB18E85FAC}"/>
               </a:ext>
             </a:extLst>
           </p:cNvPr>
           <p:cNvCxnSpPr>
             <a:cxnSpLocks/>
+            <a:stCxn id="125" idx="2"/>
+            <a:endCxn id="126" idx="0"/>
           </p:cNvCxnSpPr>
           <p:nvPr/>
         </p:nvCxnSpPr>
         <p:spPr>
-          <a:xfrm>
-            <a:off x="2328557" y="2603874"/>
-            <a:ext cx="0" cy="180048"/>
+          <a:xfrm flipH="1">
+            <a:off x="1473276" y="1287035"/>
+            <a:ext cx="537533" cy="217098"/>
           </a:xfrm>
           <a:prstGeom prst="straightConnector1">
             <a:avLst/>
@@ -13961,10 +14453,10 @@
       </p:cxnSp>
       <p:sp>
         <p:nvSpPr>
-          <p:cNvPr id="492" name="Rectangle 491">
+          <p:cNvPr id="144" name="Rectangle 143">
             <a:extLst>
               <a:ext uri="{FF2B5EF4-FFF2-40B4-BE49-F238E27FC236}">
-                <a16:creationId xmlns:a16="http://schemas.microsoft.com/office/drawing/2014/main" id="{771B083D-A159-49F5-949C-2E754AEFC286}"/>
+                <a16:creationId xmlns:a16="http://schemas.microsoft.com/office/drawing/2014/main" id="{BFFBFD37-E911-46AB-AA5F-CACE9492D57E}"/>
               </a:ext>
             </a:extLst>
           </p:cNvPr>
@@ -13973,68 +14465,8 @@
         </p:nvSpPr>
         <p:spPr>
           <a:xfrm>
-            <a:off x="1173371" y="1381463"/>
-            <a:ext cx="2268000" cy="409330"/>
-          </a:xfrm>
-          <a:prstGeom prst="rect">
-            <a:avLst/>
-          </a:prstGeom>
-          <a:noFill/>
-          <a:ln w="12700">
-            <a:solidFill>
-              <a:srgbClr val="FF0000"/>
-            </a:solidFill>
-            <a:prstDash val="solid"/>
-          </a:ln>
-        </p:spPr>
-        <p:style>
-          <a:lnRef idx="2">
-            <a:schemeClr val="accent1">
-              <a:shade val="50000"/>
-            </a:schemeClr>
-          </a:lnRef>
-          <a:fillRef idx="1">
-            <a:schemeClr val="accent1"/>
-          </a:fillRef>
-          <a:effectRef idx="0">
-            <a:schemeClr val="accent1"/>
-          </a:effectRef>
-          <a:fontRef idx="minor">
-            <a:schemeClr val="lt1"/>
-          </a:fontRef>
-        </p:style>
-        <p:txBody>
-          <a:bodyPr rtlCol="0" anchor="ctr"/>
-          <a:lstStyle/>
-          <a:p>
-            <a:pPr algn="ctr"/>
-            <a:endParaRPr lang="en-GB" sz="600">
-              <a:solidFill>
-                <a:schemeClr val="tx1">
-                  <a:lumMod val="65000"/>
-                  <a:lumOff val="35000"/>
-                </a:schemeClr>
-              </a:solidFill>
-            </a:endParaRPr>
-          </a:p>
-        </p:txBody>
-      </p:sp>
-      <p:sp>
-        <p:nvSpPr>
-          <p:cNvPr id="493" name="Rectangle 492">
-            <a:extLst>
-              <a:ext uri="{FF2B5EF4-FFF2-40B4-BE49-F238E27FC236}">
-                <a16:creationId xmlns:a16="http://schemas.microsoft.com/office/drawing/2014/main" id="{F7362386-B987-4456-915F-1623B14D210E}"/>
-              </a:ext>
-            </a:extLst>
-          </p:cNvPr>
-          <p:cNvSpPr/>
-          <p:nvPr/>
-        </p:nvSpPr>
-        <p:spPr>
-          <a:xfrm>
-            <a:off x="1173372" y="2672544"/>
-            <a:ext cx="2268000" cy="269587"/>
+            <a:off x="892554" y="17892"/>
+            <a:ext cx="2234267" cy="350842"/>
           </a:xfrm>
           <a:prstGeom prst="rect">
             <a:avLst/>
@@ -14081,10 +14513,10 @@
       </p:sp>
       <p:cxnSp>
         <p:nvCxnSpPr>
-          <p:cNvPr id="494" name="Straight Arrow Connector 493">
+          <p:cNvPr id="145" name="Straight Arrow Connector 144">
             <a:extLst>
               <a:ext uri="{FF2B5EF4-FFF2-40B4-BE49-F238E27FC236}">
-                <a16:creationId xmlns:a16="http://schemas.microsoft.com/office/drawing/2014/main" id="{73BBB493-C094-48FA-B125-2AB5C2730907}"/>
+                <a16:creationId xmlns:a16="http://schemas.microsoft.com/office/drawing/2014/main" id="{C7B89DC0-E435-4097-9C9D-A5B35836C670}"/>
               </a:ext>
             </a:extLst>
           </p:cNvPr>
@@ -14095,8 +14527,54 @@
         </p:nvCxnSpPr>
         <p:spPr>
           <a:xfrm flipH="1">
-            <a:off x="931361" y="3371330"/>
+            <a:off x="996440" y="2223280"/>
             <a:ext cx="345544" cy="0"/>
+          </a:xfrm>
+          <a:prstGeom prst="straightConnector1">
+            <a:avLst/>
+          </a:prstGeom>
+          <a:ln>
+            <a:solidFill>
+              <a:srgbClr val="787878"/>
+            </a:solidFill>
+            <a:tailEnd type="triangle"/>
+          </a:ln>
+        </p:spPr>
+        <p:style>
+          <a:lnRef idx="1">
+            <a:schemeClr val="accent1"/>
+          </a:lnRef>
+          <a:fillRef idx="0">
+            <a:schemeClr val="accent1"/>
+          </a:fillRef>
+          <a:effectRef idx="0">
+            <a:schemeClr val="accent1"/>
+          </a:effectRef>
+          <a:fontRef idx="minor">
+            <a:schemeClr val="tx1"/>
+          </a:fontRef>
+        </p:style>
+      </p:cxnSp>
+      <p:cxnSp>
+        <p:nvCxnSpPr>
+          <p:cNvPr id="146" name="Straight Arrow Connector 145">
+            <a:extLst>
+              <a:ext uri="{FF2B5EF4-FFF2-40B4-BE49-F238E27FC236}">
+                <a16:creationId xmlns:a16="http://schemas.microsoft.com/office/drawing/2014/main" id="{E187B116-65BB-4475-A104-04D408D24A34}"/>
+              </a:ext>
+            </a:extLst>
+          </p:cNvPr>
+          <p:cNvCxnSpPr>
+            <a:cxnSpLocks/>
+            <a:stCxn id="156" idx="2"/>
+            <a:endCxn id="128" idx="0"/>
+          </p:cNvCxnSpPr>
+          <p:nvPr/>
+        </p:nvCxnSpPr>
+        <p:spPr>
+          <a:xfrm>
+            <a:off x="2010809" y="2419002"/>
+            <a:ext cx="7800" cy="326170"/>
           </a:xfrm>
           <a:prstGeom prst="straightConnector1">
             <a:avLst/>
@@ -14125,123 +14603,10 @@
       </p:cxnSp>
       <p:sp>
         <p:nvSpPr>
-          <p:cNvPr id="495" name="Rectangle 494">
+          <p:cNvPr id="147" name="Rectangle 146">
             <a:extLst>
               <a:ext uri="{FF2B5EF4-FFF2-40B4-BE49-F238E27FC236}">
-                <a16:creationId xmlns:a16="http://schemas.microsoft.com/office/drawing/2014/main" id="{5A0C0298-8DAC-4D51-B7D0-CFAAEA98CC6C}"/>
-              </a:ext>
-            </a:extLst>
-          </p:cNvPr>
-          <p:cNvSpPr/>
-          <p:nvPr/>
-        </p:nvSpPr>
-        <p:spPr>
-          <a:xfrm rot="16200000">
-            <a:off x="2138020" y="3303781"/>
-            <a:ext cx="381075" cy="156565"/>
-          </a:xfrm>
-          <a:prstGeom prst="rect">
-            <a:avLst/>
-          </a:prstGeom>
-          <a:solidFill>
-            <a:schemeClr val="bg1"/>
-          </a:solidFill>
-          <a:ln w="3175">
-            <a:solidFill>
-              <a:schemeClr val="bg2">
-                <a:lumMod val="50000"/>
-              </a:schemeClr>
-            </a:solidFill>
-          </a:ln>
-        </p:spPr>
-        <p:style>
-          <a:lnRef idx="2">
-            <a:schemeClr val="accent1">
-              <a:shade val="50000"/>
-            </a:schemeClr>
-          </a:lnRef>
-          <a:fillRef idx="1">
-            <a:schemeClr val="accent1"/>
-          </a:fillRef>
-          <a:effectRef idx="0">
-            <a:schemeClr val="accent1"/>
-          </a:effectRef>
-          <a:fontRef idx="minor">
-            <a:schemeClr val="lt1"/>
-          </a:fontRef>
-        </p:style>
-        <p:txBody>
-          <a:bodyPr rtlCol="0" anchor="ctr"/>
-          <a:lstStyle/>
-          <a:p>
-            <a:pPr algn="ctr"/>
-            <a:r>
-              <a:rPr lang="en-GB" sz="600" dirty="0">
-                <a:solidFill>
-                  <a:schemeClr val="tx1">
-                    <a:lumMod val="65000"/>
-                    <a:lumOff val="35000"/>
-                  </a:schemeClr>
-                </a:solidFill>
-                <a:cs typeface="Arial" panose="020B0604020202020204" pitchFamily="34" charset="0"/>
-              </a:rPr>
-              <a:t>YES</a:t>
-            </a:r>
-          </a:p>
-        </p:txBody>
-      </p:sp>
-      <p:cxnSp>
-        <p:nvCxnSpPr>
-          <p:cNvPr id="496" name="Straight Arrow Connector 495">
-            <a:extLst>
-              <a:ext uri="{FF2B5EF4-FFF2-40B4-BE49-F238E27FC236}">
-                <a16:creationId xmlns:a16="http://schemas.microsoft.com/office/drawing/2014/main" id="{4CC46B00-2108-45BE-9226-F9FE3AF77D13}"/>
-              </a:ext>
-            </a:extLst>
-          </p:cNvPr>
-          <p:cNvCxnSpPr>
-            <a:cxnSpLocks/>
-            <a:stCxn id="507" idx="2"/>
-            <a:endCxn id="474" idx="0"/>
-          </p:cNvCxnSpPr>
-          <p:nvPr/>
-        </p:nvCxnSpPr>
-        <p:spPr>
-          <a:xfrm>
-            <a:off x="2328558" y="3655138"/>
-            <a:ext cx="0" cy="328863"/>
-          </a:xfrm>
-          <a:prstGeom prst="straightConnector1">
-            <a:avLst/>
-          </a:prstGeom>
-          <a:ln>
-            <a:solidFill>
-              <a:srgbClr val="787878"/>
-            </a:solidFill>
-            <a:tailEnd type="triangle"/>
-          </a:ln>
-        </p:spPr>
-        <p:style>
-          <a:lnRef idx="1">
-            <a:schemeClr val="accent1"/>
-          </a:lnRef>
-          <a:fillRef idx="0">
-            <a:schemeClr val="accent1"/>
-          </a:fillRef>
-          <a:effectRef idx="0">
-            <a:schemeClr val="accent1"/>
-          </a:effectRef>
-          <a:fontRef idx="minor">
-            <a:schemeClr val="tx1"/>
-          </a:fontRef>
-        </p:style>
-      </p:cxnSp>
-      <p:sp>
-        <p:nvSpPr>
-          <p:cNvPr id="497" name="Rectangle 496">
-            <a:extLst>
-              <a:ext uri="{FF2B5EF4-FFF2-40B4-BE49-F238E27FC236}">
-                <a16:creationId xmlns:a16="http://schemas.microsoft.com/office/drawing/2014/main" id="{17275D91-855A-44CA-B216-D400EFB231F3}"/>
+                <a16:creationId xmlns:a16="http://schemas.microsoft.com/office/drawing/2014/main" id="{3E850B6E-86F3-4C57-8400-4E073EF0D7BA}"/>
               </a:ext>
             </a:extLst>
           </p:cNvPr>
@@ -14250,7 +14615,7 @@
         </p:nvSpPr>
         <p:spPr>
           <a:xfrm>
-            <a:off x="2172320" y="3704491"/>
+            <a:off x="1854571" y="2455239"/>
             <a:ext cx="312475" cy="128568"/>
           </a:xfrm>
           <a:prstGeom prst="rect">
@@ -14305,10 +14670,10 @@
       </p:sp>
       <p:sp>
         <p:nvSpPr>
-          <p:cNvPr id="498" name="Rectangle 497">
+          <p:cNvPr id="148" name="Rectangle 147">
             <a:extLst>
               <a:ext uri="{FF2B5EF4-FFF2-40B4-BE49-F238E27FC236}">
-                <a16:creationId xmlns:a16="http://schemas.microsoft.com/office/drawing/2014/main" id="{ED8A156E-BA61-4013-B500-A30E690539CA}"/>
+                <a16:creationId xmlns:a16="http://schemas.microsoft.com/office/drawing/2014/main" id="{758B1423-5973-42B6-84F3-A86AB3FE346D}"/>
               </a:ext>
             </a:extLst>
           </p:cNvPr>
@@ -14317,8 +14682,8 @@
         </p:nvSpPr>
         <p:spPr>
           <a:xfrm>
-            <a:off x="1173372" y="3871139"/>
-            <a:ext cx="2268000" cy="1324384"/>
+            <a:off x="881867" y="2632310"/>
+            <a:ext cx="2249555" cy="1324384"/>
           </a:xfrm>
           <a:prstGeom prst="rect">
             <a:avLst/>
@@ -14365,10 +14730,10 @@
       </p:sp>
       <p:sp>
         <p:nvSpPr>
-          <p:cNvPr id="499" name="Rectangle 498">
+          <p:cNvPr id="149" name="Rectangle 148">
             <a:extLst>
               <a:ext uri="{FF2B5EF4-FFF2-40B4-BE49-F238E27FC236}">
-                <a16:creationId xmlns:a16="http://schemas.microsoft.com/office/drawing/2014/main" id="{33BA6D74-B854-4FAC-9490-294744848051}"/>
+                <a16:creationId xmlns:a16="http://schemas.microsoft.com/office/drawing/2014/main" id="{3C09C7FB-47EB-4AD5-BB35-62F8309C4C5D}"/>
               </a:ext>
             </a:extLst>
           </p:cNvPr>
@@ -14377,7 +14742,7 @@
         </p:nvSpPr>
         <p:spPr>
           <a:xfrm rot="16200000">
-            <a:off x="901435" y="5533942"/>
+            <a:off x="1073105" y="4203622"/>
             <a:ext cx="325898" cy="133683"/>
           </a:xfrm>
           <a:prstGeom prst="rect">
@@ -14432,10 +14797,10 @@
       </p:sp>
       <p:sp>
         <p:nvSpPr>
-          <p:cNvPr id="500" name="Rectangle 499">
+          <p:cNvPr id="150" name="Rectangle 149">
             <a:extLst>
               <a:ext uri="{FF2B5EF4-FFF2-40B4-BE49-F238E27FC236}">
-                <a16:creationId xmlns:a16="http://schemas.microsoft.com/office/drawing/2014/main" id="{2AD6411D-2E8F-4679-B775-AB36E7CC34CF}"/>
+                <a16:creationId xmlns:a16="http://schemas.microsoft.com/office/drawing/2014/main" id="{60DE4DCA-D392-4BD2-8683-B7538A0ABD6D}"/>
               </a:ext>
             </a:extLst>
           </p:cNvPr>
@@ -14444,7 +14809,7 @@
         </p:nvSpPr>
         <p:spPr>
           <a:xfrm>
-            <a:off x="134101" y="1401802"/>
+            <a:off x="6058" y="498631"/>
             <a:ext cx="872646" cy="351941"/>
           </a:xfrm>
           <a:prstGeom prst="rect">
@@ -14487,17 +14852,17 @@
                 </a:solidFill>
                 <a:cs typeface="Arial" panose="020B0604020202020204" pitchFamily="34" charset="0"/>
               </a:rPr>
-              <a:t>ecPoint Developers</a:t>
+              <a:t>ecPoint developers</a:t>
             </a:r>
           </a:p>
         </p:txBody>
       </p:sp>
       <p:sp>
         <p:nvSpPr>
-          <p:cNvPr id="501" name="Rectangle 500">
+          <p:cNvPr id="151" name="Rectangle 150">
             <a:extLst>
               <a:ext uri="{FF2B5EF4-FFF2-40B4-BE49-F238E27FC236}">
-                <a16:creationId xmlns:a16="http://schemas.microsoft.com/office/drawing/2014/main" id="{C1A1EB64-361E-405B-B0C2-B191926B6DB4}"/>
+                <a16:creationId xmlns:a16="http://schemas.microsoft.com/office/drawing/2014/main" id="{9411C48E-0E32-4FCA-BC87-D95E1CA1A4B6}"/>
               </a:ext>
             </a:extLst>
           </p:cNvPr>
@@ -14506,7 +14871,7 @@
         </p:nvSpPr>
         <p:spPr>
           <a:xfrm>
-            <a:off x="134101" y="1600981"/>
+            <a:off x="6058" y="697810"/>
             <a:ext cx="872646" cy="353392"/>
           </a:xfrm>
           <a:prstGeom prst="rect">
@@ -14556,10 +14921,10 @@
       </p:sp>
       <p:sp>
         <p:nvSpPr>
-          <p:cNvPr id="502" name="Rectangle 501">
+          <p:cNvPr id="152" name="Rectangle 151">
             <a:extLst>
               <a:ext uri="{FF2B5EF4-FFF2-40B4-BE49-F238E27FC236}">
-                <a16:creationId xmlns:a16="http://schemas.microsoft.com/office/drawing/2014/main" id="{73D9DAE7-09B1-4B43-A644-EEACF9A45090}"/>
+                <a16:creationId xmlns:a16="http://schemas.microsoft.com/office/drawing/2014/main" id="{B309B982-440E-48D8-8195-CD17D6778287}"/>
               </a:ext>
             </a:extLst>
           </p:cNvPr>
@@ -14568,7 +14933,7 @@
         </p:nvSpPr>
         <p:spPr>
           <a:xfrm>
-            <a:off x="-10465" y="1801611"/>
+            <a:off x="-138508" y="898440"/>
             <a:ext cx="1161779" cy="353392"/>
           </a:xfrm>
           <a:prstGeom prst="rect">
@@ -14611,17 +14976,17 @@
                 </a:solidFill>
                 <a:cs typeface="Arial" panose="020B0604020202020204" pitchFamily="34" charset="0"/>
               </a:rPr>
-              <a:t>Developers &amp; Testers</a:t>
+              <a:t>Dev. &amp; Testers</a:t>
             </a:r>
           </a:p>
         </p:txBody>
       </p:sp>
       <p:cxnSp>
         <p:nvCxnSpPr>
-          <p:cNvPr id="503" name="Straight Connector 502">
+          <p:cNvPr id="153" name="Straight Connector 152">
             <a:extLst>
               <a:ext uri="{FF2B5EF4-FFF2-40B4-BE49-F238E27FC236}">
-                <a16:creationId xmlns:a16="http://schemas.microsoft.com/office/drawing/2014/main" id="{447ADC49-DE8E-4391-AF95-6075F0AB9F1F}"/>
+                <a16:creationId xmlns:a16="http://schemas.microsoft.com/office/drawing/2014/main" id="{51E6B9BE-8FA3-46A4-B642-F4D7649A0C43}"/>
               </a:ext>
             </a:extLst>
           </p:cNvPr>
@@ -14631,9 +14996,9 @@
           <p:nvPr/>
         </p:nvCxnSpPr>
         <p:spPr>
-          <a:xfrm>
-            <a:off x="192424" y="1626562"/>
-            <a:ext cx="756000" cy="0"/>
+          <a:xfrm flipV="1">
+            <a:off x="133747" y="723940"/>
+            <a:ext cx="612000" cy="1"/>
           </a:xfrm>
           <a:prstGeom prst="line">
             <a:avLst/>
@@ -14662,10 +15027,10 @@
       </p:cxnSp>
       <p:cxnSp>
         <p:nvCxnSpPr>
-          <p:cNvPr id="504" name="Straight Connector 503">
+          <p:cNvPr id="154" name="Straight Connector 153">
             <a:extLst>
               <a:ext uri="{FF2B5EF4-FFF2-40B4-BE49-F238E27FC236}">
-                <a16:creationId xmlns:a16="http://schemas.microsoft.com/office/drawing/2014/main" id="{A483954F-3022-480B-9ED0-738FB42BFE1E}"/>
+                <a16:creationId xmlns:a16="http://schemas.microsoft.com/office/drawing/2014/main" id="{A34FDA89-9AF1-44B9-873D-3C42AB161AD1}"/>
               </a:ext>
             </a:extLst>
           </p:cNvPr>
@@ -14676,8 +15041,8 @@
         </p:nvCxnSpPr>
         <p:spPr>
           <a:xfrm>
-            <a:off x="192424" y="1827192"/>
-            <a:ext cx="756000" cy="0"/>
+            <a:off x="153064" y="924021"/>
+            <a:ext cx="576000" cy="0"/>
           </a:xfrm>
           <a:prstGeom prst="line">
             <a:avLst/>
@@ -14706,10 +15071,10 @@
       </p:cxnSp>
       <p:cxnSp>
         <p:nvCxnSpPr>
-          <p:cNvPr id="505" name="Straight Connector 504">
+          <p:cNvPr id="155" name="Straight Connector 154">
             <a:extLst>
               <a:ext uri="{FF2B5EF4-FFF2-40B4-BE49-F238E27FC236}">
-                <a16:creationId xmlns:a16="http://schemas.microsoft.com/office/drawing/2014/main" id="{618F1C76-45AA-4CA8-8189-0B44E0940D55}"/>
+                <a16:creationId xmlns:a16="http://schemas.microsoft.com/office/drawing/2014/main" id="{C5A0C94A-0F1D-44A5-9AD6-FE947E84859A}"/>
               </a:ext>
             </a:extLst>
           </p:cNvPr>
@@ -14720,8 +15085,8 @@
         </p:nvCxnSpPr>
         <p:spPr>
           <a:xfrm>
-            <a:off x="192424" y="2027821"/>
-            <a:ext cx="756000" cy="0"/>
+            <a:off x="204576" y="1124650"/>
+            <a:ext cx="468000" cy="0"/>
           </a:xfrm>
           <a:prstGeom prst="line">
             <a:avLst/>
@@ -14750,10 +15115,10 @@
       </p:cxnSp>
       <p:sp>
         <p:nvSpPr>
-          <p:cNvPr id="506" name="Rectangle 505">
+          <p:cNvPr id="156" name="Diamond 155">
             <a:extLst>
               <a:ext uri="{FF2B5EF4-FFF2-40B4-BE49-F238E27FC236}">
-                <a16:creationId xmlns:a16="http://schemas.microsoft.com/office/drawing/2014/main" id="{4F4C3D15-1D32-42F1-BB42-269A2A8C309A}"/>
+                <a16:creationId xmlns:a16="http://schemas.microsoft.com/office/drawing/2014/main" id="{8539F026-8842-4405-838B-6E8532626571}"/>
               </a:ext>
             </a:extLst>
           </p:cNvPr>
@@ -14762,69 +15127,8 @@
         </p:nvSpPr>
         <p:spPr>
           <a:xfrm>
-            <a:off x="1276361" y="134389"/>
-            <a:ext cx="2104392" cy="143515"/>
-          </a:xfrm>
-          <a:prstGeom prst="rect">
-            <a:avLst/>
-          </a:prstGeom>
-          <a:noFill/>
-          <a:ln w="3175">
-            <a:noFill/>
-          </a:ln>
-        </p:spPr>
-        <p:style>
-          <a:lnRef idx="2">
-            <a:schemeClr val="accent1">
-              <a:shade val="50000"/>
-            </a:schemeClr>
-          </a:lnRef>
-          <a:fillRef idx="1">
-            <a:schemeClr val="accent1"/>
-          </a:fillRef>
-          <a:effectRef idx="0">
-            <a:schemeClr val="accent1"/>
-          </a:effectRef>
-          <a:fontRef idx="minor">
-            <a:schemeClr val="lt1"/>
-          </a:fontRef>
-        </p:style>
-        <p:txBody>
-          <a:bodyPr rtlCol="0" anchor="ctr"/>
-          <a:lstStyle/>
-          <a:p>
-            <a:pPr algn="ctr"/>
-            <a:r>
-              <a:rPr lang="en-GB" sz="600" b="1" dirty="0">
-                <a:solidFill>
-                  <a:schemeClr val="tx1">
-                    <a:lumMod val="65000"/>
-                    <a:lumOff val="35000"/>
-                  </a:schemeClr>
-                </a:solidFill>
-                <a:cs typeface="Arial" panose="020B0604020202020204" pitchFamily="34" charset="0"/>
-              </a:rPr>
-              <a:t>Research Question</a:t>
-            </a:r>
-          </a:p>
-        </p:txBody>
-      </p:sp>
-      <p:sp>
-        <p:nvSpPr>
-          <p:cNvPr id="507" name="Diamond 506">
-            <a:extLst>
-              <a:ext uri="{FF2B5EF4-FFF2-40B4-BE49-F238E27FC236}">
-                <a16:creationId xmlns:a16="http://schemas.microsoft.com/office/drawing/2014/main" id="{109B0D16-3A89-4EAE-AD28-62971053DFB3}"/>
-              </a:ext>
-            </a:extLst>
-          </p:cNvPr>
-          <p:cNvSpPr/>
-          <p:nvPr/>
-        </p:nvSpPr>
-        <p:spPr>
-          <a:xfrm>
-            <a:off x="1268500" y="3089922"/>
-            <a:ext cx="2120115" cy="565216"/>
+            <a:off x="1326551" y="2020729"/>
+            <a:ext cx="1368516" cy="398273"/>
           </a:xfrm>
           <a:prstGeom prst="diamond">
             <a:avLst/>
@@ -14861,76 +15165,6 @@
           <a:lstStyle/>
           <a:p>
             <a:pPr algn="ctr"/>
-            <a:endParaRPr lang="en-GB" sz="600" dirty="0">
-              <a:solidFill>
-                <a:schemeClr val="tx1">
-                  <a:lumMod val="65000"/>
-                  <a:lumOff val="35000"/>
-                </a:schemeClr>
-              </a:solidFill>
-              <a:cs typeface="Arial" panose="020B0604020202020204" pitchFamily="34" charset="0"/>
-            </a:endParaRPr>
-          </a:p>
-        </p:txBody>
-      </p:sp>
-      <p:sp>
-        <p:nvSpPr>
-          <p:cNvPr id="508" name="Rectangle 507">
-            <a:extLst>
-              <a:ext uri="{FF2B5EF4-FFF2-40B4-BE49-F238E27FC236}">
-                <a16:creationId xmlns:a16="http://schemas.microsoft.com/office/drawing/2014/main" id="{4E6C7F05-8A95-4CFE-9C21-69F6F17D8894}"/>
-              </a:ext>
-            </a:extLst>
-          </p:cNvPr>
-          <p:cNvSpPr/>
-          <p:nvPr/>
-        </p:nvSpPr>
-        <p:spPr>
-          <a:xfrm>
-            <a:off x="1587136" y="2753363"/>
-            <a:ext cx="1482842" cy="1166298"/>
-          </a:xfrm>
-          <a:prstGeom prst="rect">
-            <a:avLst/>
-          </a:prstGeom>
-          <a:noFill/>
-          <a:ln w="3175">
-            <a:noFill/>
-          </a:ln>
-        </p:spPr>
-        <p:style>
-          <a:lnRef idx="2">
-            <a:schemeClr val="accent1">
-              <a:shade val="50000"/>
-            </a:schemeClr>
-          </a:lnRef>
-          <a:fillRef idx="1">
-            <a:schemeClr val="accent1"/>
-          </a:fillRef>
-          <a:effectRef idx="0">
-            <a:schemeClr val="accent1"/>
-          </a:effectRef>
-          <a:fontRef idx="minor">
-            <a:schemeClr val="lt1"/>
-          </a:fontRef>
-        </p:style>
-        <p:txBody>
-          <a:bodyPr rtlCol="0" anchor="ctr"/>
-          <a:lstStyle/>
-          <a:p>
-            <a:pPr algn="ctr"/>
-            <a:endParaRPr lang="en-GB" sz="600" dirty="0">
-              <a:solidFill>
-                <a:schemeClr val="tx1">
-                  <a:lumMod val="65000"/>
-                  <a:lumOff val="35000"/>
-                </a:schemeClr>
-              </a:solidFill>
-              <a:cs typeface="Arial" panose="020B0604020202020204" pitchFamily="34" charset="0"/>
-            </a:endParaRPr>
-          </a:p>
-          <a:p>
-            <a:pPr algn="ctr"/>
             <a:r>
               <a:rPr lang="en-GB" sz="600" dirty="0">
                 <a:solidFill>
@@ -14941,17 +15175,17 @@
                 </a:solidFill>
                 <a:cs typeface="Arial" panose="020B0604020202020204" pitchFamily="34" charset="0"/>
               </a:rPr>
-              <a:t>Is ecPoint’s UND-EFF relationship similar to the one for PEFs?</a:t>
+              <a:t>Are the results similar?</a:t>
             </a:r>
           </a:p>
         </p:txBody>
       </p:sp>
       <p:sp>
         <p:nvSpPr>
-          <p:cNvPr id="509" name="Diamond 508">
+          <p:cNvPr id="157" name="Parallelogram 156">
             <a:extLst>
               <a:ext uri="{FF2B5EF4-FFF2-40B4-BE49-F238E27FC236}">
-                <a16:creationId xmlns:a16="http://schemas.microsoft.com/office/drawing/2014/main" id="{2E254674-B4A1-45B3-9ADE-F4EB5E3E751D}"/>
+                <a16:creationId xmlns:a16="http://schemas.microsoft.com/office/drawing/2014/main" id="{FDAC7E92-12B1-4AD1-9DBA-FD7B5A51FC4B}"/>
               </a:ext>
             </a:extLst>
           </p:cNvPr>
@@ -14960,261 +15194,8 @@
         </p:nvSpPr>
         <p:spPr>
           <a:xfrm>
-            <a:off x="1273919" y="5338984"/>
-            <a:ext cx="2123752" cy="565216"/>
-          </a:xfrm>
-          <a:prstGeom prst="diamond">
-            <a:avLst/>
-          </a:prstGeom>
-          <a:solidFill>
-            <a:srgbClr val="FFDF57"/>
-          </a:solidFill>
-          <a:ln w="3175">
-            <a:solidFill>
-              <a:schemeClr val="bg2">
-                <a:lumMod val="75000"/>
-              </a:schemeClr>
-            </a:solidFill>
-          </a:ln>
-        </p:spPr>
-        <p:style>
-          <a:lnRef idx="2">
-            <a:schemeClr val="accent1">
-              <a:shade val="50000"/>
-            </a:schemeClr>
-          </a:lnRef>
-          <a:fillRef idx="1">
-            <a:schemeClr val="accent1"/>
-          </a:fillRef>
-          <a:effectRef idx="0">
-            <a:schemeClr val="accent1"/>
-          </a:effectRef>
-          <a:fontRef idx="minor">
-            <a:schemeClr val="lt1"/>
-          </a:fontRef>
-        </p:style>
-        <p:txBody>
-          <a:bodyPr rtlCol="0" anchor="ctr"/>
-          <a:lstStyle/>
-          <a:p>
-            <a:pPr algn="ctr"/>
-            <a:endParaRPr lang="en-GB" sz="600" dirty="0">
-              <a:solidFill>
-                <a:schemeClr val="tx1">
-                  <a:lumMod val="65000"/>
-                  <a:lumOff val="35000"/>
-                </a:schemeClr>
-              </a:solidFill>
-              <a:cs typeface="Arial" panose="020B0604020202020204" pitchFamily="34" charset="0"/>
-            </a:endParaRPr>
-          </a:p>
-        </p:txBody>
-      </p:sp>
-      <p:sp>
-        <p:nvSpPr>
-          <p:cNvPr id="510" name="Rectangle 509">
-            <a:extLst>
-              <a:ext uri="{FF2B5EF4-FFF2-40B4-BE49-F238E27FC236}">
-                <a16:creationId xmlns:a16="http://schemas.microsoft.com/office/drawing/2014/main" id="{4616446E-1252-4FB9-B48E-F1D60884A883}"/>
-              </a:ext>
-            </a:extLst>
-          </p:cNvPr>
-          <p:cNvSpPr/>
-          <p:nvPr/>
-        </p:nvSpPr>
-        <p:spPr>
-          <a:xfrm>
-            <a:off x="1563074" y="4993187"/>
-            <a:ext cx="1528555" cy="1166298"/>
-          </a:xfrm>
-          <a:prstGeom prst="rect">
-            <a:avLst/>
-          </a:prstGeom>
-          <a:noFill/>
-          <a:ln w="3175">
-            <a:noFill/>
-          </a:ln>
-        </p:spPr>
-        <p:style>
-          <a:lnRef idx="2">
-            <a:schemeClr val="accent1">
-              <a:shade val="50000"/>
-            </a:schemeClr>
-          </a:lnRef>
-          <a:fillRef idx="1">
-            <a:schemeClr val="accent1"/>
-          </a:fillRef>
-          <a:effectRef idx="0">
-            <a:schemeClr val="accent1"/>
-          </a:effectRef>
-          <a:fontRef idx="minor">
-            <a:schemeClr val="lt1"/>
-          </a:fontRef>
-        </p:style>
-        <p:txBody>
-          <a:bodyPr rtlCol="0" anchor="ctr"/>
-          <a:lstStyle/>
-          <a:p>
-            <a:pPr algn="ctr"/>
-            <a:endParaRPr lang="en-GB" sz="600" dirty="0">
-              <a:solidFill>
-                <a:schemeClr val="tx1">
-                  <a:lumMod val="65000"/>
-                  <a:lumOff val="35000"/>
-                </a:schemeClr>
-              </a:solidFill>
-              <a:cs typeface="Arial" panose="020B0604020202020204" pitchFamily="34" charset="0"/>
-            </a:endParaRPr>
-          </a:p>
-          <a:p>
-            <a:pPr algn="ctr"/>
-            <a:r>
-              <a:rPr lang="en-GB" sz="600" dirty="0">
-                <a:solidFill>
-                  <a:schemeClr val="tx1">
-                    <a:lumMod val="65000"/>
-                    <a:lumOff val="35000"/>
-                  </a:schemeClr>
-                </a:solidFill>
-                <a:cs typeface="Arial" panose="020B0604020202020204" pitchFamily="34" charset="0"/>
-              </a:rPr>
-              <a:t>Are ecPoint forecasts more effectively explained with the revised guidelines?</a:t>
-            </a:r>
-          </a:p>
-        </p:txBody>
-      </p:sp>
-      <p:cxnSp>
-        <p:nvCxnSpPr>
-          <p:cNvPr id="511" name="Straight Arrow Connector 510">
-            <a:extLst>
-              <a:ext uri="{FF2B5EF4-FFF2-40B4-BE49-F238E27FC236}">
-                <a16:creationId xmlns:a16="http://schemas.microsoft.com/office/drawing/2014/main" id="{D4395B70-F4DE-4B51-B3B6-5F2386026E0E}"/>
-              </a:ext>
-            </a:extLst>
-          </p:cNvPr>
-          <p:cNvCxnSpPr>
-            <a:cxnSpLocks/>
-          </p:cNvCxnSpPr>
-          <p:nvPr/>
-        </p:nvCxnSpPr>
-        <p:spPr>
-          <a:xfrm>
-            <a:off x="2337564" y="6471193"/>
-            <a:ext cx="0" cy="180000"/>
-          </a:xfrm>
-          <a:prstGeom prst="straightConnector1">
-            <a:avLst/>
-          </a:prstGeom>
-          <a:ln>
-            <a:solidFill>
-              <a:srgbClr val="787878"/>
-            </a:solidFill>
-            <a:tailEnd type="triangle"/>
-          </a:ln>
-        </p:spPr>
-        <p:style>
-          <a:lnRef idx="1">
-            <a:schemeClr val="accent1"/>
-          </a:lnRef>
-          <a:fillRef idx="0">
-            <a:schemeClr val="accent1"/>
-          </a:fillRef>
-          <a:effectRef idx="0">
-            <a:schemeClr val="accent1"/>
-          </a:effectRef>
-          <a:fontRef idx="minor">
-            <a:schemeClr val="tx1"/>
-          </a:fontRef>
-        </p:style>
-      </p:cxnSp>
-      <p:sp>
-        <p:nvSpPr>
-          <p:cNvPr id="512" name="Rectangle: Rounded Corners 511">
-            <a:extLst>
-              <a:ext uri="{FF2B5EF4-FFF2-40B4-BE49-F238E27FC236}">
-                <a16:creationId xmlns:a16="http://schemas.microsoft.com/office/drawing/2014/main" id="{4AB6B2D2-54F4-4460-89DD-70C988F84666}"/>
-              </a:ext>
-            </a:extLst>
-          </p:cNvPr>
-          <p:cNvSpPr/>
-          <p:nvPr/>
-        </p:nvSpPr>
-        <p:spPr>
-          <a:xfrm>
-            <a:off x="1754448" y="6644613"/>
-            <a:ext cx="1166232" cy="232229"/>
-          </a:xfrm>
-          <a:prstGeom prst="roundRect">
-            <a:avLst>
-              <a:gd name="adj" fmla="val 50000"/>
-            </a:avLst>
-          </a:prstGeom>
-          <a:solidFill>
-            <a:schemeClr val="accent2">
-              <a:lumMod val="60000"/>
-              <a:lumOff val="40000"/>
-            </a:schemeClr>
-          </a:solidFill>
-          <a:ln w="3175">
-            <a:solidFill>
-              <a:schemeClr val="bg2">
-                <a:lumMod val="50000"/>
-              </a:schemeClr>
-            </a:solidFill>
-          </a:ln>
-        </p:spPr>
-        <p:style>
-          <a:lnRef idx="2">
-            <a:schemeClr val="accent1">
-              <a:shade val="50000"/>
-            </a:schemeClr>
-          </a:lnRef>
-          <a:fillRef idx="1">
-            <a:schemeClr val="accent1"/>
-          </a:fillRef>
-          <a:effectRef idx="0">
-            <a:schemeClr val="accent1"/>
-          </a:effectRef>
-          <a:fontRef idx="minor">
-            <a:schemeClr val="lt1"/>
-          </a:fontRef>
-        </p:style>
-        <p:txBody>
-          <a:bodyPr rtlCol="0" anchor="ctr"/>
-          <a:lstStyle/>
-          <a:p>
-            <a:pPr algn="ctr"/>
-            <a:r>
-              <a:rPr lang="en-GB" sz="600" dirty="0">
-                <a:solidFill>
-                  <a:schemeClr val="tx1">
-                    <a:lumMod val="65000"/>
-                    <a:lumOff val="35000"/>
-                  </a:schemeClr>
-                </a:solidFill>
-                <a:cs typeface="Arial" panose="020B0604020202020204" pitchFamily="34" charset="0"/>
-              </a:rPr>
-              <a:t>Experiment Ends</a:t>
-            </a:r>
-          </a:p>
-        </p:txBody>
-      </p:sp>
-      <p:sp>
-        <p:nvSpPr>
-          <p:cNvPr id="513" name="Parallelogram 512">
-            <a:extLst>
-              <a:ext uri="{FF2B5EF4-FFF2-40B4-BE49-F238E27FC236}">
-                <a16:creationId xmlns:a16="http://schemas.microsoft.com/office/drawing/2014/main" id="{0821C3C3-DAFA-4D1C-BDA4-9E18E9B3E9F0}"/>
-              </a:ext>
-            </a:extLst>
-          </p:cNvPr>
-          <p:cNvSpPr/>
-          <p:nvPr/>
-        </p:nvSpPr>
-        <p:spPr>
-          <a:xfrm>
-            <a:off x="32881" y="3029708"/>
-            <a:ext cx="978378" cy="686056"/>
+            <a:off x="31620" y="2039968"/>
+            <a:ext cx="1002411" cy="353392"/>
           </a:xfrm>
           <a:prstGeom prst="parallelogram">
             <a:avLst/>
@@ -15264,61 +15245,9 @@
                 </a:solidFill>
                 <a:cs typeface="Arial" panose="020B0604020202020204" pitchFamily="34" charset="0"/>
               </a:rPr>
-              <a:t>No need to revise PEFs’ traditional guidelines to communicate ecPoint forecasts.</a:t>
+              <a:t>No need to </a:t>
             </a:r>
           </a:p>
-        </p:txBody>
-      </p:sp>
-      <p:sp>
-        <p:nvSpPr>
-          <p:cNvPr id="514" name="Rectangle 513">
-            <a:extLst>
-              <a:ext uri="{FF2B5EF4-FFF2-40B4-BE49-F238E27FC236}">
-                <a16:creationId xmlns:a16="http://schemas.microsoft.com/office/drawing/2014/main" id="{D9E05BE6-D584-4905-A812-82A298D32D4C}"/>
-              </a:ext>
-            </a:extLst>
-          </p:cNvPr>
-          <p:cNvSpPr/>
-          <p:nvPr/>
-        </p:nvSpPr>
-        <p:spPr>
-          <a:xfrm>
-            <a:off x="2101598" y="769032"/>
-            <a:ext cx="453919" cy="216000"/>
-          </a:xfrm>
-          <a:prstGeom prst="rect">
-            <a:avLst/>
-          </a:prstGeom>
-          <a:solidFill>
-            <a:schemeClr val="bg1"/>
-          </a:solidFill>
-          <a:ln w="3175">
-            <a:solidFill>
-              <a:schemeClr val="bg2">
-                <a:lumMod val="50000"/>
-              </a:schemeClr>
-            </a:solidFill>
-          </a:ln>
-        </p:spPr>
-        <p:style>
-          <a:lnRef idx="2">
-            <a:schemeClr val="accent1">
-              <a:shade val="50000"/>
-            </a:schemeClr>
-          </a:lnRef>
-          <a:fillRef idx="1">
-            <a:schemeClr val="accent1"/>
-          </a:fillRef>
-          <a:effectRef idx="0">
-            <a:schemeClr val="accent1"/>
-          </a:effectRef>
-          <a:fontRef idx="minor">
-            <a:schemeClr val="lt1"/>
-          </a:fontRef>
-        </p:style>
-        <p:txBody>
-          <a:bodyPr rtlCol="0" anchor="ctr"/>
-          <a:lstStyle/>
           <a:p>
             <a:pPr algn="ctr"/>
             <a:r>
@@ -15331,17 +15260,17 @@
                 </a:solidFill>
                 <a:cs typeface="Arial" panose="020B0604020202020204" pitchFamily="34" charset="0"/>
               </a:rPr>
-              <a:t>MAYBE NOT</a:t>
+              <a:t>revise ecPoint training/guidance</a:t>
             </a:r>
           </a:p>
         </p:txBody>
       </p:sp>
       <p:sp>
         <p:nvSpPr>
-          <p:cNvPr id="515" name="Left Brace 514">
+          <p:cNvPr id="158" name="Left Brace 157">
             <a:extLst>
               <a:ext uri="{FF2B5EF4-FFF2-40B4-BE49-F238E27FC236}">
-                <a16:creationId xmlns:a16="http://schemas.microsoft.com/office/drawing/2014/main" id="{215634C7-49E3-4904-8006-4A113FE8E177}"/>
+                <a16:creationId xmlns:a16="http://schemas.microsoft.com/office/drawing/2014/main" id="{652D85F5-8394-421A-9C4D-17F64979BA3A}"/>
               </a:ext>
             </a:extLst>
           </p:cNvPr>
@@ -15350,8 +15279,8 @@
         </p:nvSpPr>
         <p:spPr>
           <a:xfrm flipH="1">
-            <a:off x="3478583" y="2662965"/>
-            <a:ext cx="114327" cy="2532558"/>
+            <a:off x="3150866" y="1443690"/>
+            <a:ext cx="121471" cy="2513004"/>
           </a:xfrm>
           <a:prstGeom prst="leftBrace">
             <a:avLst/>
@@ -15387,10 +15316,10 @@
       </p:sp>
       <p:sp>
         <p:nvSpPr>
-          <p:cNvPr id="516" name="Rectangle 515">
+          <p:cNvPr id="159" name="Rectangle 158">
             <a:extLst>
               <a:ext uri="{FF2B5EF4-FFF2-40B4-BE49-F238E27FC236}">
-                <a16:creationId xmlns:a16="http://schemas.microsoft.com/office/drawing/2014/main" id="{978FF368-6649-4BA9-B979-B1BB24985335}"/>
+                <a16:creationId xmlns:a16="http://schemas.microsoft.com/office/drawing/2014/main" id="{6253FD2B-555C-4B51-B8B8-156CA0CC3A51}"/>
               </a:ext>
             </a:extLst>
           </p:cNvPr>
@@ -15399,8 +15328,8 @@
         </p:nvSpPr>
         <p:spPr>
           <a:xfrm rot="5400000">
-            <a:off x="2467503" y="3758064"/>
-            <a:ext cx="2522978" cy="351941"/>
+            <a:off x="2098218" y="2512916"/>
+            <a:ext cx="2513005" cy="351941"/>
           </a:xfrm>
           <a:prstGeom prst="rect">
             <a:avLst/>
@@ -15445,99 +15374,14 @@
               <a:t>OFFLINE PHASE</a:t>
             </a:r>
           </a:p>
-          <a:p>
-            <a:pPr algn="ctr"/>
-            <a:r>
-              <a:rPr lang="en-GB" sz="600" b="1" dirty="0">
-                <a:solidFill>
-                  <a:schemeClr val="tx1">
-                    <a:lumMod val="65000"/>
-                    <a:lumOff val="35000"/>
-                  </a:schemeClr>
-                </a:solidFill>
-                <a:cs typeface="Arial" panose="020B0604020202020204" pitchFamily="34" charset="0"/>
-              </a:rPr>
-              <a:t>(15 months)</a:t>
-            </a:r>
-          </a:p>
         </p:txBody>
       </p:sp>
       <p:sp>
         <p:nvSpPr>
-          <p:cNvPr id="517" name="Parallelogram 516">
+          <p:cNvPr id="160" name="Left Brace 159">
             <a:extLst>
               <a:ext uri="{FF2B5EF4-FFF2-40B4-BE49-F238E27FC236}">
-                <a16:creationId xmlns:a16="http://schemas.microsoft.com/office/drawing/2014/main" id="{194F20A8-7DDE-430F-8102-A24011A14F5E}"/>
-              </a:ext>
-            </a:extLst>
-          </p:cNvPr>
-          <p:cNvSpPr/>
-          <p:nvPr/>
-        </p:nvSpPr>
-        <p:spPr>
-          <a:xfrm>
-            <a:off x="32760" y="232715"/>
-            <a:ext cx="759154" cy="305648"/>
-          </a:xfrm>
-          <a:prstGeom prst="parallelogram">
-            <a:avLst/>
-          </a:prstGeom>
-          <a:solidFill>
-            <a:schemeClr val="accent6">
-              <a:lumMod val="60000"/>
-              <a:lumOff val="40000"/>
-            </a:schemeClr>
-          </a:solidFill>
-          <a:ln w="3175">
-            <a:solidFill>
-              <a:schemeClr val="bg2">
-                <a:lumMod val="50000"/>
-              </a:schemeClr>
-            </a:solidFill>
-          </a:ln>
-        </p:spPr>
-        <p:style>
-          <a:lnRef idx="2">
-            <a:schemeClr val="accent1">
-              <a:shade val="50000"/>
-            </a:schemeClr>
-          </a:lnRef>
-          <a:fillRef idx="1">
-            <a:schemeClr val="accent1"/>
-          </a:fillRef>
-          <a:effectRef idx="0">
-            <a:schemeClr val="accent1"/>
-          </a:effectRef>
-          <a:fontRef idx="minor">
-            <a:schemeClr val="lt1"/>
-          </a:fontRef>
-        </p:style>
-        <p:txBody>
-          <a:bodyPr rtlCol="0" anchor="ctr"/>
-          <a:lstStyle/>
-          <a:p>
-            <a:pPr algn="ctr"/>
-            <a:r>
-              <a:rPr lang="en-GB" sz="600" dirty="0">
-                <a:solidFill>
-                  <a:schemeClr val="tx1">
-                    <a:lumMod val="65000"/>
-                    <a:lumOff val="35000"/>
-                  </a:schemeClr>
-                </a:solidFill>
-                <a:cs typeface="Arial" panose="020B0604020202020204" pitchFamily="34" charset="0"/>
-              </a:rPr>
-              <a:t>No actions would be needed.</a:t>
-            </a:r>
-          </a:p>
-        </p:txBody>
-      </p:sp>
-      <p:sp>
-        <p:nvSpPr>
-          <p:cNvPr id="518" name="Left Brace 517">
-            <a:extLst>
-              <a:ext uri="{FF2B5EF4-FFF2-40B4-BE49-F238E27FC236}">
-                <a16:creationId xmlns:a16="http://schemas.microsoft.com/office/drawing/2014/main" id="{FFF49690-6F58-48A3-84F8-99E0E2A5104D}"/>
+                <a16:creationId xmlns:a16="http://schemas.microsoft.com/office/drawing/2014/main" id="{D4737B74-D717-4B73-B0BD-DF820697AA8E}"/>
               </a:ext>
             </a:extLst>
           </p:cNvPr>
@@ -15546,8 +15390,8 @@
         </p:nvSpPr>
         <p:spPr>
           <a:xfrm flipH="1">
-            <a:off x="3473387" y="1375779"/>
-            <a:ext cx="113500" cy="1260994"/>
+            <a:off x="3144241" y="17892"/>
+            <a:ext cx="128097" cy="1312903"/>
           </a:xfrm>
           <a:prstGeom prst="leftBrace">
             <a:avLst/>
@@ -15583,10 +15427,10 @@
       </p:sp>
       <p:sp>
         <p:nvSpPr>
-          <p:cNvPr id="519" name="Rectangle 518">
+          <p:cNvPr id="161" name="Rectangle 160">
             <a:extLst>
               <a:ext uri="{FF2B5EF4-FFF2-40B4-BE49-F238E27FC236}">
-                <a16:creationId xmlns:a16="http://schemas.microsoft.com/office/drawing/2014/main" id="{3A70BCB8-E7FC-4473-B0A0-144B170FD542}"/>
+                <a16:creationId xmlns:a16="http://schemas.microsoft.com/office/drawing/2014/main" id="{E5B78F21-099B-4DEE-A05B-C767241E3252}"/>
               </a:ext>
             </a:extLst>
           </p:cNvPr>
@@ -15595,8 +15439,8 @@
         </p:nvSpPr>
         <p:spPr>
           <a:xfrm rot="5400000">
-            <a:off x="3098494" y="1830306"/>
-            <a:ext cx="1260995" cy="351941"/>
+            <a:off x="2672393" y="471792"/>
+            <a:ext cx="1376718" cy="351941"/>
           </a:xfrm>
           <a:prstGeom prst="rect">
             <a:avLst/>
@@ -15641,29 +15485,14 @@
               <a:t>REAL-TIME PHASE</a:t>
             </a:r>
           </a:p>
-          <a:p>
-            <a:pPr algn="ctr"/>
-            <a:r>
-              <a:rPr lang="en-GB" sz="600" b="1" dirty="0">
-                <a:solidFill>
-                  <a:schemeClr val="tx1">
-                    <a:lumMod val="65000"/>
-                    <a:lumOff val="35000"/>
-                  </a:schemeClr>
-                </a:solidFill>
-                <a:cs typeface="Arial" panose="020B0604020202020204" pitchFamily="34" charset="0"/>
-              </a:rPr>
-              <a:t>(12 months)</a:t>
-            </a:r>
-          </a:p>
         </p:txBody>
       </p:sp>
       <p:sp>
         <p:nvSpPr>
-          <p:cNvPr id="520" name="Rectangle 519">
+          <p:cNvPr id="162" name="Rectangle 161">
             <a:extLst>
               <a:ext uri="{FF2B5EF4-FFF2-40B4-BE49-F238E27FC236}">
-                <a16:creationId xmlns:a16="http://schemas.microsoft.com/office/drawing/2014/main" id="{8DC48824-566F-4170-831A-237A0FD72713}"/>
+                <a16:creationId xmlns:a16="http://schemas.microsoft.com/office/drawing/2014/main" id="{3E40FA3A-333A-4178-BBBC-F339A5FC5269}"/>
               </a:ext>
             </a:extLst>
           </p:cNvPr>
@@ -15672,8 +15501,8 @@
         </p:nvSpPr>
         <p:spPr>
           <a:xfrm>
-            <a:off x="130239" y="1446097"/>
-            <a:ext cx="899310" cy="708728"/>
+            <a:off x="50168" y="542926"/>
+            <a:ext cx="784427" cy="708728"/>
           </a:xfrm>
           <a:prstGeom prst="rect">
             <a:avLst/>
@@ -15712,10 +15541,10 @@
       </p:sp>
       <p:sp>
         <p:nvSpPr>
-          <p:cNvPr id="521" name="Rectangle 520">
+          <p:cNvPr id="163" name="Rectangle 162">
             <a:extLst>
               <a:ext uri="{FF2B5EF4-FFF2-40B4-BE49-F238E27FC236}">
-                <a16:creationId xmlns:a16="http://schemas.microsoft.com/office/drawing/2014/main" id="{8F34D7DC-F292-46CA-A3EF-4D11C8740841}"/>
+                <a16:creationId xmlns:a16="http://schemas.microsoft.com/office/drawing/2014/main" id="{BD4B059B-E653-49D1-AAF8-E27F0D8BF3DF}"/>
               </a:ext>
             </a:extLst>
           </p:cNvPr>
@@ -15724,7 +15553,7 @@
         </p:nvSpPr>
         <p:spPr>
           <a:xfrm rot="16200000">
-            <a:off x="959563" y="3305722"/>
+            <a:off x="1024642" y="2157672"/>
             <a:ext cx="361398" cy="133684"/>
           </a:xfrm>
           <a:prstGeom prst="rect">
@@ -15773,6 +15602,294 @@
                 <a:cs typeface="Arial" panose="020B0604020202020204" pitchFamily="34" charset="0"/>
               </a:rPr>
               <a:t>YES</a:t>
+            </a:r>
+          </a:p>
+        </p:txBody>
+      </p:sp>
+      <p:sp>
+        <p:nvSpPr>
+          <p:cNvPr id="164" name="Rectangle: Rounded Corners 163">
+            <a:extLst>
+              <a:ext uri="{FF2B5EF4-FFF2-40B4-BE49-F238E27FC236}">
+                <a16:creationId xmlns:a16="http://schemas.microsoft.com/office/drawing/2014/main" id="{8F4317FD-2147-49D9-9D5B-FA03498D78AA}"/>
+              </a:ext>
+            </a:extLst>
+          </p:cNvPr>
+          <p:cNvSpPr/>
+          <p:nvPr/>
+        </p:nvSpPr>
+        <p:spPr>
+          <a:xfrm>
+            <a:off x="2038881" y="1504988"/>
+            <a:ext cx="1028083" cy="360000"/>
+          </a:xfrm>
+          <a:prstGeom prst="roundRect">
+            <a:avLst>
+              <a:gd name="adj" fmla="val 0"/>
+            </a:avLst>
+          </a:prstGeom>
+          <a:solidFill>
+            <a:schemeClr val="bg2"/>
+          </a:solidFill>
+          <a:ln w="3175">
+            <a:solidFill>
+              <a:schemeClr val="bg2">
+                <a:lumMod val="50000"/>
+              </a:schemeClr>
+            </a:solidFill>
+          </a:ln>
+        </p:spPr>
+        <p:style>
+          <a:lnRef idx="2">
+            <a:schemeClr val="accent1">
+              <a:shade val="50000"/>
+            </a:schemeClr>
+          </a:lnRef>
+          <a:fillRef idx="1">
+            <a:schemeClr val="accent1"/>
+          </a:fillRef>
+          <a:effectRef idx="0">
+            <a:schemeClr val="accent1"/>
+          </a:effectRef>
+          <a:fontRef idx="minor">
+            <a:schemeClr val="lt1"/>
+          </a:fontRef>
+        </p:style>
+        <p:txBody>
+          <a:bodyPr rtlCol="0" anchor="ctr"/>
+          <a:lstStyle/>
+          <a:p>
+            <a:pPr algn="ctr"/>
+            <a:r>
+              <a:rPr lang="en-GB" sz="600" dirty="0">
+                <a:solidFill>
+                  <a:schemeClr val="tx1">
+                    <a:lumMod val="65000"/>
+                    <a:lumOff val="35000"/>
+                  </a:schemeClr>
+                </a:solidFill>
+                <a:cs typeface="Arial" panose="020B0604020202020204" pitchFamily="34" charset="0"/>
+              </a:rPr>
+              <a:t>Run a separate analysis for the case studies presented in the summary reports</a:t>
+            </a:r>
+          </a:p>
+        </p:txBody>
+      </p:sp>
+      <p:cxnSp>
+        <p:nvCxnSpPr>
+          <p:cNvPr id="165" name="Straight Arrow Connector 164">
+            <a:extLst>
+              <a:ext uri="{FF2B5EF4-FFF2-40B4-BE49-F238E27FC236}">
+                <a16:creationId xmlns:a16="http://schemas.microsoft.com/office/drawing/2014/main" id="{BACAAD4A-A471-4E41-B7D3-296E3F0FC88B}"/>
+              </a:ext>
+            </a:extLst>
+          </p:cNvPr>
+          <p:cNvCxnSpPr>
+            <a:cxnSpLocks/>
+            <a:stCxn id="125" idx="2"/>
+            <a:endCxn id="164" idx="0"/>
+          </p:cNvCxnSpPr>
+          <p:nvPr/>
+        </p:nvCxnSpPr>
+        <p:spPr>
+          <a:xfrm>
+            <a:off x="2010809" y="1287035"/>
+            <a:ext cx="542114" cy="217953"/>
+          </a:xfrm>
+          <a:prstGeom prst="straightConnector1">
+            <a:avLst/>
+          </a:prstGeom>
+          <a:ln>
+            <a:solidFill>
+              <a:srgbClr val="787878"/>
+            </a:solidFill>
+            <a:tailEnd type="triangle"/>
+          </a:ln>
+        </p:spPr>
+        <p:style>
+          <a:lnRef idx="1">
+            <a:schemeClr val="accent1"/>
+          </a:lnRef>
+          <a:fillRef idx="0">
+            <a:schemeClr val="accent1"/>
+          </a:fillRef>
+          <a:effectRef idx="0">
+            <a:schemeClr val="accent1"/>
+          </a:effectRef>
+          <a:fontRef idx="minor">
+            <a:schemeClr val="tx1"/>
+          </a:fontRef>
+        </p:style>
+      </p:cxnSp>
+      <p:sp>
+        <p:nvSpPr>
+          <p:cNvPr id="166" name="Rectangle 165">
+            <a:extLst>
+              <a:ext uri="{FF2B5EF4-FFF2-40B4-BE49-F238E27FC236}">
+                <a16:creationId xmlns:a16="http://schemas.microsoft.com/office/drawing/2014/main" id="{B0B31249-3965-4EAE-9779-86EF7BA30922}"/>
+              </a:ext>
+            </a:extLst>
+          </p:cNvPr>
+          <p:cNvSpPr/>
+          <p:nvPr/>
+        </p:nvSpPr>
+        <p:spPr>
+          <a:xfrm>
+            <a:off x="892553" y="1443690"/>
+            <a:ext cx="2234268" cy="469471"/>
+          </a:xfrm>
+          <a:prstGeom prst="rect">
+            <a:avLst/>
+          </a:prstGeom>
+          <a:noFill/>
+          <a:ln w="12700">
+            <a:solidFill>
+              <a:srgbClr val="FF0000"/>
+            </a:solidFill>
+            <a:prstDash val="solid"/>
+          </a:ln>
+        </p:spPr>
+        <p:style>
+          <a:lnRef idx="2">
+            <a:schemeClr val="accent1">
+              <a:shade val="50000"/>
+            </a:schemeClr>
+          </a:lnRef>
+          <a:fillRef idx="1">
+            <a:schemeClr val="accent1"/>
+          </a:fillRef>
+          <a:effectRef idx="0">
+            <a:schemeClr val="accent1"/>
+          </a:effectRef>
+          <a:fontRef idx="minor">
+            <a:schemeClr val="lt1"/>
+          </a:fontRef>
+        </p:style>
+        <p:txBody>
+          <a:bodyPr rtlCol="0" anchor="ctr"/>
+          <a:lstStyle/>
+          <a:p>
+            <a:pPr algn="ctr"/>
+            <a:endParaRPr lang="en-GB" sz="600">
+              <a:solidFill>
+                <a:schemeClr val="tx1">
+                  <a:lumMod val="65000"/>
+                  <a:lumOff val="35000"/>
+                </a:schemeClr>
+              </a:solidFill>
+            </a:endParaRPr>
+          </a:p>
+        </p:txBody>
+      </p:sp>
+      <p:cxnSp>
+        <p:nvCxnSpPr>
+          <p:cNvPr id="167" name="Straight Arrow Connector 166">
+            <a:extLst>
+              <a:ext uri="{FF2B5EF4-FFF2-40B4-BE49-F238E27FC236}">
+                <a16:creationId xmlns:a16="http://schemas.microsoft.com/office/drawing/2014/main" id="{3C5FF516-5F73-465A-8528-1C29A41FA446}"/>
+              </a:ext>
+            </a:extLst>
+          </p:cNvPr>
+          <p:cNvCxnSpPr>
+            <a:cxnSpLocks/>
+            <a:stCxn id="126" idx="2"/>
+            <a:endCxn id="156" idx="0"/>
+          </p:cNvCxnSpPr>
+          <p:nvPr/>
+        </p:nvCxnSpPr>
+        <p:spPr>
+          <a:xfrm>
+            <a:off x="1473276" y="1864133"/>
+            <a:ext cx="537533" cy="156596"/>
+          </a:xfrm>
+          <a:prstGeom prst="straightConnector1">
+            <a:avLst/>
+          </a:prstGeom>
+          <a:ln>
+            <a:solidFill>
+              <a:srgbClr val="787878"/>
+            </a:solidFill>
+            <a:tailEnd type="triangle"/>
+          </a:ln>
+        </p:spPr>
+        <p:style>
+          <a:lnRef idx="1">
+            <a:schemeClr val="accent1"/>
+          </a:lnRef>
+          <a:fillRef idx="0">
+            <a:schemeClr val="accent1"/>
+          </a:fillRef>
+          <a:effectRef idx="0">
+            <a:schemeClr val="accent1"/>
+          </a:effectRef>
+          <a:fontRef idx="minor">
+            <a:schemeClr val="tx1"/>
+          </a:fontRef>
+        </p:style>
+      </p:cxnSp>
+      <p:sp>
+        <p:nvSpPr>
+          <p:cNvPr id="168" name="Diamond 167">
+            <a:extLst>
+              <a:ext uri="{FF2B5EF4-FFF2-40B4-BE49-F238E27FC236}">
+                <a16:creationId xmlns:a16="http://schemas.microsoft.com/office/drawing/2014/main" id="{AD6D1F93-1604-42F6-9D96-7EC2C2F69828}"/>
+              </a:ext>
+            </a:extLst>
+          </p:cNvPr>
+          <p:cNvSpPr/>
+          <p:nvPr/>
+        </p:nvSpPr>
+        <p:spPr>
+          <a:xfrm>
+            <a:off x="1337704" y="4091197"/>
+            <a:ext cx="1368516" cy="398273"/>
+          </a:xfrm>
+          <a:prstGeom prst="diamond">
+            <a:avLst/>
+          </a:prstGeom>
+          <a:solidFill>
+            <a:srgbClr val="FFDF57"/>
+          </a:solidFill>
+          <a:ln w="3175">
+            <a:solidFill>
+              <a:schemeClr val="bg2">
+                <a:lumMod val="75000"/>
+              </a:schemeClr>
+            </a:solidFill>
+          </a:ln>
+        </p:spPr>
+        <p:style>
+          <a:lnRef idx="2">
+            <a:schemeClr val="accent1">
+              <a:shade val="50000"/>
+            </a:schemeClr>
+          </a:lnRef>
+          <a:fillRef idx="1">
+            <a:schemeClr val="accent1"/>
+          </a:fillRef>
+          <a:effectRef idx="0">
+            <a:schemeClr val="accent1"/>
+          </a:effectRef>
+          <a:fontRef idx="minor">
+            <a:schemeClr val="lt1"/>
+          </a:fontRef>
+        </p:style>
+        <p:txBody>
+          <a:bodyPr rtlCol="0" anchor="ctr"/>
+          <a:lstStyle/>
+          <a:p>
+            <a:pPr algn="ctr"/>
+            <a:r>
+              <a:rPr lang="en-GB" sz="600" dirty="0">
+                <a:solidFill>
+                  <a:schemeClr val="tx1">
+                    <a:lumMod val="65000"/>
+                    <a:lumOff val="35000"/>
+                  </a:schemeClr>
+                </a:solidFill>
+                <a:cs typeface="Arial" panose="020B0604020202020204" pitchFamily="34" charset="0"/>
+              </a:rPr>
+              <a:t>Are the new results similar?</a:t>
             </a:r>
           </a:p>
         </p:txBody>

</xml_diff>